<commit_message>
Added BOM to ppt 1
</commit_message>
<xml_diff>
--- a/doc/march-25.pptx
+++ b/doc/march-25.pptx
@@ -5,7 +5,7 @@
     <p:sldMasterId id="2147483684" r:id="rId1"/>
   </p:sldMasterIdLst>
   <p:notesMasterIdLst>
-    <p:notesMasterId r:id="rId24"/>
+    <p:notesMasterId r:id="rId25"/>
   </p:notesMasterIdLst>
   <p:sldIdLst>
     <p:sldId id="256" r:id="rId2"/>
@@ -30,39 +30,40 @@
     <p:sldId id="333" r:id="rId21"/>
     <p:sldId id="335" r:id="rId22"/>
     <p:sldId id="334" r:id="rId23"/>
+    <p:sldId id="336" r:id="rId24"/>
   </p:sldIdLst>
   <p:sldSz cx="9144000" cy="5143500" type="screen16x9"/>
   <p:notesSz cx="6858000" cy="9144000"/>
   <p:embeddedFontLst>
     <p:embeddedFont>
       <p:font typeface="Anton" pitchFamily="2" charset="0"/>
-      <p:regular r:id="rId25"/>
+      <p:regular r:id="rId26"/>
     </p:embeddedFont>
     <p:embeddedFont>
       <p:font typeface="Aptos Narrow" panose="020B0004020202020204" pitchFamily="34" charset="0"/>
-      <p:regular r:id="rId26"/>
-      <p:bold r:id="rId27"/>
-      <p:italic r:id="rId28"/>
-      <p:boldItalic r:id="rId29"/>
+      <p:regular r:id="rId27"/>
+      <p:bold r:id="rId28"/>
+      <p:italic r:id="rId29"/>
+      <p:boldItalic r:id="rId30"/>
     </p:embeddedFont>
     <p:embeddedFont>
       <p:font typeface="Hind" panose="02000000000000000000" pitchFamily="2" charset="0"/>
-      <p:regular r:id="rId30"/>
-      <p:bold r:id="rId31"/>
+      <p:regular r:id="rId31"/>
+      <p:bold r:id="rId32"/>
     </p:embeddedFont>
     <p:embeddedFont>
       <p:font typeface="Poppins" panose="00000500000000000000" pitchFamily="2" charset="0"/>
-      <p:regular r:id="rId32"/>
-      <p:bold r:id="rId33"/>
-      <p:italic r:id="rId34"/>
-      <p:boldItalic r:id="rId35"/>
+      <p:regular r:id="rId33"/>
+      <p:bold r:id="rId34"/>
+      <p:italic r:id="rId35"/>
+      <p:boldItalic r:id="rId36"/>
     </p:embeddedFont>
     <p:embeddedFont>
       <p:font typeface="Roboto" panose="02000000000000000000" pitchFamily="2" charset="0"/>
-      <p:regular r:id="rId36"/>
-      <p:bold r:id="rId37"/>
-      <p:italic r:id="rId38"/>
-      <p:boldItalic r:id="rId39"/>
+      <p:regular r:id="rId37"/>
+      <p:bold r:id="rId38"/>
+      <p:italic r:id="rId39"/>
+      <p:boldItalic r:id="rId40"/>
     </p:embeddedFont>
   </p:embeddedFontLst>
   <p:defaultTextStyle>
@@ -30208,6 +30209,4057 @@
     <p:extLst>
       <p:ext uri="{BB962C8B-B14F-4D97-AF65-F5344CB8AC3E}">
         <p14:creationId xmlns:p14="http://schemas.microsoft.com/office/powerpoint/2010/main" val="3903765124"/>
+      </p:ext>
+    </p:extLst>
+  </p:cSld>
+  <p:clrMapOvr>
+    <a:masterClrMapping/>
+  </p:clrMapOvr>
+</p:sld>
+</file>
+
+<file path=ppt/slides/slide23.xml><?xml version="1.0" encoding="utf-8"?>
+<p:sld xmlns:a="http://schemas.openxmlformats.org/drawingml/2006/main" xmlns:r="http://schemas.openxmlformats.org/officeDocument/2006/relationships" xmlns:p="http://schemas.openxmlformats.org/presentationml/2006/main">
+  <p:cSld>
+    <p:spTree>
+      <p:nvGrpSpPr>
+        <p:cNvPr id="1" name=""/>
+        <p:cNvGrpSpPr/>
+        <p:nvPr/>
+      </p:nvGrpSpPr>
+      <p:grpSpPr>
+        <a:xfrm>
+          <a:off x="0" y="0"/>
+          <a:ext cx="0" cy="0"/>
+          <a:chOff x="0" y="0"/>
+          <a:chExt cx="0" cy="0"/>
+        </a:xfrm>
+      </p:grpSpPr>
+      <p:sp>
+        <p:nvSpPr>
+          <p:cNvPr id="2" name="Title 1">
+            <a:extLst>
+              <a:ext uri="{FF2B5EF4-FFF2-40B4-BE49-F238E27FC236}">
+                <a16:creationId xmlns:a16="http://schemas.microsoft.com/office/drawing/2014/main" id="{3A4A910C-71A0-9B3D-CE2C-1F6B7A8C33E9}"/>
+              </a:ext>
+            </a:extLst>
+          </p:cNvPr>
+          <p:cNvSpPr>
+            <a:spLocks noGrp="1"/>
+          </p:cNvSpPr>
+          <p:nvPr>
+            <p:ph type="title"/>
+          </p:nvPr>
+        </p:nvSpPr>
+        <p:spPr/>
+        <p:txBody>
+          <a:bodyPr/>
+          <a:lstStyle/>
+          <a:p>
+            <a:r>
+              <a:rPr lang="es-ES" dirty="0"/>
+              <a:t>BOM</a:t>
+            </a:r>
+          </a:p>
+        </p:txBody>
+      </p:sp>
+      <p:graphicFrame>
+        <p:nvGraphicFramePr>
+          <p:cNvPr id="4" name="Table 3">
+            <a:extLst>
+              <a:ext uri="{FF2B5EF4-FFF2-40B4-BE49-F238E27FC236}">
+                <a16:creationId xmlns:a16="http://schemas.microsoft.com/office/drawing/2014/main" id="{B532F487-6CE6-252A-2768-0CDF7875D2F5}"/>
+              </a:ext>
+            </a:extLst>
+          </p:cNvPr>
+          <p:cNvGraphicFramePr>
+            <a:graphicFrameLocks noGrp="1"/>
+          </p:cNvGraphicFramePr>
+          <p:nvPr>
+            <p:extLst>
+              <p:ext uri="{D42A27DB-BD31-4B8C-83A1-F6EECF244321}">
+                <p14:modId xmlns:p14="http://schemas.microsoft.com/office/powerpoint/2010/main" val="4281133567"/>
+              </p:ext>
+            </p:extLst>
+          </p:nvPr>
+        </p:nvGraphicFramePr>
+        <p:xfrm>
+          <a:off x="1008272" y="1080173"/>
+          <a:ext cx="6879484" cy="3451226"/>
+        </p:xfrm>
+        <a:graphic>
+          <a:graphicData uri="http://schemas.openxmlformats.org/drawingml/2006/table">
+            <a:tbl>
+              <a:tblPr>
+                <a:tableStyleId>{B2CCBE0B-4CB8-4436-A4CF-8A1F351D8455}</a:tableStyleId>
+              </a:tblPr>
+              <a:tblGrid>
+                <a:gridCol w="673295">
+                  <a:extLst>
+                    <a:ext uri="{9D8B030D-6E8A-4147-A177-3AD203B41FA5}">
+                      <a16:colId xmlns:a16="http://schemas.microsoft.com/office/drawing/2014/main" val="1881910677"/>
+                    </a:ext>
+                  </a:extLst>
+                </a:gridCol>
+                <a:gridCol w="519193">
+                  <a:extLst>
+                    <a:ext uri="{9D8B030D-6E8A-4147-A177-3AD203B41FA5}">
+                      <a16:colId xmlns:a16="http://schemas.microsoft.com/office/drawing/2014/main" val="452645959"/>
+                    </a:ext>
+                  </a:extLst>
+                </a:gridCol>
+                <a:gridCol w="658678">
+                  <a:extLst>
+                    <a:ext uri="{9D8B030D-6E8A-4147-A177-3AD203B41FA5}">
+                      <a16:colId xmlns:a16="http://schemas.microsoft.com/office/drawing/2014/main" val="3060493307"/>
+                    </a:ext>
+                  </a:extLst>
+                </a:gridCol>
+                <a:gridCol w="1193369">
+                  <a:extLst>
+                    <a:ext uri="{9D8B030D-6E8A-4147-A177-3AD203B41FA5}">
+                      <a16:colId xmlns:a16="http://schemas.microsoft.com/office/drawing/2014/main" val="1865416339"/>
+                    </a:ext>
+                  </a:extLst>
+                </a:gridCol>
+                <a:gridCol w="720671">
+                  <a:extLst>
+                    <a:ext uri="{9D8B030D-6E8A-4147-A177-3AD203B41FA5}">
+                      <a16:colId xmlns:a16="http://schemas.microsoft.com/office/drawing/2014/main" val="2148286507"/>
+                    </a:ext>
+                  </a:extLst>
+                </a:gridCol>
+                <a:gridCol w="890373">
+                  <a:extLst>
+                    <a:ext uri="{9D8B030D-6E8A-4147-A177-3AD203B41FA5}">
+                      <a16:colId xmlns:a16="http://schemas.microsoft.com/office/drawing/2014/main" val="461439961"/>
+                    </a:ext>
+                  </a:extLst>
+                </a:gridCol>
+                <a:gridCol w="492491">
+                  <a:extLst>
+                    <a:ext uri="{9D8B030D-6E8A-4147-A177-3AD203B41FA5}">
+                      <a16:colId xmlns:a16="http://schemas.microsoft.com/office/drawing/2014/main" val="4275087653"/>
+                    </a:ext>
+                  </a:extLst>
+                </a:gridCol>
+                <a:gridCol w="492491">
+                  <a:extLst>
+                    <a:ext uri="{9D8B030D-6E8A-4147-A177-3AD203B41FA5}">
+                      <a16:colId xmlns:a16="http://schemas.microsoft.com/office/drawing/2014/main" val="3191951654"/>
+                    </a:ext>
+                  </a:extLst>
+                </a:gridCol>
+                <a:gridCol w="1238923">
+                  <a:extLst>
+                    <a:ext uri="{9D8B030D-6E8A-4147-A177-3AD203B41FA5}">
+                      <a16:colId xmlns:a16="http://schemas.microsoft.com/office/drawing/2014/main" val="3457152298"/>
+                    </a:ext>
+                  </a:extLst>
+                </a:gridCol>
+              </a:tblGrid>
+              <a:tr h="150326">
+                <a:tc gridSpan="4">
+                  <a:txBody>
+                    <a:bodyPr/>
+                    <a:lstStyle/>
+                    <a:p>
+                      <a:pPr algn="ctr" fontAlgn="b"/>
+                      <a:r>
+                        <a:rPr lang="es-ES" sz="900" u="none" strike="noStrike">
+                          <a:effectLst/>
+                        </a:rPr>
+                        <a:t>--- Bill of Materials ---</a:t>
+                      </a:r>
+                      <a:endParaRPr lang="es-ES" sz="900" b="0" i="0" u="none" strike="noStrike">
+                        <a:solidFill>
+                          <a:srgbClr val="000000"/>
+                        </a:solidFill>
+                        <a:effectLst/>
+                        <a:latin typeface="Aptos Narrow" panose="020B0004020202020204" pitchFamily="34" charset="0"/>
+                      </a:endParaRPr>
+                    </a:p>
+                  </a:txBody>
+                  <a:tcPr marL="6264" marR="6264" marT="6264" marB="0" anchor="b">
+                    <a:lnR w="9525" cap="flat" cmpd="sng">
+                      <a:noFill/>
+                      <a:prstDash val="solid"/>
+                      <a:round/>
+                      <a:headEnd type="none" w="sm" len="sm"/>
+                      <a:tailEnd type="none" w="sm" len="sm"/>
+                    </a:lnR>
+                  </a:tcPr>
+                </a:tc>
+                <a:tc hMerge="1">
+                  <a:txBody>
+                    <a:bodyPr/>
+                    <a:lstStyle/>
+                    <a:p>
+                      <a:endParaRPr lang="es-ES"/>
+                    </a:p>
+                  </a:txBody>
+                  <a:tcPr/>
+                </a:tc>
+                <a:tc hMerge="1">
+                  <a:txBody>
+                    <a:bodyPr/>
+                    <a:lstStyle/>
+                    <a:p>
+                      <a:endParaRPr lang="es-ES"/>
+                    </a:p>
+                  </a:txBody>
+                  <a:tcPr/>
+                </a:tc>
+                <a:tc hMerge="1">
+                  <a:txBody>
+                    <a:bodyPr/>
+                    <a:lstStyle/>
+                    <a:p>
+                      <a:endParaRPr lang="es-ES"/>
+                    </a:p>
+                  </a:txBody>
+                  <a:tcPr/>
+                </a:tc>
+                <a:tc>
+                  <a:txBody>
+                    <a:bodyPr/>
+                    <a:lstStyle/>
+                    <a:p>
+                      <a:pPr algn="l" fontAlgn="b"/>
+                      <a:endParaRPr lang="es-ES" sz="900" b="0" i="0" u="none" strike="noStrike" dirty="0">
+                        <a:solidFill>
+                          <a:srgbClr val="000000"/>
+                        </a:solidFill>
+                        <a:effectLst/>
+                        <a:latin typeface="Aptos Narrow" panose="020B0004020202020204" pitchFamily="34" charset="0"/>
+                      </a:endParaRPr>
+                    </a:p>
+                  </a:txBody>
+                  <a:tcPr marL="6264" marR="6264" marT="6264" marB="0" anchor="b">
+                    <a:lnL w="9525" cap="flat" cmpd="sng">
+                      <a:noFill/>
+                      <a:prstDash val="solid"/>
+                      <a:round/>
+                      <a:headEnd type="none" w="sm" len="sm"/>
+                      <a:tailEnd type="none" w="sm" len="sm"/>
+                    </a:lnL>
+                    <a:lnR w="9525" cap="flat" cmpd="sng">
+                      <a:noFill/>
+                      <a:prstDash val="solid"/>
+                      <a:round/>
+                      <a:headEnd type="none" w="sm" len="sm"/>
+                      <a:tailEnd type="none" w="sm" len="sm"/>
+                    </a:lnR>
+                    <a:lnT w="9525" cap="flat" cmpd="sng">
+                      <a:noFill/>
+                      <a:prstDash val="solid"/>
+                      <a:round/>
+                      <a:headEnd type="none" w="sm" len="sm"/>
+                      <a:tailEnd type="none" w="sm" len="sm"/>
+                    </a:lnT>
+                    <a:lnB w="9525" cap="flat" cmpd="sng">
+                      <a:noFill/>
+                      <a:prstDash val="solid"/>
+                      <a:round/>
+                      <a:headEnd type="none" w="sm" len="sm"/>
+                      <a:tailEnd type="none" w="sm" len="sm"/>
+                    </a:lnB>
+                    <a:lnTlToBr w="12700" cmpd="sng">
+                      <a:noFill/>
+                      <a:prstDash val="solid"/>
+                    </a:lnTlToBr>
+                    <a:lnBlToTr w="12700" cmpd="sng">
+                      <a:noFill/>
+                      <a:prstDash val="solid"/>
+                    </a:lnBlToTr>
+                    <a:solidFill>
+                      <a:schemeClr val="tx1"/>
+                    </a:solidFill>
+                  </a:tcPr>
+                </a:tc>
+                <a:tc gridSpan="4">
+                  <a:txBody>
+                    <a:bodyPr/>
+                    <a:lstStyle/>
+                    <a:p>
+                      <a:pPr algn="ctr" fontAlgn="b"/>
+                      <a:r>
+                        <a:rPr lang="es-ES" sz="900" u="none" strike="noStrike">
+                          <a:effectLst/>
+                        </a:rPr>
+                        <a:t>--- Bill of Materials ---</a:t>
+                      </a:r>
+                      <a:endParaRPr lang="es-ES" sz="900" b="0" i="0" u="none" strike="noStrike">
+                        <a:solidFill>
+                          <a:srgbClr val="000000"/>
+                        </a:solidFill>
+                        <a:effectLst/>
+                        <a:latin typeface="Aptos Narrow" panose="020B0004020202020204" pitchFamily="34" charset="0"/>
+                      </a:endParaRPr>
+                    </a:p>
+                  </a:txBody>
+                  <a:tcPr marL="6264" marR="6264" marT="6264" marB="0" anchor="b">
+                    <a:lnL w="9525" cap="flat" cmpd="sng">
+                      <a:noFill/>
+                      <a:prstDash val="solid"/>
+                      <a:round/>
+                      <a:headEnd type="none" w="sm" len="sm"/>
+                      <a:tailEnd type="none" w="sm" len="sm"/>
+                    </a:lnL>
+                  </a:tcPr>
+                </a:tc>
+                <a:tc hMerge="1">
+                  <a:txBody>
+                    <a:bodyPr/>
+                    <a:lstStyle/>
+                    <a:p>
+                      <a:endParaRPr lang="es-ES"/>
+                    </a:p>
+                  </a:txBody>
+                  <a:tcPr/>
+                </a:tc>
+                <a:tc hMerge="1">
+                  <a:txBody>
+                    <a:bodyPr/>
+                    <a:lstStyle/>
+                    <a:p>
+                      <a:endParaRPr lang="es-ES"/>
+                    </a:p>
+                  </a:txBody>
+                  <a:tcPr/>
+                </a:tc>
+                <a:tc hMerge="1">
+                  <a:txBody>
+                    <a:bodyPr/>
+                    <a:lstStyle/>
+                    <a:p>
+                      <a:endParaRPr lang="es-ES"/>
+                    </a:p>
+                  </a:txBody>
+                  <a:tcPr/>
+                </a:tc>
+                <a:extLst>
+                  <a:ext uri="{0D108BD9-81ED-4DB2-BD59-A6C34878D82A}">
+                    <a16:rowId xmlns:a16="http://schemas.microsoft.com/office/drawing/2014/main" val="870778098"/>
+                  </a:ext>
+                </a:extLst>
+              </a:tr>
+              <a:tr h="150326">
+                <a:tc>
+                  <a:txBody>
+                    <a:bodyPr/>
+                    <a:lstStyle/>
+                    <a:p>
+                      <a:pPr algn="l" fontAlgn="b"/>
+                      <a:r>
+                        <a:rPr lang="es-ES" sz="900" b="1" u="none" strike="noStrike" dirty="0">
+                          <a:effectLst/>
+                        </a:rPr>
+                        <a:t>Ref.</a:t>
+                      </a:r>
+                      <a:endParaRPr lang="es-ES" sz="900" b="1" i="0" u="none" strike="noStrike" dirty="0">
+                        <a:solidFill>
+                          <a:srgbClr val="000000"/>
+                        </a:solidFill>
+                        <a:effectLst/>
+                        <a:latin typeface="Aptos Narrow" panose="020B0004020202020204" pitchFamily="34" charset="0"/>
+                      </a:endParaRPr>
+                    </a:p>
+                  </a:txBody>
+                  <a:tcPr marL="6264" marR="6264" marT="6264" marB="0" anchor="b"/>
+                </a:tc>
+                <a:tc>
+                  <a:txBody>
+                    <a:bodyPr/>
+                    <a:lstStyle/>
+                    <a:p>
+                      <a:pPr algn="l" fontAlgn="b"/>
+                      <a:r>
+                        <a:rPr lang="es-ES" sz="900" b="1" u="none" strike="noStrike">
+                          <a:effectLst/>
+                        </a:rPr>
+                        <a:t>Mfg.</a:t>
+                      </a:r>
+                      <a:endParaRPr lang="es-ES" sz="900" b="1" i="0" u="none" strike="noStrike">
+                        <a:solidFill>
+                          <a:srgbClr val="000000"/>
+                        </a:solidFill>
+                        <a:effectLst/>
+                        <a:latin typeface="Aptos Narrow" panose="020B0004020202020204" pitchFamily="34" charset="0"/>
+                      </a:endParaRPr>
+                    </a:p>
+                  </a:txBody>
+                  <a:tcPr marL="6264" marR="6264" marT="6264" marB="0" anchor="b"/>
+                </a:tc>
+                <a:tc>
+                  <a:txBody>
+                    <a:bodyPr/>
+                    <a:lstStyle/>
+                    <a:p>
+                      <a:pPr algn="l" fontAlgn="b"/>
+                      <a:r>
+                        <a:rPr lang="es-ES" sz="900" b="1" u="none" strike="noStrike">
+                          <a:effectLst/>
+                        </a:rPr>
+                        <a:t>Part No.</a:t>
+                      </a:r>
+                      <a:endParaRPr lang="es-ES" sz="900" b="1" i="0" u="none" strike="noStrike">
+                        <a:solidFill>
+                          <a:srgbClr val="000000"/>
+                        </a:solidFill>
+                        <a:effectLst/>
+                        <a:latin typeface="Aptos Narrow" panose="020B0004020202020204" pitchFamily="34" charset="0"/>
+                      </a:endParaRPr>
+                    </a:p>
+                  </a:txBody>
+                  <a:tcPr marL="6264" marR="6264" marT="6264" marB="0" anchor="b"/>
+                </a:tc>
+                <a:tc>
+                  <a:txBody>
+                    <a:bodyPr/>
+                    <a:lstStyle/>
+                    <a:p>
+                      <a:pPr algn="l" fontAlgn="b"/>
+                      <a:r>
+                        <a:rPr lang="es-ES" sz="900" b="1" u="none" strike="noStrike">
+                          <a:effectLst/>
+                        </a:rPr>
+                        <a:t>Description</a:t>
+                      </a:r>
+                      <a:endParaRPr lang="es-ES" sz="900" b="1" i="0" u="none" strike="noStrike">
+                        <a:solidFill>
+                          <a:srgbClr val="000000"/>
+                        </a:solidFill>
+                        <a:effectLst/>
+                        <a:latin typeface="Aptos Narrow" panose="020B0004020202020204" pitchFamily="34" charset="0"/>
+                      </a:endParaRPr>
+                    </a:p>
+                  </a:txBody>
+                  <a:tcPr marL="6264" marR="6264" marT="6264" marB="0" anchor="b">
+                    <a:lnR w="9525" cap="flat" cmpd="sng">
+                      <a:noFill/>
+                      <a:prstDash val="solid"/>
+                      <a:round/>
+                      <a:headEnd type="none" w="sm" len="sm"/>
+                      <a:tailEnd type="none" w="sm" len="sm"/>
+                    </a:lnR>
+                  </a:tcPr>
+                </a:tc>
+                <a:tc>
+                  <a:txBody>
+                    <a:bodyPr/>
+                    <a:lstStyle/>
+                    <a:p>
+                      <a:pPr algn="l" fontAlgn="b"/>
+                      <a:endParaRPr lang="es-ES" sz="900" b="1" i="0" u="none" strike="noStrike" dirty="0">
+                        <a:solidFill>
+                          <a:srgbClr val="000000"/>
+                        </a:solidFill>
+                        <a:effectLst/>
+                        <a:latin typeface="Aptos Narrow" panose="020B0004020202020204" pitchFamily="34" charset="0"/>
+                      </a:endParaRPr>
+                    </a:p>
+                  </a:txBody>
+                  <a:tcPr marL="6264" marR="6264" marT="6264" marB="0" anchor="b">
+                    <a:lnL w="9525" cap="flat" cmpd="sng">
+                      <a:noFill/>
+                      <a:prstDash val="solid"/>
+                      <a:round/>
+                      <a:headEnd type="none" w="sm" len="sm"/>
+                      <a:tailEnd type="none" w="sm" len="sm"/>
+                    </a:lnL>
+                    <a:lnR w="9525" cap="flat" cmpd="sng">
+                      <a:noFill/>
+                      <a:prstDash val="solid"/>
+                      <a:round/>
+                      <a:headEnd type="none" w="sm" len="sm"/>
+                      <a:tailEnd type="none" w="sm" len="sm"/>
+                    </a:lnR>
+                    <a:lnT w="9525" cap="flat" cmpd="sng">
+                      <a:noFill/>
+                      <a:prstDash val="solid"/>
+                      <a:round/>
+                      <a:headEnd type="none" w="sm" len="sm"/>
+                      <a:tailEnd type="none" w="sm" len="sm"/>
+                    </a:lnT>
+                    <a:lnB w="9525" cap="flat" cmpd="sng">
+                      <a:noFill/>
+                      <a:prstDash val="solid"/>
+                      <a:round/>
+                      <a:headEnd type="none" w="sm" len="sm"/>
+                      <a:tailEnd type="none" w="sm" len="sm"/>
+                    </a:lnB>
+                    <a:lnTlToBr w="12700" cmpd="sng">
+                      <a:noFill/>
+                      <a:prstDash val="solid"/>
+                    </a:lnTlToBr>
+                    <a:lnBlToTr w="12700" cmpd="sng">
+                      <a:noFill/>
+                      <a:prstDash val="solid"/>
+                    </a:lnBlToTr>
+                    <a:solidFill>
+                      <a:schemeClr val="tx1"/>
+                    </a:solidFill>
+                  </a:tcPr>
+                </a:tc>
+                <a:tc>
+                  <a:txBody>
+                    <a:bodyPr/>
+                    <a:lstStyle/>
+                    <a:p>
+                      <a:pPr algn="l" fontAlgn="b"/>
+                      <a:r>
+                        <a:rPr lang="es-ES" sz="900" b="1" u="none" strike="noStrike">
+                          <a:effectLst/>
+                        </a:rPr>
+                        <a:t>Ref.</a:t>
+                      </a:r>
+                      <a:endParaRPr lang="es-ES" sz="900" b="1" i="0" u="none" strike="noStrike">
+                        <a:solidFill>
+                          <a:srgbClr val="000000"/>
+                        </a:solidFill>
+                        <a:effectLst/>
+                        <a:latin typeface="Aptos Narrow" panose="020B0004020202020204" pitchFamily="34" charset="0"/>
+                      </a:endParaRPr>
+                    </a:p>
+                  </a:txBody>
+                  <a:tcPr marL="6264" marR="6264" marT="6264" marB="0" anchor="b">
+                    <a:lnL w="9525" cap="flat" cmpd="sng">
+                      <a:noFill/>
+                      <a:prstDash val="solid"/>
+                      <a:round/>
+                      <a:headEnd type="none" w="sm" len="sm"/>
+                      <a:tailEnd type="none" w="sm" len="sm"/>
+                    </a:lnL>
+                  </a:tcPr>
+                </a:tc>
+                <a:tc>
+                  <a:txBody>
+                    <a:bodyPr/>
+                    <a:lstStyle/>
+                    <a:p>
+                      <a:pPr algn="l" fontAlgn="b"/>
+                      <a:r>
+                        <a:rPr lang="es-ES" sz="900" b="1" u="none" strike="noStrike">
+                          <a:effectLst/>
+                        </a:rPr>
+                        <a:t>Mfg.</a:t>
+                      </a:r>
+                      <a:endParaRPr lang="es-ES" sz="900" b="1" i="0" u="none" strike="noStrike">
+                        <a:solidFill>
+                          <a:srgbClr val="000000"/>
+                        </a:solidFill>
+                        <a:effectLst/>
+                        <a:latin typeface="Aptos Narrow" panose="020B0004020202020204" pitchFamily="34" charset="0"/>
+                      </a:endParaRPr>
+                    </a:p>
+                  </a:txBody>
+                  <a:tcPr marL="6264" marR="6264" marT="6264" marB="0" anchor="b"/>
+                </a:tc>
+                <a:tc>
+                  <a:txBody>
+                    <a:bodyPr/>
+                    <a:lstStyle/>
+                    <a:p>
+                      <a:pPr algn="l" fontAlgn="b"/>
+                      <a:r>
+                        <a:rPr lang="es-ES" sz="900" b="1" u="none" strike="noStrike">
+                          <a:effectLst/>
+                        </a:rPr>
+                        <a:t>Part No.</a:t>
+                      </a:r>
+                      <a:endParaRPr lang="es-ES" sz="900" b="1" i="0" u="none" strike="noStrike">
+                        <a:solidFill>
+                          <a:srgbClr val="000000"/>
+                        </a:solidFill>
+                        <a:effectLst/>
+                        <a:latin typeface="Aptos Narrow" panose="020B0004020202020204" pitchFamily="34" charset="0"/>
+                      </a:endParaRPr>
+                    </a:p>
+                  </a:txBody>
+                  <a:tcPr marL="6264" marR="6264" marT="6264" marB="0" anchor="b"/>
+                </a:tc>
+                <a:tc>
+                  <a:txBody>
+                    <a:bodyPr/>
+                    <a:lstStyle/>
+                    <a:p>
+                      <a:pPr algn="l" fontAlgn="b"/>
+                      <a:r>
+                        <a:rPr lang="es-ES" sz="900" b="1" u="none" strike="noStrike" dirty="0" err="1">
+                          <a:effectLst/>
+                        </a:rPr>
+                        <a:t>Description</a:t>
+                      </a:r>
+                      <a:endParaRPr lang="es-ES" sz="900" b="1" i="0" u="none" strike="noStrike" dirty="0">
+                        <a:solidFill>
+                          <a:srgbClr val="000000"/>
+                        </a:solidFill>
+                        <a:effectLst/>
+                        <a:latin typeface="Aptos Narrow" panose="020B0004020202020204" pitchFamily="34" charset="0"/>
+                      </a:endParaRPr>
+                    </a:p>
+                  </a:txBody>
+                  <a:tcPr marL="6264" marR="6264" marT="6264" marB="0" anchor="b"/>
+                </a:tc>
+                <a:extLst>
+                  <a:ext uri="{0D108BD9-81ED-4DB2-BD59-A6C34878D82A}">
+                    <a16:rowId xmlns:a16="http://schemas.microsoft.com/office/drawing/2014/main" val="3859834341"/>
+                  </a:ext>
+                </a:extLst>
+              </a:tr>
+              <a:tr h="150326">
+                <a:tc>
+                  <a:txBody>
+                    <a:bodyPr/>
+                    <a:lstStyle/>
+                    <a:p>
+                      <a:pPr algn="l" fontAlgn="b"/>
+                      <a:r>
+                        <a:rPr lang="es-ES" sz="900" u="none" strike="noStrike">
+                          <a:effectLst/>
+                        </a:rPr>
+                        <a:t>BD135</a:t>
+                      </a:r>
+                      <a:endParaRPr lang="es-ES" sz="900" b="0" i="0" u="none" strike="noStrike">
+                        <a:solidFill>
+                          <a:srgbClr val="000000"/>
+                        </a:solidFill>
+                        <a:effectLst/>
+                        <a:latin typeface="Aptos Narrow" panose="020B0004020202020204" pitchFamily="34" charset="0"/>
+                      </a:endParaRPr>
+                    </a:p>
+                  </a:txBody>
+                  <a:tcPr marL="6264" marR="6264" marT="6264" marB="0" anchor="b"/>
+                </a:tc>
+                <a:tc>
+                  <a:txBody>
+                    <a:bodyPr/>
+                    <a:lstStyle/>
+                    <a:p>
+                      <a:pPr algn="l" fontAlgn="b"/>
+                      <a:r>
+                        <a:rPr lang="es-ES" sz="900" u="none" strike="noStrike">
+                          <a:effectLst/>
+                        </a:rPr>
+                        <a:t>NXP</a:t>
+                      </a:r>
+                      <a:endParaRPr lang="es-ES" sz="900" b="0" i="0" u="none" strike="noStrike">
+                        <a:solidFill>
+                          <a:srgbClr val="000000"/>
+                        </a:solidFill>
+                        <a:effectLst/>
+                        <a:latin typeface="Aptos Narrow" panose="020B0004020202020204" pitchFamily="34" charset="0"/>
+                      </a:endParaRPr>
+                    </a:p>
+                  </a:txBody>
+                  <a:tcPr marL="6264" marR="6264" marT="6264" marB="0" anchor="b"/>
+                </a:tc>
+                <a:tc>
+                  <a:txBody>
+                    <a:bodyPr/>
+                    <a:lstStyle/>
+                    <a:p>
+                      <a:pPr algn="l" fontAlgn="b"/>
+                      <a:r>
+                        <a:rPr lang="es-ES" sz="900" u="none" strike="noStrike">
+                          <a:effectLst/>
+                        </a:rPr>
+                        <a:t>2N3904</a:t>
+                      </a:r>
+                      <a:endParaRPr lang="es-ES" sz="900" b="0" i="0" u="none" strike="noStrike">
+                        <a:solidFill>
+                          <a:srgbClr val="000000"/>
+                        </a:solidFill>
+                        <a:effectLst/>
+                        <a:latin typeface="Aptos Narrow" panose="020B0004020202020204" pitchFamily="34" charset="0"/>
+                      </a:endParaRPr>
+                    </a:p>
+                  </a:txBody>
+                  <a:tcPr marL="6264" marR="6264" marT="6264" marB="0" anchor="b"/>
+                </a:tc>
+                <a:tc>
+                  <a:txBody>
+                    <a:bodyPr/>
+                    <a:lstStyle/>
+                    <a:p>
+                      <a:pPr algn="l" fontAlgn="b"/>
+                      <a:r>
+                        <a:rPr lang="es-ES" sz="900" u="none" strike="noStrike">
+                          <a:effectLst/>
+                        </a:rPr>
+                        <a:t>bipolar transistor</a:t>
+                      </a:r>
+                      <a:endParaRPr lang="es-ES" sz="900" b="0" i="0" u="none" strike="noStrike">
+                        <a:solidFill>
+                          <a:srgbClr val="000000"/>
+                        </a:solidFill>
+                        <a:effectLst/>
+                        <a:latin typeface="Aptos Narrow" panose="020B0004020202020204" pitchFamily="34" charset="0"/>
+                      </a:endParaRPr>
+                    </a:p>
+                  </a:txBody>
+                  <a:tcPr marL="6264" marR="6264" marT="6264" marB="0" anchor="b">
+                    <a:lnR w="9525" cap="flat" cmpd="sng">
+                      <a:noFill/>
+                      <a:prstDash val="solid"/>
+                      <a:round/>
+                      <a:headEnd type="none" w="sm" len="sm"/>
+                      <a:tailEnd type="none" w="sm" len="sm"/>
+                    </a:lnR>
+                  </a:tcPr>
+                </a:tc>
+                <a:tc>
+                  <a:txBody>
+                    <a:bodyPr/>
+                    <a:lstStyle/>
+                    <a:p>
+                      <a:pPr algn="l" fontAlgn="b"/>
+                      <a:endParaRPr lang="es-ES" sz="900" b="0" i="0" u="none" strike="noStrike" dirty="0">
+                        <a:solidFill>
+                          <a:srgbClr val="000000"/>
+                        </a:solidFill>
+                        <a:effectLst/>
+                        <a:latin typeface="Aptos Narrow" panose="020B0004020202020204" pitchFamily="34" charset="0"/>
+                      </a:endParaRPr>
+                    </a:p>
+                  </a:txBody>
+                  <a:tcPr marL="6264" marR="6264" marT="6264" marB="0" anchor="b">
+                    <a:lnL w="9525" cap="flat" cmpd="sng">
+                      <a:noFill/>
+                      <a:prstDash val="solid"/>
+                      <a:round/>
+                      <a:headEnd type="none" w="sm" len="sm"/>
+                      <a:tailEnd type="none" w="sm" len="sm"/>
+                    </a:lnL>
+                    <a:lnR w="9525" cap="flat" cmpd="sng">
+                      <a:noFill/>
+                      <a:prstDash val="solid"/>
+                      <a:round/>
+                      <a:headEnd type="none" w="sm" len="sm"/>
+                      <a:tailEnd type="none" w="sm" len="sm"/>
+                    </a:lnR>
+                    <a:lnT w="9525" cap="flat" cmpd="sng">
+                      <a:noFill/>
+                      <a:prstDash val="solid"/>
+                      <a:round/>
+                      <a:headEnd type="none" w="sm" len="sm"/>
+                      <a:tailEnd type="none" w="sm" len="sm"/>
+                    </a:lnT>
+                    <a:lnB w="9525" cap="flat" cmpd="sng">
+                      <a:noFill/>
+                      <a:prstDash val="solid"/>
+                      <a:round/>
+                      <a:headEnd type="none" w="sm" len="sm"/>
+                      <a:tailEnd type="none" w="sm" len="sm"/>
+                    </a:lnB>
+                    <a:lnTlToBr w="12700" cmpd="sng">
+                      <a:noFill/>
+                      <a:prstDash val="solid"/>
+                    </a:lnTlToBr>
+                    <a:lnBlToTr w="12700" cmpd="sng">
+                      <a:noFill/>
+                      <a:prstDash val="solid"/>
+                    </a:lnBlToTr>
+                    <a:solidFill>
+                      <a:schemeClr val="tx1"/>
+                    </a:solidFill>
+                  </a:tcPr>
+                </a:tc>
+                <a:tc>
+                  <a:txBody>
+                    <a:bodyPr/>
+                    <a:lstStyle/>
+                    <a:p>
+                      <a:pPr algn="l" fontAlgn="b"/>
+                      <a:r>
+                        <a:rPr lang="es-ES" sz="900" u="none" strike="noStrike">
+                          <a:effectLst/>
+                        </a:rPr>
+                        <a:t>R9</a:t>
+                      </a:r>
+                      <a:endParaRPr lang="es-ES" sz="900" b="0" i="0" u="none" strike="noStrike">
+                        <a:solidFill>
+                          <a:srgbClr val="000000"/>
+                        </a:solidFill>
+                        <a:effectLst/>
+                        <a:latin typeface="Aptos Narrow" panose="020B0004020202020204" pitchFamily="34" charset="0"/>
+                      </a:endParaRPr>
+                    </a:p>
+                  </a:txBody>
+                  <a:tcPr marL="6264" marR="6264" marT="6264" marB="0" anchor="b">
+                    <a:lnL w="9525" cap="flat" cmpd="sng">
+                      <a:noFill/>
+                      <a:prstDash val="solid"/>
+                      <a:round/>
+                      <a:headEnd type="none" w="sm" len="sm"/>
+                      <a:tailEnd type="none" w="sm" len="sm"/>
+                    </a:lnL>
+                  </a:tcPr>
+                </a:tc>
+                <a:tc>
+                  <a:txBody>
+                    <a:bodyPr/>
+                    <a:lstStyle/>
+                    <a:p>
+                      <a:pPr algn="l" fontAlgn="b"/>
+                      <a:r>
+                        <a:rPr lang="es-ES" sz="900" u="none" strike="noStrike">
+                          <a:effectLst/>
+                        </a:rPr>
+                        <a:t>--</a:t>
+                      </a:r>
+                      <a:endParaRPr lang="es-ES" sz="900" b="0" i="0" u="none" strike="noStrike">
+                        <a:solidFill>
+                          <a:srgbClr val="000000"/>
+                        </a:solidFill>
+                        <a:effectLst/>
+                        <a:latin typeface="Aptos Narrow" panose="020B0004020202020204" pitchFamily="34" charset="0"/>
+                      </a:endParaRPr>
+                    </a:p>
+                  </a:txBody>
+                  <a:tcPr marL="6264" marR="6264" marT="6264" marB="0" anchor="b"/>
+                </a:tc>
+                <a:tc>
+                  <a:txBody>
+                    <a:bodyPr/>
+                    <a:lstStyle/>
+                    <a:p>
+                      <a:pPr algn="l" fontAlgn="b"/>
+                      <a:r>
+                        <a:rPr lang="es-ES" sz="900" u="none" strike="noStrike">
+                          <a:effectLst/>
+                        </a:rPr>
+                        <a:t>--</a:t>
+                      </a:r>
+                      <a:endParaRPr lang="es-ES" sz="900" b="0" i="0" u="none" strike="noStrike">
+                        <a:solidFill>
+                          <a:srgbClr val="000000"/>
+                        </a:solidFill>
+                        <a:effectLst/>
+                        <a:latin typeface="Aptos Narrow" panose="020B0004020202020204" pitchFamily="34" charset="0"/>
+                      </a:endParaRPr>
+                    </a:p>
+                  </a:txBody>
+                  <a:tcPr marL="6264" marR="6264" marT="6264" marB="0" anchor="b"/>
+                </a:tc>
+                <a:tc>
+                  <a:txBody>
+                    <a:bodyPr/>
+                    <a:lstStyle/>
+                    <a:p>
+                      <a:pPr algn="l" fontAlgn="b"/>
+                      <a:r>
+                        <a:rPr lang="es-ES" sz="900" u="none" strike="noStrike">
+                          <a:effectLst/>
+                        </a:rPr>
+                        <a:t>resistor, 5K</a:t>
+                      </a:r>
+                      <a:endParaRPr lang="es-ES" sz="900" b="0" i="0" u="none" strike="noStrike">
+                        <a:solidFill>
+                          <a:srgbClr val="000000"/>
+                        </a:solidFill>
+                        <a:effectLst/>
+                        <a:latin typeface="Aptos Narrow" panose="020B0004020202020204" pitchFamily="34" charset="0"/>
+                      </a:endParaRPr>
+                    </a:p>
+                  </a:txBody>
+                  <a:tcPr marL="6264" marR="6264" marT="6264" marB="0" anchor="b"/>
+                </a:tc>
+                <a:extLst>
+                  <a:ext uri="{0D108BD9-81ED-4DB2-BD59-A6C34878D82A}">
+                    <a16:rowId xmlns:a16="http://schemas.microsoft.com/office/drawing/2014/main" val="1206737403"/>
+                  </a:ext>
+                </a:extLst>
+              </a:tr>
+              <a:tr h="150326">
+                <a:tc>
+                  <a:txBody>
+                    <a:bodyPr/>
+                    <a:lstStyle/>
+                    <a:p>
+                      <a:pPr algn="l" fontAlgn="b"/>
+                      <a:r>
+                        <a:rPr lang="es-ES" sz="900" u="none" strike="noStrike">
+                          <a:effectLst/>
+                        </a:rPr>
+                        <a:t>C1</a:t>
+                      </a:r>
+                      <a:endParaRPr lang="es-ES" sz="900" b="0" i="0" u="none" strike="noStrike">
+                        <a:solidFill>
+                          <a:srgbClr val="000000"/>
+                        </a:solidFill>
+                        <a:effectLst/>
+                        <a:latin typeface="Aptos Narrow" panose="020B0004020202020204" pitchFamily="34" charset="0"/>
+                      </a:endParaRPr>
+                    </a:p>
+                  </a:txBody>
+                  <a:tcPr marL="6264" marR="6264" marT="6264" marB="0" anchor="b"/>
+                </a:tc>
+                <a:tc>
+                  <a:txBody>
+                    <a:bodyPr/>
+                    <a:lstStyle/>
+                    <a:p>
+                      <a:pPr algn="l" fontAlgn="b"/>
+                      <a:r>
+                        <a:rPr lang="es-ES" sz="900" u="none" strike="noStrike">
+                          <a:effectLst/>
+                        </a:rPr>
+                        <a:t>--</a:t>
+                      </a:r>
+                      <a:endParaRPr lang="es-ES" sz="900" b="0" i="0" u="none" strike="noStrike">
+                        <a:solidFill>
+                          <a:srgbClr val="000000"/>
+                        </a:solidFill>
+                        <a:effectLst/>
+                        <a:latin typeface="Aptos Narrow" panose="020B0004020202020204" pitchFamily="34" charset="0"/>
+                      </a:endParaRPr>
+                    </a:p>
+                  </a:txBody>
+                  <a:tcPr marL="6264" marR="6264" marT="6264" marB="0" anchor="b"/>
+                </a:tc>
+                <a:tc>
+                  <a:txBody>
+                    <a:bodyPr/>
+                    <a:lstStyle/>
+                    <a:p>
+                      <a:pPr algn="l" fontAlgn="b"/>
+                      <a:r>
+                        <a:rPr lang="es-ES" sz="900" u="none" strike="noStrike">
+                          <a:effectLst/>
+                        </a:rPr>
+                        <a:t>--</a:t>
+                      </a:r>
+                      <a:endParaRPr lang="es-ES" sz="900" b="0" i="0" u="none" strike="noStrike">
+                        <a:solidFill>
+                          <a:srgbClr val="000000"/>
+                        </a:solidFill>
+                        <a:effectLst/>
+                        <a:latin typeface="Aptos Narrow" panose="020B0004020202020204" pitchFamily="34" charset="0"/>
+                      </a:endParaRPr>
+                    </a:p>
+                  </a:txBody>
+                  <a:tcPr marL="6264" marR="6264" marT="6264" marB="0" anchor="b"/>
+                </a:tc>
+                <a:tc>
+                  <a:txBody>
+                    <a:bodyPr/>
+                    <a:lstStyle/>
+                    <a:p>
+                      <a:pPr algn="l" fontAlgn="b"/>
+                      <a:r>
+                        <a:rPr lang="es-ES" sz="900" u="none" strike="noStrike">
+                          <a:effectLst/>
+                        </a:rPr>
+                        <a:t>capacitor, 1µF</a:t>
+                      </a:r>
+                      <a:endParaRPr lang="es-ES" sz="900" b="0" i="0" u="none" strike="noStrike">
+                        <a:solidFill>
+                          <a:srgbClr val="000000"/>
+                        </a:solidFill>
+                        <a:effectLst/>
+                        <a:latin typeface="Aptos Narrow" panose="020B0004020202020204" pitchFamily="34" charset="0"/>
+                      </a:endParaRPr>
+                    </a:p>
+                  </a:txBody>
+                  <a:tcPr marL="6264" marR="6264" marT="6264" marB="0" anchor="b">
+                    <a:lnR w="9525" cap="flat" cmpd="sng">
+                      <a:noFill/>
+                      <a:prstDash val="solid"/>
+                      <a:round/>
+                      <a:headEnd type="none" w="sm" len="sm"/>
+                      <a:tailEnd type="none" w="sm" len="sm"/>
+                    </a:lnR>
+                  </a:tcPr>
+                </a:tc>
+                <a:tc>
+                  <a:txBody>
+                    <a:bodyPr/>
+                    <a:lstStyle/>
+                    <a:p>
+                      <a:pPr algn="l" fontAlgn="b"/>
+                      <a:endParaRPr lang="es-ES" sz="900" b="0" i="0" u="none" strike="noStrike" dirty="0">
+                        <a:solidFill>
+                          <a:srgbClr val="000000"/>
+                        </a:solidFill>
+                        <a:effectLst/>
+                        <a:latin typeface="Aptos Narrow" panose="020B0004020202020204" pitchFamily="34" charset="0"/>
+                      </a:endParaRPr>
+                    </a:p>
+                  </a:txBody>
+                  <a:tcPr marL="6264" marR="6264" marT="6264" marB="0" anchor="b">
+                    <a:lnL w="9525" cap="flat" cmpd="sng">
+                      <a:noFill/>
+                      <a:prstDash val="solid"/>
+                      <a:round/>
+                      <a:headEnd type="none" w="sm" len="sm"/>
+                      <a:tailEnd type="none" w="sm" len="sm"/>
+                    </a:lnL>
+                    <a:lnR w="9525" cap="flat" cmpd="sng">
+                      <a:noFill/>
+                      <a:prstDash val="solid"/>
+                      <a:round/>
+                      <a:headEnd type="none" w="sm" len="sm"/>
+                      <a:tailEnd type="none" w="sm" len="sm"/>
+                    </a:lnR>
+                    <a:lnT w="9525" cap="flat" cmpd="sng">
+                      <a:noFill/>
+                      <a:prstDash val="solid"/>
+                      <a:round/>
+                      <a:headEnd type="none" w="sm" len="sm"/>
+                      <a:tailEnd type="none" w="sm" len="sm"/>
+                    </a:lnT>
+                    <a:lnB w="9525" cap="flat" cmpd="sng">
+                      <a:noFill/>
+                      <a:prstDash val="solid"/>
+                      <a:round/>
+                      <a:headEnd type="none" w="sm" len="sm"/>
+                      <a:tailEnd type="none" w="sm" len="sm"/>
+                    </a:lnB>
+                    <a:lnTlToBr w="12700" cmpd="sng">
+                      <a:noFill/>
+                      <a:prstDash val="solid"/>
+                    </a:lnTlToBr>
+                    <a:lnBlToTr w="12700" cmpd="sng">
+                      <a:noFill/>
+                      <a:prstDash val="solid"/>
+                    </a:lnBlToTr>
+                    <a:solidFill>
+                      <a:schemeClr val="tx1"/>
+                    </a:solidFill>
+                  </a:tcPr>
+                </a:tc>
+                <a:tc>
+                  <a:txBody>
+                    <a:bodyPr/>
+                    <a:lstStyle/>
+                    <a:p>
+                      <a:pPr algn="l" fontAlgn="b"/>
+                      <a:r>
+                        <a:rPr lang="es-ES" sz="900" u="none" strike="noStrike">
+                          <a:effectLst/>
+                        </a:rPr>
+                        <a:t>R10</a:t>
+                      </a:r>
+                      <a:endParaRPr lang="es-ES" sz="900" b="0" i="0" u="none" strike="noStrike">
+                        <a:solidFill>
+                          <a:srgbClr val="000000"/>
+                        </a:solidFill>
+                        <a:effectLst/>
+                        <a:latin typeface="Aptos Narrow" panose="020B0004020202020204" pitchFamily="34" charset="0"/>
+                      </a:endParaRPr>
+                    </a:p>
+                  </a:txBody>
+                  <a:tcPr marL="6264" marR="6264" marT="6264" marB="0" anchor="b">
+                    <a:lnL w="9525" cap="flat" cmpd="sng">
+                      <a:noFill/>
+                      <a:prstDash val="solid"/>
+                      <a:round/>
+                      <a:headEnd type="none" w="sm" len="sm"/>
+                      <a:tailEnd type="none" w="sm" len="sm"/>
+                    </a:lnL>
+                  </a:tcPr>
+                </a:tc>
+                <a:tc>
+                  <a:txBody>
+                    <a:bodyPr/>
+                    <a:lstStyle/>
+                    <a:p>
+                      <a:pPr algn="l" fontAlgn="b"/>
+                      <a:r>
+                        <a:rPr lang="es-ES" sz="900" u="none" strike="noStrike">
+                          <a:effectLst/>
+                        </a:rPr>
+                        <a:t>--</a:t>
+                      </a:r>
+                      <a:endParaRPr lang="es-ES" sz="900" b="0" i="0" u="none" strike="noStrike">
+                        <a:solidFill>
+                          <a:srgbClr val="000000"/>
+                        </a:solidFill>
+                        <a:effectLst/>
+                        <a:latin typeface="Aptos Narrow" panose="020B0004020202020204" pitchFamily="34" charset="0"/>
+                      </a:endParaRPr>
+                    </a:p>
+                  </a:txBody>
+                  <a:tcPr marL="6264" marR="6264" marT="6264" marB="0" anchor="b"/>
+                </a:tc>
+                <a:tc>
+                  <a:txBody>
+                    <a:bodyPr/>
+                    <a:lstStyle/>
+                    <a:p>
+                      <a:pPr algn="l" fontAlgn="b"/>
+                      <a:r>
+                        <a:rPr lang="es-ES" sz="900" u="none" strike="noStrike">
+                          <a:effectLst/>
+                        </a:rPr>
+                        <a:t>--</a:t>
+                      </a:r>
+                      <a:endParaRPr lang="es-ES" sz="900" b="0" i="0" u="none" strike="noStrike">
+                        <a:solidFill>
+                          <a:srgbClr val="000000"/>
+                        </a:solidFill>
+                        <a:effectLst/>
+                        <a:latin typeface="Aptos Narrow" panose="020B0004020202020204" pitchFamily="34" charset="0"/>
+                      </a:endParaRPr>
+                    </a:p>
+                  </a:txBody>
+                  <a:tcPr marL="6264" marR="6264" marT="6264" marB="0" anchor="b"/>
+                </a:tc>
+                <a:tc>
+                  <a:txBody>
+                    <a:bodyPr/>
+                    <a:lstStyle/>
+                    <a:p>
+                      <a:pPr algn="l" fontAlgn="b"/>
+                      <a:r>
+                        <a:rPr lang="es-ES" sz="900" u="none" strike="noStrike">
+                          <a:effectLst/>
+                        </a:rPr>
+                        <a:t>resistor, 5K</a:t>
+                      </a:r>
+                      <a:endParaRPr lang="es-ES" sz="900" b="0" i="0" u="none" strike="noStrike">
+                        <a:solidFill>
+                          <a:srgbClr val="000000"/>
+                        </a:solidFill>
+                        <a:effectLst/>
+                        <a:latin typeface="Aptos Narrow" panose="020B0004020202020204" pitchFamily="34" charset="0"/>
+                      </a:endParaRPr>
+                    </a:p>
+                  </a:txBody>
+                  <a:tcPr marL="6264" marR="6264" marT="6264" marB="0" anchor="b"/>
+                </a:tc>
+                <a:extLst>
+                  <a:ext uri="{0D108BD9-81ED-4DB2-BD59-A6C34878D82A}">
+                    <a16:rowId xmlns:a16="http://schemas.microsoft.com/office/drawing/2014/main" val="3854373078"/>
+                  </a:ext>
+                </a:extLst>
+              </a:tr>
+              <a:tr h="150326">
+                <a:tc>
+                  <a:txBody>
+                    <a:bodyPr/>
+                    <a:lstStyle/>
+                    <a:p>
+                      <a:pPr algn="l" fontAlgn="b"/>
+                      <a:r>
+                        <a:rPr lang="es-ES" sz="900" u="none" strike="noStrike">
+                          <a:effectLst/>
+                        </a:rPr>
+                        <a:t>C2</a:t>
+                      </a:r>
+                      <a:endParaRPr lang="es-ES" sz="900" b="0" i="0" u="none" strike="noStrike">
+                        <a:solidFill>
+                          <a:srgbClr val="000000"/>
+                        </a:solidFill>
+                        <a:effectLst/>
+                        <a:latin typeface="Aptos Narrow" panose="020B0004020202020204" pitchFamily="34" charset="0"/>
+                      </a:endParaRPr>
+                    </a:p>
+                  </a:txBody>
+                  <a:tcPr marL="6264" marR="6264" marT="6264" marB="0" anchor="b"/>
+                </a:tc>
+                <a:tc>
+                  <a:txBody>
+                    <a:bodyPr/>
+                    <a:lstStyle/>
+                    <a:p>
+                      <a:pPr algn="l" fontAlgn="b"/>
+                      <a:r>
+                        <a:rPr lang="es-ES" sz="900" u="none" strike="noStrike">
+                          <a:effectLst/>
+                        </a:rPr>
+                        <a:t>--</a:t>
+                      </a:r>
+                      <a:endParaRPr lang="es-ES" sz="900" b="0" i="0" u="none" strike="noStrike">
+                        <a:solidFill>
+                          <a:srgbClr val="000000"/>
+                        </a:solidFill>
+                        <a:effectLst/>
+                        <a:latin typeface="Aptos Narrow" panose="020B0004020202020204" pitchFamily="34" charset="0"/>
+                      </a:endParaRPr>
+                    </a:p>
+                  </a:txBody>
+                  <a:tcPr marL="6264" marR="6264" marT="6264" marB="0" anchor="b"/>
+                </a:tc>
+                <a:tc>
+                  <a:txBody>
+                    <a:bodyPr/>
+                    <a:lstStyle/>
+                    <a:p>
+                      <a:pPr algn="l" fontAlgn="b"/>
+                      <a:r>
+                        <a:rPr lang="es-ES" sz="900" u="none" strike="noStrike">
+                          <a:effectLst/>
+                        </a:rPr>
+                        <a:t>--</a:t>
+                      </a:r>
+                      <a:endParaRPr lang="es-ES" sz="900" b="0" i="0" u="none" strike="noStrike">
+                        <a:solidFill>
+                          <a:srgbClr val="000000"/>
+                        </a:solidFill>
+                        <a:effectLst/>
+                        <a:latin typeface="Aptos Narrow" panose="020B0004020202020204" pitchFamily="34" charset="0"/>
+                      </a:endParaRPr>
+                    </a:p>
+                  </a:txBody>
+                  <a:tcPr marL="6264" marR="6264" marT="6264" marB="0" anchor="b"/>
+                </a:tc>
+                <a:tc>
+                  <a:txBody>
+                    <a:bodyPr/>
+                    <a:lstStyle/>
+                    <a:p>
+                      <a:pPr algn="l" fontAlgn="b"/>
+                      <a:r>
+                        <a:rPr lang="es-ES" sz="900" u="none" strike="noStrike">
+                          <a:effectLst/>
+                        </a:rPr>
+                        <a:t>capacitor, 1µF</a:t>
+                      </a:r>
+                      <a:endParaRPr lang="es-ES" sz="900" b="0" i="0" u="none" strike="noStrike">
+                        <a:solidFill>
+                          <a:srgbClr val="000000"/>
+                        </a:solidFill>
+                        <a:effectLst/>
+                        <a:latin typeface="Aptos Narrow" panose="020B0004020202020204" pitchFamily="34" charset="0"/>
+                      </a:endParaRPr>
+                    </a:p>
+                  </a:txBody>
+                  <a:tcPr marL="6264" marR="6264" marT="6264" marB="0" anchor="b">
+                    <a:lnR w="9525" cap="flat" cmpd="sng">
+                      <a:noFill/>
+                      <a:prstDash val="solid"/>
+                      <a:round/>
+                      <a:headEnd type="none" w="sm" len="sm"/>
+                      <a:tailEnd type="none" w="sm" len="sm"/>
+                    </a:lnR>
+                  </a:tcPr>
+                </a:tc>
+                <a:tc>
+                  <a:txBody>
+                    <a:bodyPr/>
+                    <a:lstStyle/>
+                    <a:p>
+                      <a:pPr algn="l" fontAlgn="b"/>
+                      <a:endParaRPr lang="es-ES" sz="900" b="0" i="0" u="none" strike="noStrike">
+                        <a:solidFill>
+                          <a:srgbClr val="000000"/>
+                        </a:solidFill>
+                        <a:effectLst/>
+                        <a:latin typeface="Aptos Narrow" panose="020B0004020202020204" pitchFamily="34" charset="0"/>
+                      </a:endParaRPr>
+                    </a:p>
+                  </a:txBody>
+                  <a:tcPr marL="6264" marR="6264" marT="6264" marB="0" anchor="b">
+                    <a:lnL w="9525" cap="flat" cmpd="sng">
+                      <a:noFill/>
+                      <a:prstDash val="solid"/>
+                      <a:round/>
+                      <a:headEnd type="none" w="sm" len="sm"/>
+                      <a:tailEnd type="none" w="sm" len="sm"/>
+                    </a:lnL>
+                    <a:lnR w="9525" cap="flat" cmpd="sng">
+                      <a:noFill/>
+                      <a:prstDash val="solid"/>
+                      <a:round/>
+                      <a:headEnd type="none" w="sm" len="sm"/>
+                      <a:tailEnd type="none" w="sm" len="sm"/>
+                    </a:lnR>
+                    <a:lnT w="9525" cap="flat" cmpd="sng">
+                      <a:noFill/>
+                      <a:prstDash val="solid"/>
+                      <a:round/>
+                      <a:headEnd type="none" w="sm" len="sm"/>
+                      <a:tailEnd type="none" w="sm" len="sm"/>
+                    </a:lnT>
+                    <a:lnB w="9525" cap="flat" cmpd="sng">
+                      <a:noFill/>
+                      <a:prstDash val="solid"/>
+                      <a:round/>
+                      <a:headEnd type="none" w="sm" len="sm"/>
+                      <a:tailEnd type="none" w="sm" len="sm"/>
+                    </a:lnB>
+                    <a:lnTlToBr w="12700" cmpd="sng">
+                      <a:noFill/>
+                      <a:prstDash val="solid"/>
+                    </a:lnTlToBr>
+                    <a:lnBlToTr w="12700" cmpd="sng">
+                      <a:noFill/>
+                      <a:prstDash val="solid"/>
+                    </a:lnBlToTr>
+                    <a:solidFill>
+                      <a:schemeClr val="tx1"/>
+                    </a:solidFill>
+                  </a:tcPr>
+                </a:tc>
+                <a:tc>
+                  <a:txBody>
+                    <a:bodyPr/>
+                    <a:lstStyle/>
+                    <a:p>
+                      <a:pPr algn="l" fontAlgn="b"/>
+                      <a:r>
+                        <a:rPr lang="es-ES" sz="900" u="none" strike="noStrike">
+                          <a:effectLst/>
+                        </a:rPr>
+                        <a:t>R11</a:t>
+                      </a:r>
+                      <a:endParaRPr lang="es-ES" sz="900" b="0" i="0" u="none" strike="noStrike">
+                        <a:solidFill>
+                          <a:srgbClr val="000000"/>
+                        </a:solidFill>
+                        <a:effectLst/>
+                        <a:latin typeface="Aptos Narrow" panose="020B0004020202020204" pitchFamily="34" charset="0"/>
+                      </a:endParaRPr>
+                    </a:p>
+                  </a:txBody>
+                  <a:tcPr marL="6264" marR="6264" marT="6264" marB="0" anchor="b">
+                    <a:lnL w="9525" cap="flat" cmpd="sng">
+                      <a:noFill/>
+                      <a:prstDash val="solid"/>
+                      <a:round/>
+                      <a:headEnd type="none" w="sm" len="sm"/>
+                      <a:tailEnd type="none" w="sm" len="sm"/>
+                    </a:lnL>
+                  </a:tcPr>
+                </a:tc>
+                <a:tc>
+                  <a:txBody>
+                    <a:bodyPr/>
+                    <a:lstStyle/>
+                    <a:p>
+                      <a:pPr algn="l" fontAlgn="b"/>
+                      <a:r>
+                        <a:rPr lang="es-ES" sz="900" u="none" strike="noStrike">
+                          <a:effectLst/>
+                        </a:rPr>
+                        <a:t>--</a:t>
+                      </a:r>
+                      <a:endParaRPr lang="es-ES" sz="900" b="0" i="0" u="none" strike="noStrike">
+                        <a:solidFill>
+                          <a:srgbClr val="000000"/>
+                        </a:solidFill>
+                        <a:effectLst/>
+                        <a:latin typeface="Aptos Narrow" panose="020B0004020202020204" pitchFamily="34" charset="0"/>
+                      </a:endParaRPr>
+                    </a:p>
+                  </a:txBody>
+                  <a:tcPr marL="6264" marR="6264" marT="6264" marB="0" anchor="b"/>
+                </a:tc>
+                <a:tc>
+                  <a:txBody>
+                    <a:bodyPr/>
+                    <a:lstStyle/>
+                    <a:p>
+                      <a:pPr algn="l" fontAlgn="b"/>
+                      <a:r>
+                        <a:rPr lang="es-ES" sz="900" u="none" strike="noStrike">
+                          <a:effectLst/>
+                        </a:rPr>
+                        <a:t>--</a:t>
+                      </a:r>
+                      <a:endParaRPr lang="es-ES" sz="900" b="0" i="0" u="none" strike="noStrike">
+                        <a:solidFill>
+                          <a:srgbClr val="000000"/>
+                        </a:solidFill>
+                        <a:effectLst/>
+                        <a:latin typeface="Aptos Narrow" panose="020B0004020202020204" pitchFamily="34" charset="0"/>
+                      </a:endParaRPr>
+                    </a:p>
+                  </a:txBody>
+                  <a:tcPr marL="6264" marR="6264" marT="6264" marB="0" anchor="b"/>
+                </a:tc>
+                <a:tc>
+                  <a:txBody>
+                    <a:bodyPr/>
+                    <a:lstStyle/>
+                    <a:p>
+                      <a:pPr algn="l" fontAlgn="b"/>
+                      <a:r>
+                        <a:rPr lang="es-ES" sz="900" u="none" strike="noStrike">
+                          <a:effectLst/>
+                        </a:rPr>
+                        <a:t>resistor, 5K</a:t>
+                      </a:r>
+                      <a:endParaRPr lang="es-ES" sz="900" b="0" i="0" u="none" strike="noStrike">
+                        <a:solidFill>
+                          <a:srgbClr val="000000"/>
+                        </a:solidFill>
+                        <a:effectLst/>
+                        <a:latin typeface="Aptos Narrow" panose="020B0004020202020204" pitchFamily="34" charset="0"/>
+                      </a:endParaRPr>
+                    </a:p>
+                  </a:txBody>
+                  <a:tcPr marL="6264" marR="6264" marT="6264" marB="0" anchor="b"/>
+                </a:tc>
+                <a:extLst>
+                  <a:ext uri="{0D108BD9-81ED-4DB2-BD59-A6C34878D82A}">
+                    <a16:rowId xmlns:a16="http://schemas.microsoft.com/office/drawing/2014/main" val="2047465643"/>
+                  </a:ext>
+                </a:extLst>
+              </a:tr>
+              <a:tr h="150326">
+                <a:tc>
+                  <a:txBody>
+                    <a:bodyPr/>
+                    <a:lstStyle/>
+                    <a:p>
+                      <a:pPr algn="l" fontAlgn="b"/>
+                      <a:r>
+                        <a:rPr lang="es-ES" sz="900" u="none" strike="noStrike">
+                          <a:effectLst/>
+                        </a:rPr>
+                        <a:t>Q2</a:t>
+                      </a:r>
+                      <a:endParaRPr lang="es-ES" sz="900" b="0" i="0" u="none" strike="noStrike">
+                        <a:solidFill>
+                          <a:srgbClr val="000000"/>
+                        </a:solidFill>
+                        <a:effectLst/>
+                        <a:latin typeface="Aptos Narrow" panose="020B0004020202020204" pitchFamily="34" charset="0"/>
+                      </a:endParaRPr>
+                    </a:p>
+                  </a:txBody>
+                  <a:tcPr marL="6264" marR="6264" marT="6264" marB="0" anchor="b"/>
+                </a:tc>
+                <a:tc>
+                  <a:txBody>
+                    <a:bodyPr/>
+                    <a:lstStyle/>
+                    <a:p>
+                      <a:pPr algn="l" fontAlgn="b"/>
+                      <a:r>
+                        <a:rPr lang="es-ES" sz="900" u="none" strike="noStrike">
+                          <a:effectLst/>
+                        </a:rPr>
+                        <a:t>NXP</a:t>
+                      </a:r>
+                      <a:endParaRPr lang="es-ES" sz="900" b="0" i="0" u="none" strike="noStrike">
+                        <a:solidFill>
+                          <a:srgbClr val="000000"/>
+                        </a:solidFill>
+                        <a:effectLst/>
+                        <a:latin typeface="Aptos Narrow" panose="020B0004020202020204" pitchFamily="34" charset="0"/>
+                      </a:endParaRPr>
+                    </a:p>
+                  </a:txBody>
+                  <a:tcPr marL="6264" marR="6264" marT="6264" marB="0" anchor="b"/>
+                </a:tc>
+                <a:tc>
+                  <a:txBody>
+                    <a:bodyPr/>
+                    <a:lstStyle/>
+                    <a:p>
+                      <a:pPr algn="l" fontAlgn="b"/>
+                      <a:r>
+                        <a:rPr lang="es-ES" sz="900" u="none" strike="noStrike">
+                          <a:effectLst/>
+                        </a:rPr>
+                        <a:t>BC547B</a:t>
+                      </a:r>
+                      <a:endParaRPr lang="es-ES" sz="900" b="0" i="0" u="none" strike="noStrike">
+                        <a:solidFill>
+                          <a:srgbClr val="000000"/>
+                        </a:solidFill>
+                        <a:effectLst/>
+                        <a:latin typeface="Aptos Narrow" panose="020B0004020202020204" pitchFamily="34" charset="0"/>
+                      </a:endParaRPr>
+                    </a:p>
+                  </a:txBody>
+                  <a:tcPr marL="6264" marR="6264" marT="6264" marB="0" anchor="b"/>
+                </a:tc>
+                <a:tc>
+                  <a:txBody>
+                    <a:bodyPr/>
+                    <a:lstStyle/>
+                    <a:p>
+                      <a:pPr algn="l" fontAlgn="b"/>
+                      <a:r>
+                        <a:rPr lang="es-ES" sz="900" u="none" strike="noStrike">
+                          <a:effectLst/>
+                        </a:rPr>
+                        <a:t>bipolar transistor</a:t>
+                      </a:r>
+                      <a:endParaRPr lang="es-ES" sz="900" b="0" i="0" u="none" strike="noStrike">
+                        <a:solidFill>
+                          <a:srgbClr val="000000"/>
+                        </a:solidFill>
+                        <a:effectLst/>
+                        <a:latin typeface="Aptos Narrow" panose="020B0004020202020204" pitchFamily="34" charset="0"/>
+                      </a:endParaRPr>
+                    </a:p>
+                  </a:txBody>
+                  <a:tcPr marL="6264" marR="6264" marT="6264" marB="0" anchor="b">
+                    <a:lnR w="9525" cap="flat" cmpd="sng">
+                      <a:noFill/>
+                      <a:prstDash val="solid"/>
+                      <a:round/>
+                      <a:headEnd type="none" w="sm" len="sm"/>
+                      <a:tailEnd type="none" w="sm" len="sm"/>
+                    </a:lnR>
+                  </a:tcPr>
+                </a:tc>
+                <a:tc>
+                  <a:txBody>
+                    <a:bodyPr/>
+                    <a:lstStyle/>
+                    <a:p>
+                      <a:pPr algn="l" fontAlgn="b"/>
+                      <a:endParaRPr lang="es-ES" sz="900" b="0" i="0" u="none" strike="noStrike">
+                        <a:solidFill>
+                          <a:srgbClr val="000000"/>
+                        </a:solidFill>
+                        <a:effectLst/>
+                        <a:latin typeface="Aptos Narrow" panose="020B0004020202020204" pitchFamily="34" charset="0"/>
+                      </a:endParaRPr>
+                    </a:p>
+                  </a:txBody>
+                  <a:tcPr marL="6264" marR="6264" marT="6264" marB="0" anchor="b">
+                    <a:lnL w="9525" cap="flat" cmpd="sng">
+                      <a:noFill/>
+                      <a:prstDash val="solid"/>
+                      <a:round/>
+                      <a:headEnd type="none" w="sm" len="sm"/>
+                      <a:tailEnd type="none" w="sm" len="sm"/>
+                    </a:lnL>
+                    <a:lnR w="9525" cap="flat" cmpd="sng">
+                      <a:noFill/>
+                      <a:prstDash val="solid"/>
+                      <a:round/>
+                      <a:headEnd type="none" w="sm" len="sm"/>
+                      <a:tailEnd type="none" w="sm" len="sm"/>
+                    </a:lnR>
+                    <a:lnT w="9525" cap="flat" cmpd="sng">
+                      <a:noFill/>
+                      <a:prstDash val="solid"/>
+                      <a:round/>
+                      <a:headEnd type="none" w="sm" len="sm"/>
+                      <a:tailEnd type="none" w="sm" len="sm"/>
+                    </a:lnT>
+                    <a:lnB w="9525" cap="flat" cmpd="sng">
+                      <a:noFill/>
+                      <a:prstDash val="solid"/>
+                      <a:round/>
+                      <a:headEnd type="none" w="sm" len="sm"/>
+                      <a:tailEnd type="none" w="sm" len="sm"/>
+                    </a:lnB>
+                    <a:lnTlToBr w="12700" cmpd="sng">
+                      <a:noFill/>
+                      <a:prstDash val="solid"/>
+                    </a:lnTlToBr>
+                    <a:lnBlToTr w="12700" cmpd="sng">
+                      <a:noFill/>
+                      <a:prstDash val="solid"/>
+                    </a:lnBlToTr>
+                    <a:solidFill>
+                      <a:schemeClr val="tx1"/>
+                    </a:solidFill>
+                  </a:tcPr>
+                </a:tc>
+                <a:tc>
+                  <a:txBody>
+                    <a:bodyPr/>
+                    <a:lstStyle/>
+                    <a:p>
+                      <a:pPr algn="l" fontAlgn="b"/>
+                      <a:r>
+                        <a:rPr lang="es-ES" sz="900" u="none" strike="noStrike">
+                          <a:effectLst/>
+                        </a:rPr>
+                        <a:t>R12</a:t>
+                      </a:r>
+                      <a:endParaRPr lang="es-ES" sz="900" b="0" i="0" u="none" strike="noStrike">
+                        <a:solidFill>
+                          <a:srgbClr val="000000"/>
+                        </a:solidFill>
+                        <a:effectLst/>
+                        <a:latin typeface="Aptos Narrow" panose="020B0004020202020204" pitchFamily="34" charset="0"/>
+                      </a:endParaRPr>
+                    </a:p>
+                  </a:txBody>
+                  <a:tcPr marL="6264" marR="6264" marT="6264" marB="0" anchor="b">
+                    <a:lnL w="9525" cap="flat" cmpd="sng">
+                      <a:noFill/>
+                      <a:prstDash val="solid"/>
+                      <a:round/>
+                      <a:headEnd type="none" w="sm" len="sm"/>
+                      <a:tailEnd type="none" w="sm" len="sm"/>
+                    </a:lnL>
+                  </a:tcPr>
+                </a:tc>
+                <a:tc>
+                  <a:txBody>
+                    <a:bodyPr/>
+                    <a:lstStyle/>
+                    <a:p>
+                      <a:pPr algn="l" fontAlgn="b"/>
+                      <a:r>
+                        <a:rPr lang="es-ES" sz="900" u="none" strike="noStrike">
+                          <a:effectLst/>
+                        </a:rPr>
+                        <a:t>--</a:t>
+                      </a:r>
+                      <a:endParaRPr lang="es-ES" sz="900" b="0" i="0" u="none" strike="noStrike">
+                        <a:solidFill>
+                          <a:srgbClr val="000000"/>
+                        </a:solidFill>
+                        <a:effectLst/>
+                        <a:latin typeface="Aptos Narrow" panose="020B0004020202020204" pitchFamily="34" charset="0"/>
+                      </a:endParaRPr>
+                    </a:p>
+                  </a:txBody>
+                  <a:tcPr marL="6264" marR="6264" marT="6264" marB="0" anchor="b"/>
+                </a:tc>
+                <a:tc>
+                  <a:txBody>
+                    <a:bodyPr/>
+                    <a:lstStyle/>
+                    <a:p>
+                      <a:pPr algn="l" fontAlgn="b"/>
+                      <a:r>
+                        <a:rPr lang="es-ES" sz="900" u="none" strike="noStrike">
+                          <a:effectLst/>
+                        </a:rPr>
+                        <a:t>--</a:t>
+                      </a:r>
+                      <a:endParaRPr lang="es-ES" sz="900" b="0" i="0" u="none" strike="noStrike">
+                        <a:solidFill>
+                          <a:srgbClr val="000000"/>
+                        </a:solidFill>
+                        <a:effectLst/>
+                        <a:latin typeface="Aptos Narrow" panose="020B0004020202020204" pitchFamily="34" charset="0"/>
+                      </a:endParaRPr>
+                    </a:p>
+                  </a:txBody>
+                  <a:tcPr marL="6264" marR="6264" marT="6264" marB="0" anchor="b"/>
+                </a:tc>
+                <a:tc>
+                  <a:txBody>
+                    <a:bodyPr/>
+                    <a:lstStyle/>
+                    <a:p>
+                      <a:pPr algn="l" fontAlgn="b"/>
+                      <a:r>
+                        <a:rPr lang="es-ES" sz="900" u="none" strike="noStrike">
+                          <a:effectLst/>
+                        </a:rPr>
+                        <a:t>resistor, 5K</a:t>
+                      </a:r>
+                      <a:endParaRPr lang="es-ES" sz="900" b="0" i="0" u="none" strike="noStrike">
+                        <a:solidFill>
+                          <a:srgbClr val="000000"/>
+                        </a:solidFill>
+                        <a:effectLst/>
+                        <a:latin typeface="Aptos Narrow" panose="020B0004020202020204" pitchFamily="34" charset="0"/>
+                      </a:endParaRPr>
+                    </a:p>
+                  </a:txBody>
+                  <a:tcPr marL="6264" marR="6264" marT="6264" marB="0" anchor="b"/>
+                </a:tc>
+                <a:extLst>
+                  <a:ext uri="{0D108BD9-81ED-4DB2-BD59-A6C34878D82A}">
+                    <a16:rowId xmlns:a16="http://schemas.microsoft.com/office/drawing/2014/main" val="3427123851"/>
+                  </a:ext>
+                </a:extLst>
+              </a:tr>
+              <a:tr h="150326">
+                <a:tc>
+                  <a:txBody>
+                    <a:bodyPr/>
+                    <a:lstStyle/>
+                    <a:p>
+                      <a:pPr algn="l" fontAlgn="b"/>
+                      <a:r>
+                        <a:rPr lang="es-ES" sz="900" u="none" strike="noStrike">
+                          <a:effectLst/>
+                        </a:rPr>
+                        <a:t>R1</a:t>
+                      </a:r>
+                      <a:endParaRPr lang="es-ES" sz="900" b="0" i="0" u="none" strike="noStrike">
+                        <a:solidFill>
+                          <a:srgbClr val="000000"/>
+                        </a:solidFill>
+                        <a:effectLst/>
+                        <a:latin typeface="Aptos Narrow" panose="020B0004020202020204" pitchFamily="34" charset="0"/>
+                      </a:endParaRPr>
+                    </a:p>
+                  </a:txBody>
+                  <a:tcPr marL="6264" marR="6264" marT="6264" marB="0" anchor="b"/>
+                </a:tc>
+                <a:tc>
+                  <a:txBody>
+                    <a:bodyPr/>
+                    <a:lstStyle/>
+                    <a:p>
+                      <a:pPr algn="l" fontAlgn="b"/>
+                      <a:r>
+                        <a:rPr lang="es-ES" sz="900" u="none" strike="noStrike">
+                          <a:effectLst/>
+                        </a:rPr>
+                        <a:t>--</a:t>
+                      </a:r>
+                      <a:endParaRPr lang="es-ES" sz="900" b="0" i="0" u="none" strike="noStrike">
+                        <a:solidFill>
+                          <a:srgbClr val="000000"/>
+                        </a:solidFill>
+                        <a:effectLst/>
+                        <a:latin typeface="Aptos Narrow" panose="020B0004020202020204" pitchFamily="34" charset="0"/>
+                      </a:endParaRPr>
+                    </a:p>
+                  </a:txBody>
+                  <a:tcPr marL="6264" marR="6264" marT="6264" marB="0" anchor="b"/>
+                </a:tc>
+                <a:tc>
+                  <a:txBody>
+                    <a:bodyPr/>
+                    <a:lstStyle/>
+                    <a:p>
+                      <a:pPr algn="l" fontAlgn="b"/>
+                      <a:r>
+                        <a:rPr lang="es-ES" sz="900" u="none" strike="noStrike">
+                          <a:effectLst/>
+                        </a:rPr>
+                        <a:t>--</a:t>
+                      </a:r>
+                      <a:endParaRPr lang="es-ES" sz="900" b="0" i="0" u="none" strike="noStrike">
+                        <a:solidFill>
+                          <a:srgbClr val="000000"/>
+                        </a:solidFill>
+                        <a:effectLst/>
+                        <a:latin typeface="Aptos Narrow" panose="020B0004020202020204" pitchFamily="34" charset="0"/>
+                      </a:endParaRPr>
+                    </a:p>
+                  </a:txBody>
+                  <a:tcPr marL="6264" marR="6264" marT="6264" marB="0" anchor="b"/>
+                </a:tc>
+                <a:tc>
+                  <a:txBody>
+                    <a:bodyPr/>
+                    <a:lstStyle/>
+                    <a:p>
+                      <a:pPr algn="l" fontAlgn="b"/>
+                      <a:r>
+                        <a:rPr lang="es-ES" sz="900" u="none" strike="noStrike">
+                          <a:effectLst/>
+                        </a:rPr>
+                        <a:t>resistor, 4K</a:t>
+                      </a:r>
+                      <a:endParaRPr lang="es-ES" sz="900" b="0" i="0" u="none" strike="noStrike">
+                        <a:solidFill>
+                          <a:srgbClr val="000000"/>
+                        </a:solidFill>
+                        <a:effectLst/>
+                        <a:latin typeface="Aptos Narrow" panose="020B0004020202020204" pitchFamily="34" charset="0"/>
+                      </a:endParaRPr>
+                    </a:p>
+                  </a:txBody>
+                  <a:tcPr marL="6264" marR="6264" marT="6264" marB="0" anchor="b">
+                    <a:lnR w="9525" cap="flat" cmpd="sng">
+                      <a:noFill/>
+                      <a:prstDash val="solid"/>
+                      <a:round/>
+                      <a:headEnd type="none" w="sm" len="sm"/>
+                      <a:tailEnd type="none" w="sm" len="sm"/>
+                    </a:lnR>
+                  </a:tcPr>
+                </a:tc>
+                <a:tc>
+                  <a:txBody>
+                    <a:bodyPr/>
+                    <a:lstStyle/>
+                    <a:p>
+                      <a:pPr algn="l" fontAlgn="b"/>
+                      <a:endParaRPr lang="es-ES" sz="900" b="0" i="0" u="none" strike="noStrike">
+                        <a:solidFill>
+                          <a:srgbClr val="000000"/>
+                        </a:solidFill>
+                        <a:effectLst/>
+                        <a:latin typeface="Aptos Narrow" panose="020B0004020202020204" pitchFamily="34" charset="0"/>
+                      </a:endParaRPr>
+                    </a:p>
+                  </a:txBody>
+                  <a:tcPr marL="6264" marR="6264" marT="6264" marB="0" anchor="b">
+                    <a:lnL w="9525" cap="flat" cmpd="sng">
+                      <a:noFill/>
+                      <a:prstDash val="solid"/>
+                      <a:round/>
+                      <a:headEnd type="none" w="sm" len="sm"/>
+                      <a:tailEnd type="none" w="sm" len="sm"/>
+                    </a:lnL>
+                    <a:lnR w="9525" cap="flat" cmpd="sng">
+                      <a:noFill/>
+                      <a:prstDash val="solid"/>
+                      <a:round/>
+                      <a:headEnd type="none" w="sm" len="sm"/>
+                      <a:tailEnd type="none" w="sm" len="sm"/>
+                    </a:lnR>
+                    <a:lnT w="9525" cap="flat" cmpd="sng">
+                      <a:noFill/>
+                      <a:prstDash val="solid"/>
+                      <a:round/>
+                      <a:headEnd type="none" w="sm" len="sm"/>
+                      <a:tailEnd type="none" w="sm" len="sm"/>
+                    </a:lnT>
+                    <a:lnB w="9525" cap="flat" cmpd="sng">
+                      <a:noFill/>
+                      <a:prstDash val="solid"/>
+                      <a:round/>
+                      <a:headEnd type="none" w="sm" len="sm"/>
+                      <a:tailEnd type="none" w="sm" len="sm"/>
+                    </a:lnB>
+                    <a:lnTlToBr w="12700" cmpd="sng">
+                      <a:noFill/>
+                      <a:prstDash val="solid"/>
+                    </a:lnTlToBr>
+                    <a:lnBlToTr w="12700" cmpd="sng">
+                      <a:noFill/>
+                      <a:prstDash val="solid"/>
+                    </a:lnBlToTr>
+                    <a:solidFill>
+                      <a:schemeClr val="tx1"/>
+                    </a:solidFill>
+                  </a:tcPr>
+                </a:tc>
+                <a:tc>
+                  <a:txBody>
+                    <a:bodyPr/>
+                    <a:lstStyle/>
+                    <a:p>
+                      <a:pPr algn="l" fontAlgn="b"/>
+                      <a:r>
+                        <a:rPr lang="es-ES" sz="900" u="none" strike="noStrike">
+                          <a:effectLst/>
+                        </a:rPr>
+                        <a:t>R13</a:t>
+                      </a:r>
+                      <a:endParaRPr lang="es-ES" sz="900" b="0" i="0" u="none" strike="noStrike">
+                        <a:solidFill>
+                          <a:srgbClr val="000000"/>
+                        </a:solidFill>
+                        <a:effectLst/>
+                        <a:latin typeface="Aptos Narrow" panose="020B0004020202020204" pitchFamily="34" charset="0"/>
+                      </a:endParaRPr>
+                    </a:p>
+                  </a:txBody>
+                  <a:tcPr marL="6264" marR="6264" marT="6264" marB="0" anchor="b">
+                    <a:lnL w="9525" cap="flat" cmpd="sng">
+                      <a:noFill/>
+                      <a:prstDash val="solid"/>
+                      <a:round/>
+                      <a:headEnd type="none" w="sm" len="sm"/>
+                      <a:tailEnd type="none" w="sm" len="sm"/>
+                    </a:lnL>
+                  </a:tcPr>
+                </a:tc>
+                <a:tc>
+                  <a:txBody>
+                    <a:bodyPr/>
+                    <a:lstStyle/>
+                    <a:p>
+                      <a:pPr algn="l" fontAlgn="b"/>
+                      <a:r>
+                        <a:rPr lang="es-ES" sz="900" u="none" strike="noStrike">
+                          <a:effectLst/>
+                        </a:rPr>
+                        <a:t>--</a:t>
+                      </a:r>
+                      <a:endParaRPr lang="es-ES" sz="900" b="0" i="0" u="none" strike="noStrike">
+                        <a:solidFill>
+                          <a:srgbClr val="000000"/>
+                        </a:solidFill>
+                        <a:effectLst/>
+                        <a:latin typeface="Aptos Narrow" panose="020B0004020202020204" pitchFamily="34" charset="0"/>
+                      </a:endParaRPr>
+                    </a:p>
+                  </a:txBody>
+                  <a:tcPr marL="6264" marR="6264" marT="6264" marB="0" anchor="b"/>
+                </a:tc>
+                <a:tc>
+                  <a:txBody>
+                    <a:bodyPr/>
+                    <a:lstStyle/>
+                    <a:p>
+                      <a:pPr algn="l" fontAlgn="b"/>
+                      <a:r>
+                        <a:rPr lang="es-ES" sz="900" u="none" strike="noStrike">
+                          <a:effectLst/>
+                        </a:rPr>
+                        <a:t>--</a:t>
+                      </a:r>
+                      <a:endParaRPr lang="es-ES" sz="900" b="0" i="0" u="none" strike="noStrike">
+                        <a:solidFill>
+                          <a:srgbClr val="000000"/>
+                        </a:solidFill>
+                        <a:effectLst/>
+                        <a:latin typeface="Aptos Narrow" panose="020B0004020202020204" pitchFamily="34" charset="0"/>
+                      </a:endParaRPr>
+                    </a:p>
+                  </a:txBody>
+                  <a:tcPr marL="6264" marR="6264" marT="6264" marB="0" anchor="b"/>
+                </a:tc>
+                <a:tc>
+                  <a:txBody>
+                    <a:bodyPr/>
+                    <a:lstStyle/>
+                    <a:p>
+                      <a:pPr algn="l" fontAlgn="b"/>
+                      <a:r>
+                        <a:rPr lang="es-ES" sz="900" u="none" strike="noStrike">
+                          <a:effectLst/>
+                        </a:rPr>
+                        <a:t>resistor, 1K</a:t>
+                      </a:r>
+                      <a:endParaRPr lang="es-ES" sz="900" b="0" i="0" u="none" strike="noStrike">
+                        <a:solidFill>
+                          <a:srgbClr val="000000"/>
+                        </a:solidFill>
+                        <a:effectLst/>
+                        <a:latin typeface="Aptos Narrow" panose="020B0004020202020204" pitchFamily="34" charset="0"/>
+                      </a:endParaRPr>
+                    </a:p>
+                  </a:txBody>
+                  <a:tcPr marL="6264" marR="6264" marT="6264" marB="0" anchor="b"/>
+                </a:tc>
+                <a:extLst>
+                  <a:ext uri="{0D108BD9-81ED-4DB2-BD59-A6C34878D82A}">
+                    <a16:rowId xmlns:a16="http://schemas.microsoft.com/office/drawing/2014/main" val="3844116355"/>
+                  </a:ext>
+                </a:extLst>
+              </a:tr>
+              <a:tr h="150326">
+                <a:tc>
+                  <a:txBody>
+                    <a:bodyPr/>
+                    <a:lstStyle/>
+                    <a:p>
+                      <a:pPr algn="l" fontAlgn="b"/>
+                      <a:r>
+                        <a:rPr lang="es-ES" sz="900" u="none" strike="noStrike">
+                          <a:effectLst/>
+                        </a:rPr>
+                        <a:t>R2</a:t>
+                      </a:r>
+                      <a:endParaRPr lang="es-ES" sz="900" b="0" i="0" u="none" strike="noStrike">
+                        <a:solidFill>
+                          <a:srgbClr val="000000"/>
+                        </a:solidFill>
+                        <a:effectLst/>
+                        <a:latin typeface="Aptos Narrow" panose="020B0004020202020204" pitchFamily="34" charset="0"/>
+                      </a:endParaRPr>
+                    </a:p>
+                  </a:txBody>
+                  <a:tcPr marL="6264" marR="6264" marT="6264" marB="0" anchor="b"/>
+                </a:tc>
+                <a:tc>
+                  <a:txBody>
+                    <a:bodyPr/>
+                    <a:lstStyle/>
+                    <a:p>
+                      <a:pPr algn="l" fontAlgn="b"/>
+                      <a:r>
+                        <a:rPr lang="es-ES" sz="900" u="none" strike="noStrike">
+                          <a:effectLst/>
+                        </a:rPr>
+                        <a:t>--</a:t>
+                      </a:r>
+                      <a:endParaRPr lang="es-ES" sz="900" b="0" i="0" u="none" strike="noStrike">
+                        <a:solidFill>
+                          <a:srgbClr val="000000"/>
+                        </a:solidFill>
+                        <a:effectLst/>
+                        <a:latin typeface="Aptos Narrow" panose="020B0004020202020204" pitchFamily="34" charset="0"/>
+                      </a:endParaRPr>
+                    </a:p>
+                  </a:txBody>
+                  <a:tcPr marL="6264" marR="6264" marT="6264" marB="0" anchor="b"/>
+                </a:tc>
+                <a:tc>
+                  <a:txBody>
+                    <a:bodyPr/>
+                    <a:lstStyle/>
+                    <a:p>
+                      <a:pPr algn="l" fontAlgn="b"/>
+                      <a:r>
+                        <a:rPr lang="es-ES" sz="900" u="none" strike="noStrike">
+                          <a:effectLst/>
+                        </a:rPr>
+                        <a:t>--</a:t>
+                      </a:r>
+                      <a:endParaRPr lang="es-ES" sz="900" b="0" i="0" u="none" strike="noStrike">
+                        <a:solidFill>
+                          <a:srgbClr val="000000"/>
+                        </a:solidFill>
+                        <a:effectLst/>
+                        <a:latin typeface="Aptos Narrow" panose="020B0004020202020204" pitchFamily="34" charset="0"/>
+                      </a:endParaRPr>
+                    </a:p>
+                  </a:txBody>
+                  <a:tcPr marL="6264" marR="6264" marT="6264" marB="0" anchor="b"/>
+                </a:tc>
+                <a:tc>
+                  <a:txBody>
+                    <a:bodyPr/>
+                    <a:lstStyle/>
+                    <a:p>
+                      <a:pPr algn="l" fontAlgn="b"/>
+                      <a:r>
+                        <a:rPr lang="es-ES" sz="900" u="none" strike="noStrike">
+                          <a:effectLst/>
+                        </a:rPr>
+                        <a:t>resistor, 14K</a:t>
+                      </a:r>
+                      <a:endParaRPr lang="es-ES" sz="900" b="0" i="0" u="none" strike="noStrike">
+                        <a:solidFill>
+                          <a:srgbClr val="000000"/>
+                        </a:solidFill>
+                        <a:effectLst/>
+                        <a:latin typeface="Aptos Narrow" panose="020B0004020202020204" pitchFamily="34" charset="0"/>
+                      </a:endParaRPr>
+                    </a:p>
+                  </a:txBody>
+                  <a:tcPr marL="6264" marR="6264" marT="6264" marB="0" anchor="b">
+                    <a:lnR w="9525" cap="flat" cmpd="sng">
+                      <a:noFill/>
+                      <a:prstDash val="solid"/>
+                      <a:round/>
+                      <a:headEnd type="none" w="sm" len="sm"/>
+                      <a:tailEnd type="none" w="sm" len="sm"/>
+                    </a:lnR>
+                  </a:tcPr>
+                </a:tc>
+                <a:tc>
+                  <a:txBody>
+                    <a:bodyPr/>
+                    <a:lstStyle/>
+                    <a:p>
+                      <a:pPr algn="l" fontAlgn="b"/>
+                      <a:endParaRPr lang="es-ES" sz="900" b="0" i="0" u="none" strike="noStrike" dirty="0">
+                        <a:solidFill>
+                          <a:srgbClr val="000000"/>
+                        </a:solidFill>
+                        <a:effectLst/>
+                        <a:latin typeface="Aptos Narrow" panose="020B0004020202020204" pitchFamily="34" charset="0"/>
+                      </a:endParaRPr>
+                    </a:p>
+                  </a:txBody>
+                  <a:tcPr marL="6264" marR="6264" marT="6264" marB="0" anchor="b">
+                    <a:lnL w="9525" cap="flat" cmpd="sng">
+                      <a:noFill/>
+                      <a:prstDash val="solid"/>
+                      <a:round/>
+                      <a:headEnd type="none" w="sm" len="sm"/>
+                      <a:tailEnd type="none" w="sm" len="sm"/>
+                    </a:lnL>
+                    <a:lnR w="9525" cap="flat" cmpd="sng">
+                      <a:noFill/>
+                      <a:prstDash val="solid"/>
+                      <a:round/>
+                      <a:headEnd type="none" w="sm" len="sm"/>
+                      <a:tailEnd type="none" w="sm" len="sm"/>
+                    </a:lnR>
+                    <a:lnT w="9525" cap="flat" cmpd="sng">
+                      <a:noFill/>
+                      <a:prstDash val="solid"/>
+                      <a:round/>
+                      <a:headEnd type="none" w="sm" len="sm"/>
+                      <a:tailEnd type="none" w="sm" len="sm"/>
+                    </a:lnT>
+                    <a:lnB w="9525" cap="flat" cmpd="sng">
+                      <a:noFill/>
+                      <a:prstDash val="solid"/>
+                      <a:round/>
+                      <a:headEnd type="none" w="sm" len="sm"/>
+                      <a:tailEnd type="none" w="sm" len="sm"/>
+                    </a:lnB>
+                    <a:lnTlToBr w="12700" cmpd="sng">
+                      <a:noFill/>
+                      <a:prstDash val="solid"/>
+                    </a:lnTlToBr>
+                    <a:lnBlToTr w="12700" cmpd="sng">
+                      <a:noFill/>
+                      <a:prstDash val="solid"/>
+                    </a:lnBlToTr>
+                    <a:solidFill>
+                      <a:schemeClr val="tx1"/>
+                    </a:solidFill>
+                  </a:tcPr>
+                </a:tc>
+                <a:tc>
+                  <a:txBody>
+                    <a:bodyPr/>
+                    <a:lstStyle/>
+                    <a:p>
+                      <a:pPr algn="l" fontAlgn="b"/>
+                      <a:r>
+                        <a:rPr lang="es-ES" sz="900" u="none" strike="noStrike">
+                          <a:effectLst/>
+                        </a:rPr>
+                        <a:t>R14</a:t>
+                      </a:r>
+                      <a:endParaRPr lang="es-ES" sz="900" b="0" i="0" u="none" strike="noStrike">
+                        <a:solidFill>
+                          <a:srgbClr val="000000"/>
+                        </a:solidFill>
+                        <a:effectLst/>
+                        <a:latin typeface="Aptos Narrow" panose="020B0004020202020204" pitchFamily="34" charset="0"/>
+                      </a:endParaRPr>
+                    </a:p>
+                  </a:txBody>
+                  <a:tcPr marL="6264" marR="6264" marT="6264" marB="0" anchor="b">
+                    <a:lnL w="9525" cap="flat" cmpd="sng">
+                      <a:noFill/>
+                      <a:prstDash val="solid"/>
+                      <a:round/>
+                      <a:headEnd type="none" w="sm" len="sm"/>
+                      <a:tailEnd type="none" w="sm" len="sm"/>
+                    </a:lnL>
+                  </a:tcPr>
+                </a:tc>
+                <a:tc>
+                  <a:txBody>
+                    <a:bodyPr/>
+                    <a:lstStyle/>
+                    <a:p>
+                      <a:pPr algn="l" fontAlgn="b"/>
+                      <a:r>
+                        <a:rPr lang="es-ES" sz="900" u="none" strike="noStrike">
+                          <a:effectLst/>
+                        </a:rPr>
+                        <a:t>--</a:t>
+                      </a:r>
+                      <a:endParaRPr lang="es-ES" sz="900" b="0" i="0" u="none" strike="noStrike">
+                        <a:solidFill>
+                          <a:srgbClr val="000000"/>
+                        </a:solidFill>
+                        <a:effectLst/>
+                        <a:latin typeface="Aptos Narrow" panose="020B0004020202020204" pitchFamily="34" charset="0"/>
+                      </a:endParaRPr>
+                    </a:p>
+                  </a:txBody>
+                  <a:tcPr marL="6264" marR="6264" marT="6264" marB="0" anchor="b"/>
+                </a:tc>
+                <a:tc>
+                  <a:txBody>
+                    <a:bodyPr/>
+                    <a:lstStyle/>
+                    <a:p>
+                      <a:pPr algn="l" fontAlgn="b"/>
+                      <a:r>
+                        <a:rPr lang="es-ES" sz="900" u="none" strike="noStrike">
+                          <a:effectLst/>
+                        </a:rPr>
+                        <a:t>--</a:t>
+                      </a:r>
+                      <a:endParaRPr lang="es-ES" sz="900" b="0" i="0" u="none" strike="noStrike">
+                        <a:solidFill>
+                          <a:srgbClr val="000000"/>
+                        </a:solidFill>
+                        <a:effectLst/>
+                        <a:latin typeface="Aptos Narrow" panose="020B0004020202020204" pitchFamily="34" charset="0"/>
+                      </a:endParaRPr>
+                    </a:p>
+                  </a:txBody>
+                  <a:tcPr marL="6264" marR="6264" marT="6264" marB="0" anchor="b"/>
+                </a:tc>
+                <a:tc>
+                  <a:txBody>
+                    <a:bodyPr/>
+                    <a:lstStyle/>
+                    <a:p>
+                      <a:pPr algn="l" fontAlgn="b"/>
+                      <a:r>
+                        <a:rPr lang="es-ES" sz="900" u="none" strike="noStrike">
+                          <a:effectLst/>
+                        </a:rPr>
+                        <a:t>resistor, 1K</a:t>
+                      </a:r>
+                      <a:endParaRPr lang="es-ES" sz="900" b="0" i="0" u="none" strike="noStrike">
+                        <a:solidFill>
+                          <a:srgbClr val="000000"/>
+                        </a:solidFill>
+                        <a:effectLst/>
+                        <a:latin typeface="Aptos Narrow" panose="020B0004020202020204" pitchFamily="34" charset="0"/>
+                      </a:endParaRPr>
+                    </a:p>
+                  </a:txBody>
+                  <a:tcPr marL="6264" marR="6264" marT="6264" marB="0" anchor="b"/>
+                </a:tc>
+                <a:extLst>
+                  <a:ext uri="{0D108BD9-81ED-4DB2-BD59-A6C34878D82A}">
+                    <a16:rowId xmlns:a16="http://schemas.microsoft.com/office/drawing/2014/main" val="3475805758"/>
+                  </a:ext>
+                </a:extLst>
+              </a:tr>
+              <a:tr h="281860">
+                <a:tc>
+                  <a:txBody>
+                    <a:bodyPr/>
+                    <a:lstStyle/>
+                    <a:p>
+                      <a:pPr algn="l" fontAlgn="b"/>
+                      <a:r>
+                        <a:rPr lang="es-ES" sz="900" u="none" strike="noStrike">
+                          <a:effectLst/>
+                        </a:rPr>
+                        <a:t>R3</a:t>
+                      </a:r>
+                      <a:endParaRPr lang="es-ES" sz="900" b="0" i="0" u="none" strike="noStrike">
+                        <a:solidFill>
+                          <a:srgbClr val="000000"/>
+                        </a:solidFill>
+                        <a:effectLst/>
+                        <a:latin typeface="Aptos Narrow" panose="020B0004020202020204" pitchFamily="34" charset="0"/>
+                      </a:endParaRPr>
+                    </a:p>
+                  </a:txBody>
+                  <a:tcPr marL="6264" marR="6264" marT="6264" marB="0" anchor="b"/>
+                </a:tc>
+                <a:tc>
+                  <a:txBody>
+                    <a:bodyPr/>
+                    <a:lstStyle/>
+                    <a:p>
+                      <a:pPr algn="l" fontAlgn="b"/>
+                      <a:r>
+                        <a:rPr lang="es-ES" sz="900" u="none" strike="noStrike">
+                          <a:effectLst/>
+                        </a:rPr>
+                        <a:t>--</a:t>
+                      </a:r>
+                      <a:endParaRPr lang="es-ES" sz="900" b="0" i="0" u="none" strike="noStrike">
+                        <a:solidFill>
+                          <a:srgbClr val="000000"/>
+                        </a:solidFill>
+                        <a:effectLst/>
+                        <a:latin typeface="Aptos Narrow" panose="020B0004020202020204" pitchFamily="34" charset="0"/>
+                      </a:endParaRPr>
+                    </a:p>
+                  </a:txBody>
+                  <a:tcPr marL="6264" marR="6264" marT="6264" marB="0" anchor="b"/>
+                </a:tc>
+                <a:tc>
+                  <a:txBody>
+                    <a:bodyPr/>
+                    <a:lstStyle/>
+                    <a:p>
+                      <a:pPr algn="l" fontAlgn="b"/>
+                      <a:r>
+                        <a:rPr lang="es-ES" sz="900" u="none" strike="noStrike">
+                          <a:effectLst/>
+                        </a:rPr>
+                        <a:t>--</a:t>
+                      </a:r>
+                      <a:endParaRPr lang="es-ES" sz="900" b="0" i="0" u="none" strike="noStrike">
+                        <a:solidFill>
+                          <a:srgbClr val="000000"/>
+                        </a:solidFill>
+                        <a:effectLst/>
+                        <a:latin typeface="Aptos Narrow" panose="020B0004020202020204" pitchFamily="34" charset="0"/>
+                      </a:endParaRPr>
+                    </a:p>
+                  </a:txBody>
+                  <a:tcPr marL="6264" marR="6264" marT="6264" marB="0" anchor="b"/>
+                </a:tc>
+                <a:tc>
+                  <a:txBody>
+                    <a:bodyPr/>
+                    <a:lstStyle/>
+                    <a:p>
+                      <a:pPr algn="l" fontAlgn="b"/>
+                      <a:r>
+                        <a:rPr lang="es-ES" sz="900" u="none" strike="noStrike">
+                          <a:effectLst/>
+                        </a:rPr>
+                        <a:t>resistor, 10K</a:t>
+                      </a:r>
+                      <a:endParaRPr lang="es-ES" sz="900" b="0" i="0" u="none" strike="noStrike">
+                        <a:solidFill>
+                          <a:srgbClr val="000000"/>
+                        </a:solidFill>
+                        <a:effectLst/>
+                        <a:latin typeface="Aptos Narrow" panose="020B0004020202020204" pitchFamily="34" charset="0"/>
+                      </a:endParaRPr>
+                    </a:p>
+                  </a:txBody>
+                  <a:tcPr marL="6264" marR="6264" marT="6264" marB="0" anchor="b">
+                    <a:lnR w="9525" cap="flat" cmpd="sng">
+                      <a:noFill/>
+                      <a:prstDash val="solid"/>
+                      <a:round/>
+                      <a:headEnd type="none" w="sm" len="sm"/>
+                      <a:tailEnd type="none" w="sm" len="sm"/>
+                    </a:lnR>
+                  </a:tcPr>
+                </a:tc>
+                <a:tc>
+                  <a:txBody>
+                    <a:bodyPr/>
+                    <a:lstStyle/>
+                    <a:p>
+                      <a:pPr algn="l" fontAlgn="b"/>
+                      <a:endParaRPr lang="es-ES" sz="900" b="0" i="0" u="none" strike="noStrike" dirty="0">
+                        <a:solidFill>
+                          <a:srgbClr val="000000"/>
+                        </a:solidFill>
+                        <a:effectLst/>
+                        <a:latin typeface="Aptos Narrow" panose="020B0004020202020204" pitchFamily="34" charset="0"/>
+                      </a:endParaRPr>
+                    </a:p>
+                  </a:txBody>
+                  <a:tcPr marL="6264" marR="6264" marT="6264" marB="0" anchor="b">
+                    <a:lnL w="9525" cap="flat" cmpd="sng">
+                      <a:noFill/>
+                      <a:prstDash val="solid"/>
+                      <a:round/>
+                      <a:headEnd type="none" w="sm" len="sm"/>
+                      <a:tailEnd type="none" w="sm" len="sm"/>
+                    </a:lnL>
+                    <a:lnR w="9525" cap="flat" cmpd="sng">
+                      <a:noFill/>
+                      <a:prstDash val="solid"/>
+                      <a:round/>
+                      <a:headEnd type="none" w="sm" len="sm"/>
+                      <a:tailEnd type="none" w="sm" len="sm"/>
+                    </a:lnR>
+                    <a:lnT w="9525" cap="flat" cmpd="sng">
+                      <a:noFill/>
+                      <a:prstDash val="solid"/>
+                      <a:round/>
+                      <a:headEnd type="none" w="sm" len="sm"/>
+                      <a:tailEnd type="none" w="sm" len="sm"/>
+                    </a:lnT>
+                    <a:lnB w="9525" cap="flat" cmpd="sng">
+                      <a:noFill/>
+                      <a:prstDash val="solid"/>
+                      <a:round/>
+                      <a:headEnd type="none" w="sm" len="sm"/>
+                      <a:tailEnd type="none" w="sm" len="sm"/>
+                    </a:lnB>
+                    <a:lnTlToBr w="12700" cmpd="sng">
+                      <a:noFill/>
+                      <a:prstDash val="solid"/>
+                    </a:lnTlToBr>
+                    <a:lnBlToTr w="12700" cmpd="sng">
+                      <a:noFill/>
+                      <a:prstDash val="solid"/>
+                    </a:lnBlToTr>
+                    <a:solidFill>
+                      <a:schemeClr val="tx1"/>
+                    </a:solidFill>
+                  </a:tcPr>
+                </a:tc>
+                <a:tc>
+                  <a:txBody>
+                    <a:bodyPr/>
+                    <a:lstStyle/>
+                    <a:p>
+                      <a:pPr algn="l" fontAlgn="b"/>
+                      <a:r>
+                        <a:rPr lang="es-ES" sz="900" u="none" strike="noStrike">
+                          <a:effectLst/>
+                        </a:rPr>
+                        <a:t>U2</a:t>
+                      </a:r>
+                      <a:endParaRPr lang="es-ES" sz="900" b="0" i="0" u="none" strike="noStrike">
+                        <a:solidFill>
+                          <a:srgbClr val="000000"/>
+                        </a:solidFill>
+                        <a:effectLst/>
+                        <a:latin typeface="Aptos Narrow" panose="020B0004020202020204" pitchFamily="34" charset="0"/>
+                      </a:endParaRPr>
+                    </a:p>
+                  </a:txBody>
+                  <a:tcPr marL="6264" marR="6264" marT="6264" marB="0" anchor="b">
+                    <a:lnL w="9525" cap="flat" cmpd="sng">
+                      <a:noFill/>
+                      <a:prstDash val="solid"/>
+                      <a:round/>
+                      <a:headEnd type="none" w="sm" len="sm"/>
+                      <a:tailEnd type="none" w="sm" len="sm"/>
+                    </a:lnL>
+                  </a:tcPr>
+                </a:tc>
+                <a:tc>
+                  <a:txBody>
+                    <a:bodyPr/>
+                    <a:lstStyle/>
+                    <a:p>
+                      <a:pPr algn="l" fontAlgn="b"/>
+                      <a:r>
+                        <a:rPr lang="es-ES" sz="900" u="none" strike="noStrike">
+                          <a:effectLst/>
+                        </a:rPr>
+                        <a:t>Analog Devices</a:t>
+                      </a:r>
+                      <a:endParaRPr lang="es-ES" sz="900" b="0" i="0" u="none" strike="noStrike">
+                        <a:solidFill>
+                          <a:srgbClr val="000000"/>
+                        </a:solidFill>
+                        <a:effectLst/>
+                        <a:latin typeface="Aptos Narrow" panose="020B0004020202020204" pitchFamily="34" charset="0"/>
+                      </a:endParaRPr>
+                    </a:p>
+                  </a:txBody>
+                  <a:tcPr marL="6264" marR="6264" marT="6264" marB="0" anchor="b"/>
+                </a:tc>
+                <a:tc>
+                  <a:txBody>
+                    <a:bodyPr/>
+                    <a:lstStyle/>
+                    <a:p>
+                      <a:pPr algn="l" fontAlgn="b"/>
+                      <a:r>
+                        <a:rPr lang="es-ES" sz="900" u="none" strike="noStrike">
+                          <a:effectLst/>
+                        </a:rPr>
+                        <a:t>OP07</a:t>
+                      </a:r>
+                      <a:endParaRPr lang="es-ES" sz="900" b="0" i="0" u="none" strike="noStrike">
+                        <a:solidFill>
+                          <a:srgbClr val="000000"/>
+                        </a:solidFill>
+                        <a:effectLst/>
+                        <a:latin typeface="Aptos Narrow" panose="020B0004020202020204" pitchFamily="34" charset="0"/>
+                      </a:endParaRPr>
+                    </a:p>
+                  </a:txBody>
+                  <a:tcPr marL="6264" marR="6264" marT="6264" marB="0" anchor="b"/>
+                </a:tc>
+                <a:tc>
+                  <a:txBody>
+                    <a:bodyPr/>
+                    <a:lstStyle/>
+                    <a:p>
+                      <a:pPr algn="l" fontAlgn="b"/>
+                      <a:r>
+                        <a:rPr lang="es-ES" sz="900" u="none" strike="noStrike">
+                          <a:effectLst/>
+                        </a:rPr>
+                        <a:t>integrated circuit</a:t>
+                      </a:r>
+                      <a:endParaRPr lang="es-ES" sz="900" b="0" i="0" u="none" strike="noStrike">
+                        <a:solidFill>
+                          <a:srgbClr val="000000"/>
+                        </a:solidFill>
+                        <a:effectLst/>
+                        <a:latin typeface="Aptos Narrow" panose="020B0004020202020204" pitchFamily="34" charset="0"/>
+                      </a:endParaRPr>
+                    </a:p>
+                  </a:txBody>
+                  <a:tcPr marL="6264" marR="6264" marT="6264" marB="0" anchor="b"/>
+                </a:tc>
+                <a:extLst>
+                  <a:ext uri="{0D108BD9-81ED-4DB2-BD59-A6C34878D82A}">
+                    <a16:rowId xmlns:a16="http://schemas.microsoft.com/office/drawing/2014/main" val="3989044419"/>
+                  </a:ext>
+                </a:extLst>
+              </a:tr>
+              <a:tr h="281860">
+                <a:tc>
+                  <a:txBody>
+                    <a:bodyPr/>
+                    <a:lstStyle/>
+                    <a:p>
+                      <a:pPr algn="l" fontAlgn="b"/>
+                      <a:r>
+                        <a:rPr lang="es-ES" sz="900" u="none" strike="noStrike">
+                          <a:effectLst/>
+                        </a:rPr>
+                        <a:t>R4</a:t>
+                      </a:r>
+                      <a:endParaRPr lang="es-ES" sz="900" b="0" i="0" u="none" strike="noStrike">
+                        <a:solidFill>
+                          <a:srgbClr val="000000"/>
+                        </a:solidFill>
+                        <a:effectLst/>
+                        <a:latin typeface="Aptos Narrow" panose="020B0004020202020204" pitchFamily="34" charset="0"/>
+                      </a:endParaRPr>
+                    </a:p>
+                  </a:txBody>
+                  <a:tcPr marL="6264" marR="6264" marT="6264" marB="0" anchor="b"/>
+                </a:tc>
+                <a:tc>
+                  <a:txBody>
+                    <a:bodyPr/>
+                    <a:lstStyle/>
+                    <a:p>
+                      <a:pPr algn="l" fontAlgn="b"/>
+                      <a:r>
+                        <a:rPr lang="es-ES" sz="900" u="none" strike="noStrike">
+                          <a:effectLst/>
+                        </a:rPr>
+                        <a:t>--</a:t>
+                      </a:r>
+                      <a:endParaRPr lang="es-ES" sz="900" b="0" i="0" u="none" strike="noStrike">
+                        <a:solidFill>
+                          <a:srgbClr val="000000"/>
+                        </a:solidFill>
+                        <a:effectLst/>
+                        <a:latin typeface="Aptos Narrow" panose="020B0004020202020204" pitchFamily="34" charset="0"/>
+                      </a:endParaRPr>
+                    </a:p>
+                  </a:txBody>
+                  <a:tcPr marL="6264" marR="6264" marT="6264" marB="0" anchor="b"/>
+                </a:tc>
+                <a:tc>
+                  <a:txBody>
+                    <a:bodyPr/>
+                    <a:lstStyle/>
+                    <a:p>
+                      <a:pPr algn="l" fontAlgn="b"/>
+                      <a:r>
+                        <a:rPr lang="es-ES" sz="900" u="none" strike="noStrike">
+                          <a:effectLst/>
+                        </a:rPr>
+                        <a:t>--</a:t>
+                      </a:r>
+                      <a:endParaRPr lang="es-ES" sz="900" b="0" i="0" u="none" strike="noStrike">
+                        <a:solidFill>
+                          <a:srgbClr val="000000"/>
+                        </a:solidFill>
+                        <a:effectLst/>
+                        <a:latin typeface="Aptos Narrow" panose="020B0004020202020204" pitchFamily="34" charset="0"/>
+                      </a:endParaRPr>
+                    </a:p>
+                  </a:txBody>
+                  <a:tcPr marL="6264" marR="6264" marT="6264" marB="0" anchor="b"/>
+                </a:tc>
+                <a:tc>
+                  <a:txBody>
+                    <a:bodyPr/>
+                    <a:lstStyle/>
+                    <a:p>
+                      <a:pPr algn="l" fontAlgn="b"/>
+                      <a:r>
+                        <a:rPr lang="es-ES" sz="900" u="none" strike="noStrike">
+                          <a:effectLst/>
+                        </a:rPr>
+                        <a:t>resistor, 6.2</a:t>
+                      </a:r>
+                      <a:endParaRPr lang="es-ES" sz="900" b="0" i="0" u="none" strike="noStrike">
+                        <a:solidFill>
+                          <a:srgbClr val="000000"/>
+                        </a:solidFill>
+                        <a:effectLst/>
+                        <a:latin typeface="Aptos Narrow" panose="020B0004020202020204" pitchFamily="34" charset="0"/>
+                      </a:endParaRPr>
+                    </a:p>
+                  </a:txBody>
+                  <a:tcPr marL="6264" marR="6264" marT="6264" marB="0" anchor="b">
+                    <a:lnR w="9525" cap="flat" cmpd="sng">
+                      <a:noFill/>
+                      <a:prstDash val="solid"/>
+                      <a:round/>
+                      <a:headEnd type="none" w="sm" len="sm"/>
+                      <a:tailEnd type="none" w="sm" len="sm"/>
+                    </a:lnR>
+                  </a:tcPr>
+                </a:tc>
+                <a:tc>
+                  <a:txBody>
+                    <a:bodyPr/>
+                    <a:lstStyle/>
+                    <a:p>
+                      <a:pPr algn="l" fontAlgn="b"/>
+                      <a:endParaRPr lang="es-ES" sz="900" b="0" i="0" u="none" strike="noStrike" dirty="0">
+                        <a:solidFill>
+                          <a:srgbClr val="000000"/>
+                        </a:solidFill>
+                        <a:effectLst/>
+                        <a:latin typeface="Aptos Narrow" panose="020B0004020202020204" pitchFamily="34" charset="0"/>
+                      </a:endParaRPr>
+                    </a:p>
+                  </a:txBody>
+                  <a:tcPr marL="6264" marR="6264" marT="6264" marB="0" anchor="b">
+                    <a:lnL w="9525" cap="flat" cmpd="sng">
+                      <a:noFill/>
+                      <a:prstDash val="solid"/>
+                      <a:round/>
+                      <a:headEnd type="none" w="sm" len="sm"/>
+                      <a:tailEnd type="none" w="sm" len="sm"/>
+                    </a:lnL>
+                    <a:lnR w="9525" cap="flat" cmpd="sng">
+                      <a:noFill/>
+                      <a:prstDash val="solid"/>
+                      <a:round/>
+                      <a:headEnd type="none" w="sm" len="sm"/>
+                      <a:tailEnd type="none" w="sm" len="sm"/>
+                    </a:lnR>
+                    <a:lnT w="9525" cap="flat" cmpd="sng">
+                      <a:noFill/>
+                      <a:prstDash val="solid"/>
+                      <a:round/>
+                      <a:headEnd type="none" w="sm" len="sm"/>
+                      <a:tailEnd type="none" w="sm" len="sm"/>
+                    </a:lnT>
+                    <a:lnB w="9525" cap="flat" cmpd="sng">
+                      <a:noFill/>
+                      <a:prstDash val="solid"/>
+                      <a:round/>
+                      <a:headEnd type="none" w="sm" len="sm"/>
+                      <a:tailEnd type="none" w="sm" len="sm"/>
+                    </a:lnB>
+                    <a:lnTlToBr w="12700" cmpd="sng">
+                      <a:noFill/>
+                      <a:prstDash val="solid"/>
+                    </a:lnTlToBr>
+                    <a:lnBlToTr w="12700" cmpd="sng">
+                      <a:noFill/>
+                      <a:prstDash val="solid"/>
+                    </a:lnBlToTr>
+                    <a:solidFill>
+                      <a:schemeClr val="tx1"/>
+                    </a:solidFill>
+                  </a:tcPr>
+                </a:tc>
+                <a:tc>
+                  <a:txBody>
+                    <a:bodyPr/>
+                    <a:lstStyle/>
+                    <a:p>
+                      <a:pPr algn="l" fontAlgn="b"/>
+                      <a:r>
+                        <a:rPr lang="es-ES" sz="900" u="none" strike="noStrike">
+                          <a:effectLst/>
+                        </a:rPr>
+                        <a:t>U3</a:t>
+                      </a:r>
+                      <a:endParaRPr lang="es-ES" sz="900" b="0" i="0" u="none" strike="noStrike">
+                        <a:solidFill>
+                          <a:srgbClr val="000000"/>
+                        </a:solidFill>
+                        <a:effectLst/>
+                        <a:latin typeface="Aptos Narrow" panose="020B0004020202020204" pitchFamily="34" charset="0"/>
+                      </a:endParaRPr>
+                    </a:p>
+                  </a:txBody>
+                  <a:tcPr marL="6264" marR="6264" marT="6264" marB="0" anchor="b">
+                    <a:lnL w="9525" cap="flat" cmpd="sng">
+                      <a:noFill/>
+                      <a:prstDash val="solid"/>
+                      <a:round/>
+                      <a:headEnd type="none" w="sm" len="sm"/>
+                      <a:tailEnd type="none" w="sm" len="sm"/>
+                    </a:lnL>
+                  </a:tcPr>
+                </a:tc>
+                <a:tc>
+                  <a:txBody>
+                    <a:bodyPr/>
+                    <a:lstStyle/>
+                    <a:p>
+                      <a:pPr algn="l" fontAlgn="b"/>
+                      <a:r>
+                        <a:rPr lang="es-ES" sz="900" u="none" strike="noStrike">
+                          <a:effectLst/>
+                        </a:rPr>
+                        <a:t>Analog Devices</a:t>
+                      </a:r>
+                      <a:endParaRPr lang="es-ES" sz="900" b="0" i="0" u="none" strike="noStrike">
+                        <a:solidFill>
+                          <a:srgbClr val="000000"/>
+                        </a:solidFill>
+                        <a:effectLst/>
+                        <a:latin typeface="Aptos Narrow" panose="020B0004020202020204" pitchFamily="34" charset="0"/>
+                      </a:endParaRPr>
+                    </a:p>
+                  </a:txBody>
+                  <a:tcPr marL="6264" marR="6264" marT="6264" marB="0" anchor="b"/>
+                </a:tc>
+                <a:tc>
+                  <a:txBody>
+                    <a:bodyPr/>
+                    <a:lstStyle/>
+                    <a:p>
+                      <a:pPr algn="l" fontAlgn="b"/>
+                      <a:r>
+                        <a:rPr lang="es-ES" sz="900" u="none" strike="noStrike">
+                          <a:effectLst/>
+                        </a:rPr>
+                        <a:t>OP07</a:t>
+                      </a:r>
+                      <a:endParaRPr lang="es-ES" sz="900" b="0" i="0" u="none" strike="noStrike">
+                        <a:solidFill>
+                          <a:srgbClr val="000000"/>
+                        </a:solidFill>
+                        <a:effectLst/>
+                        <a:latin typeface="Aptos Narrow" panose="020B0004020202020204" pitchFamily="34" charset="0"/>
+                      </a:endParaRPr>
+                    </a:p>
+                  </a:txBody>
+                  <a:tcPr marL="6264" marR="6264" marT="6264" marB="0" anchor="b"/>
+                </a:tc>
+                <a:tc>
+                  <a:txBody>
+                    <a:bodyPr/>
+                    <a:lstStyle/>
+                    <a:p>
+                      <a:pPr algn="l" fontAlgn="b"/>
+                      <a:r>
+                        <a:rPr lang="es-ES" sz="900" u="none" strike="noStrike">
+                          <a:effectLst/>
+                        </a:rPr>
+                        <a:t>integrated circuit</a:t>
+                      </a:r>
+                      <a:endParaRPr lang="es-ES" sz="900" b="0" i="0" u="none" strike="noStrike">
+                        <a:solidFill>
+                          <a:srgbClr val="000000"/>
+                        </a:solidFill>
+                        <a:effectLst/>
+                        <a:latin typeface="Aptos Narrow" panose="020B0004020202020204" pitchFamily="34" charset="0"/>
+                      </a:endParaRPr>
+                    </a:p>
+                  </a:txBody>
+                  <a:tcPr marL="6264" marR="6264" marT="6264" marB="0" anchor="b"/>
+                </a:tc>
+                <a:extLst>
+                  <a:ext uri="{0D108BD9-81ED-4DB2-BD59-A6C34878D82A}">
+                    <a16:rowId xmlns:a16="http://schemas.microsoft.com/office/drawing/2014/main" val="1811997794"/>
+                  </a:ext>
+                </a:extLst>
+              </a:tr>
+              <a:tr h="281860">
+                <a:tc>
+                  <a:txBody>
+                    <a:bodyPr/>
+                    <a:lstStyle/>
+                    <a:p>
+                      <a:pPr algn="l" fontAlgn="b"/>
+                      <a:r>
+                        <a:rPr lang="es-ES" sz="900" u="none" strike="noStrike">
+                          <a:effectLst/>
+                        </a:rPr>
+                        <a:t>R5</a:t>
+                      </a:r>
+                      <a:endParaRPr lang="es-ES" sz="900" b="0" i="0" u="none" strike="noStrike">
+                        <a:solidFill>
+                          <a:srgbClr val="000000"/>
+                        </a:solidFill>
+                        <a:effectLst/>
+                        <a:latin typeface="Aptos Narrow" panose="020B0004020202020204" pitchFamily="34" charset="0"/>
+                      </a:endParaRPr>
+                    </a:p>
+                  </a:txBody>
+                  <a:tcPr marL="6264" marR="6264" marT="6264" marB="0" anchor="b"/>
+                </a:tc>
+                <a:tc>
+                  <a:txBody>
+                    <a:bodyPr/>
+                    <a:lstStyle/>
+                    <a:p>
+                      <a:pPr algn="l" fontAlgn="b"/>
+                      <a:r>
+                        <a:rPr lang="es-ES" sz="900" u="none" strike="noStrike">
+                          <a:effectLst/>
+                        </a:rPr>
+                        <a:t>--</a:t>
+                      </a:r>
+                      <a:endParaRPr lang="es-ES" sz="900" b="0" i="0" u="none" strike="noStrike">
+                        <a:solidFill>
+                          <a:srgbClr val="000000"/>
+                        </a:solidFill>
+                        <a:effectLst/>
+                        <a:latin typeface="Aptos Narrow" panose="020B0004020202020204" pitchFamily="34" charset="0"/>
+                      </a:endParaRPr>
+                    </a:p>
+                  </a:txBody>
+                  <a:tcPr marL="6264" marR="6264" marT="6264" marB="0" anchor="b"/>
+                </a:tc>
+                <a:tc>
+                  <a:txBody>
+                    <a:bodyPr/>
+                    <a:lstStyle/>
+                    <a:p>
+                      <a:pPr algn="l" fontAlgn="b"/>
+                      <a:r>
+                        <a:rPr lang="es-ES" sz="900" u="none" strike="noStrike">
+                          <a:effectLst/>
+                        </a:rPr>
+                        <a:t>--</a:t>
+                      </a:r>
+                      <a:endParaRPr lang="es-ES" sz="900" b="0" i="0" u="none" strike="noStrike">
+                        <a:solidFill>
+                          <a:srgbClr val="000000"/>
+                        </a:solidFill>
+                        <a:effectLst/>
+                        <a:latin typeface="Aptos Narrow" panose="020B0004020202020204" pitchFamily="34" charset="0"/>
+                      </a:endParaRPr>
+                    </a:p>
+                  </a:txBody>
+                  <a:tcPr marL="6264" marR="6264" marT="6264" marB="0" anchor="b"/>
+                </a:tc>
+                <a:tc>
+                  <a:txBody>
+                    <a:bodyPr/>
+                    <a:lstStyle/>
+                    <a:p>
+                      <a:pPr algn="l" fontAlgn="b"/>
+                      <a:r>
+                        <a:rPr lang="es-ES" sz="900" u="none" strike="noStrike">
+                          <a:effectLst/>
+                        </a:rPr>
+                        <a:t>resistor, 0</a:t>
+                      </a:r>
+                      <a:endParaRPr lang="es-ES" sz="900" b="0" i="0" u="none" strike="noStrike">
+                        <a:solidFill>
+                          <a:srgbClr val="000000"/>
+                        </a:solidFill>
+                        <a:effectLst/>
+                        <a:latin typeface="Aptos Narrow" panose="020B0004020202020204" pitchFamily="34" charset="0"/>
+                      </a:endParaRPr>
+                    </a:p>
+                  </a:txBody>
+                  <a:tcPr marL="6264" marR="6264" marT="6264" marB="0" anchor="b">
+                    <a:lnR w="9525" cap="flat" cmpd="sng">
+                      <a:noFill/>
+                      <a:prstDash val="solid"/>
+                      <a:round/>
+                      <a:headEnd type="none" w="sm" len="sm"/>
+                      <a:tailEnd type="none" w="sm" len="sm"/>
+                    </a:lnR>
+                  </a:tcPr>
+                </a:tc>
+                <a:tc>
+                  <a:txBody>
+                    <a:bodyPr/>
+                    <a:lstStyle/>
+                    <a:p>
+                      <a:pPr algn="l" fontAlgn="b"/>
+                      <a:endParaRPr lang="es-ES" sz="900" b="0" i="0" u="none" strike="noStrike" dirty="0">
+                        <a:solidFill>
+                          <a:srgbClr val="000000"/>
+                        </a:solidFill>
+                        <a:effectLst/>
+                        <a:latin typeface="Aptos Narrow" panose="020B0004020202020204" pitchFamily="34" charset="0"/>
+                      </a:endParaRPr>
+                    </a:p>
+                  </a:txBody>
+                  <a:tcPr marL="6264" marR="6264" marT="6264" marB="0" anchor="b">
+                    <a:lnL w="9525" cap="flat" cmpd="sng">
+                      <a:noFill/>
+                      <a:prstDash val="solid"/>
+                      <a:round/>
+                      <a:headEnd type="none" w="sm" len="sm"/>
+                      <a:tailEnd type="none" w="sm" len="sm"/>
+                    </a:lnL>
+                    <a:lnR w="9525" cap="flat" cmpd="sng">
+                      <a:noFill/>
+                      <a:prstDash val="solid"/>
+                      <a:round/>
+                      <a:headEnd type="none" w="sm" len="sm"/>
+                      <a:tailEnd type="none" w="sm" len="sm"/>
+                    </a:lnR>
+                    <a:lnT w="9525" cap="flat" cmpd="sng">
+                      <a:noFill/>
+                      <a:prstDash val="solid"/>
+                      <a:round/>
+                      <a:headEnd type="none" w="sm" len="sm"/>
+                      <a:tailEnd type="none" w="sm" len="sm"/>
+                    </a:lnT>
+                    <a:lnB w="9525" cap="flat" cmpd="sng">
+                      <a:noFill/>
+                      <a:prstDash val="solid"/>
+                      <a:round/>
+                      <a:headEnd type="none" w="sm" len="sm"/>
+                      <a:tailEnd type="none" w="sm" len="sm"/>
+                    </a:lnB>
+                    <a:lnTlToBr w="12700" cmpd="sng">
+                      <a:noFill/>
+                      <a:prstDash val="solid"/>
+                    </a:lnTlToBr>
+                    <a:lnBlToTr w="12700" cmpd="sng">
+                      <a:noFill/>
+                      <a:prstDash val="solid"/>
+                    </a:lnBlToTr>
+                    <a:solidFill>
+                      <a:schemeClr val="tx1"/>
+                    </a:solidFill>
+                  </a:tcPr>
+                </a:tc>
+                <a:tc>
+                  <a:txBody>
+                    <a:bodyPr/>
+                    <a:lstStyle/>
+                    <a:p>
+                      <a:pPr algn="l" fontAlgn="b"/>
+                      <a:r>
+                        <a:rPr lang="es-ES" sz="900" u="none" strike="noStrike">
+                          <a:effectLst/>
+                        </a:rPr>
+                        <a:t>U4</a:t>
+                      </a:r>
+                      <a:endParaRPr lang="es-ES" sz="900" b="0" i="0" u="none" strike="noStrike">
+                        <a:solidFill>
+                          <a:srgbClr val="000000"/>
+                        </a:solidFill>
+                        <a:effectLst/>
+                        <a:latin typeface="Aptos Narrow" panose="020B0004020202020204" pitchFamily="34" charset="0"/>
+                      </a:endParaRPr>
+                    </a:p>
+                  </a:txBody>
+                  <a:tcPr marL="6264" marR="6264" marT="6264" marB="0" anchor="b">
+                    <a:lnL w="9525" cap="flat" cmpd="sng">
+                      <a:noFill/>
+                      <a:prstDash val="solid"/>
+                      <a:round/>
+                      <a:headEnd type="none" w="sm" len="sm"/>
+                      <a:tailEnd type="none" w="sm" len="sm"/>
+                    </a:lnL>
+                  </a:tcPr>
+                </a:tc>
+                <a:tc>
+                  <a:txBody>
+                    <a:bodyPr/>
+                    <a:lstStyle/>
+                    <a:p>
+                      <a:pPr algn="l" fontAlgn="b"/>
+                      <a:r>
+                        <a:rPr lang="es-ES" sz="900" u="none" strike="noStrike">
+                          <a:effectLst/>
+                        </a:rPr>
+                        <a:t>Analog Devices</a:t>
+                      </a:r>
+                      <a:endParaRPr lang="es-ES" sz="900" b="0" i="0" u="none" strike="noStrike">
+                        <a:solidFill>
+                          <a:srgbClr val="000000"/>
+                        </a:solidFill>
+                        <a:effectLst/>
+                        <a:latin typeface="Aptos Narrow" panose="020B0004020202020204" pitchFamily="34" charset="0"/>
+                      </a:endParaRPr>
+                    </a:p>
+                  </a:txBody>
+                  <a:tcPr marL="6264" marR="6264" marT="6264" marB="0" anchor="b"/>
+                </a:tc>
+                <a:tc>
+                  <a:txBody>
+                    <a:bodyPr/>
+                    <a:lstStyle/>
+                    <a:p>
+                      <a:pPr algn="l" fontAlgn="b"/>
+                      <a:r>
+                        <a:rPr lang="es-ES" sz="900" u="none" strike="noStrike">
+                          <a:effectLst/>
+                        </a:rPr>
+                        <a:t>OP07</a:t>
+                      </a:r>
+                      <a:endParaRPr lang="es-ES" sz="900" b="0" i="0" u="none" strike="noStrike">
+                        <a:solidFill>
+                          <a:srgbClr val="000000"/>
+                        </a:solidFill>
+                        <a:effectLst/>
+                        <a:latin typeface="Aptos Narrow" panose="020B0004020202020204" pitchFamily="34" charset="0"/>
+                      </a:endParaRPr>
+                    </a:p>
+                  </a:txBody>
+                  <a:tcPr marL="6264" marR="6264" marT="6264" marB="0" anchor="b"/>
+                </a:tc>
+                <a:tc>
+                  <a:txBody>
+                    <a:bodyPr/>
+                    <a:lstStyle/>
+                    <a:p>
+                      <a:pPr algn="l" fontAlgn="b"/>
+                      <a:r>
+                        <a:rPr lang="es-ES" sz="900" u="none" strike="noStrike">
+                          <a:effectLst/>
+                        </a:rPr>
+                        <a:t>integrated circuit</a:t>
+                      </a:r>
+                      <a:endParaRPr lang="es-ES" sz="900" b="0" i="0" u="none" strike="noStrike">
+                        <a:solidFill>
+                          <a:srgbClr val="000000"/>
+                        </a:solidFill>
+                        <a:effectLst/>
+                        <a:latin typeface="Aptos Narrow" panose="020B0004020202020204" pitchFamily="34" charset="0"/>
+                      </a:endParaRPr>
+                    </a:p>
+                  </a:txBody>
+                  <a:tcPr marL="6264" marR="6264" marT="6264" marB="0" anchor="b"/>
+                </a:tc>
+                <a:extLst>
+                  <a:ext uri="{0D108BD9-81ED-4DB2-BD59-A6C34878D82A}">
+                    <a16:rowId xmlns:a16="http://schemas.microsoft.com/office/drawing/2014/main" val="1124772411"/>
+                  </a:ext>
+                </a:extLst>
+              </a:tr>
+              <a:tr h="281860">
+                <a:tc>
+                  <a:txBody>
+                    <a:bodyPr/>
+                    <a:lstStyle/>
+                    <a:p>
+                      <a:pPr algn="l" fontAlgn="b"/>
+                      <a:r>
+                        <a:rPr lang="es-ES" sz="900" u="none" strike="noStrike">
+                          <a:effectLst/>
+                        </a:rPr>
+                        <a:t>R6</a:t>
+                      </a:r>
+                      <a:endParaRPr lang="es-ES" sz="900" b="0" i="0" u="none" strike="noStrike">
+                        <a:solidFill>
+                          <a:srgbClr val="000000"/>
+                        </a:solidFill>
+                        <a:effectLst/>
+                        <a:latin typeface="Aptos Narrow" panose="020B0004020202020204" pitchFamily="34" charset="0"/>
+                      </a:endParaRPr>
+                    </a:p>
+                  </a:txBody>
+                  <a:tcPr marL="6264" marR="6264" marT="6264" marB="0" anchor="b"/>
+                </a:tc>
+                <a:tc>
+                  <a:txBody>
+                    <a:bodyPr/>
+                    <a:lstStyle/>
+                    <a:p>
+                      <a:pPr algn="l" fontAlgn="b"/>
+                      <a:r>
+                        <a:rPr lang="es-ES" sz="900" u="none" strike="noStrike">
+                          <a:effectLst/>
+                        </a:rPr>
+                        <a:t>--</a:t>
+                      </a:r>
+                      <a:endParaRPr lang="es-ES" sz="900" b="0" i="0" u="none" strike="noStrike">
+                        <a:solidFill>
+                          <a:srgbClr val="000000"/>
+                        </a:solidFill>
+                        <a:effectLst/>
+                        <a:latin typeface="Aptos Narrow" panose="020B0004020202020204" pitchFamily="34" charset="0"/>
+                      </a:endParaRPr>
+                    </a:p>
+                  </a:txBody>
+                  <a:tcPr marL="6264" marR="6264" marT="6264" marB="0" anchor="b"/>
+                </a:tc>
+                <a:tc>
+                  <a:txBody>
+                    <a:bodyPr/>
+                    <a:lstStyle/>
+                    <a:p>
+                      <a:pPr algn="l" fontAlgn="b"/>
+                      <a:r>
+                        <a:rPr lang="es-ES" sz="900" u="none" strike="noStrike">
+                          <a:effectLst/>
+                        </a:rPr>
+                        <a:t>--</a:t>
+                      </a:r>
+                      <a:endParaRPr lang="es-ES" sz="900" b="0" i="0" u="none" strike="noStrike">
+                        <a:solidFill>
+                          <a:srgbClr val="000000"/>
+                        </a:solidFill>
+                        <a:effectLst/>
+                        <a:latin typeface="Aptos Narrow" panose="020B0004020202020204" pitchFamily="34" charset="0"/>
+                      </a:endParaRPr>
+                    </a:p>
+                  </a:txBody>
+                  <a:tcPr marL="6264" marR="6264" marT="6264" marB="0" anchor="b"/>
+                </a:tc>
+                <a:tc>
+                  <a:txBody>
+                    <a:bodyPr/>
+                    <a:lstStyle/>
+                    <a:p>
+                      <a:pPr algn="l" fontAlgn="b"/>
+                      <a:r>
+                        <a:rPr lang="es-ES" sz="900" u="none" strike="noStrike">
+                          <a:effectLst/>
+                        </a:rPr>
+                        <a:t>resistor, 3K</a:t>
+                      </a:r>
+                      <a:endParaRPr lang="es-ES" sz="900" b="0" i="0" u="none" strike="noStrike">
+                        <a:solidFill>
+                          <a:srgbClr val="000000"/>
+                        </a:solidFill>
+                        <a:effectLst/>
+                        <a:latin typeface="Aptos Narrow" panose="020B0004020202020204" pitchFamily="34" charset="0"/>
+                      </a:endParaRPr>
+                    </a:p>
+                  </a:txBody>
+                  <a:tcPr marL="6264" marR="6264" marT="6264" marB="0" anchor="b">
+                    <a:lnR w="9525" cap="flat" cmpd="sng">
+                      <a:noFill/>
+                      <a:prstDash val="solid"/>
+                      <a:round/>
+                      <a:headEnd type="none" w="sm" len="sm"/>
+                      <a:tailEnd type="none" w="sm" len="sm"/>
+                    </a:lnR>
+                  </a:tcPr>
+                </a:tc>
+                <a:tc>
+                  <a:txBody>
+                    <a:bodyPr/>
+                    <a:lstStyle/>
+                    <a:p>
+                      <a:pPr algn="l" fontAlgn="b"/>
+                      <a:endParaRPr lang="es-ES" sz="900" b="0" i="0" u="none" strike="noStrike" dirty="0">
+                        <a:solidFill>
+                          <a:srgbClr val="000000"/>
+                        </a:solidFill>
+                        <a:effectLst/>
+                        <a:latin typeface="Aptos Narrow" panose="020B0004020202020204" pitchFamily="34" charset="0"/>
+                      </a:endParaRPr>
+                    </a:p>
+                  </a:txBody>
+                  <a:tcPr marL="6264" marR="6264" marT="6264" marB="0" anchor="b">
+                    <a:lnL w="9525" cap="flat" cmpd="sng">
+                      <a:noFill/>
+                      <a:prstDash val="solid"/>
+                      <a:round/>
+                      <a:headEnd type="none" w="sm" len="sm"/>
+                      <a:tailEnd type="none" w="sm" len="sm"/>
+                    </a:lnL>
+                    <a:lnR w="9525" cap="flat" cmpd="sng">
+                      <a:noFill/>
+                      <a:prstDash val="solid"/>
+                      <a:round/>
+                      <a:headEnd type="none" w="sm" len="sm"/>
+                      <a:tailEnd type="none" w="sm" len="sm"/>
+                    </a:lnR>
+                    <a:lnT w="9525" cap="flat" cmpd="sng">
+                      <a:noFill/>
+                      <a:prstDash val="solid"/>
+                      <a:round/>
+                      <a:headEnd type="none" w="sm" len="sm"/>
+                      <a:tailEnd type="none" w="sm" len="sm"/>
+                    </a:lnT>
+                    <a:lnB w="9525" cap="flat" cmpd="sng">
+                      <a:noFill/>
+                      <a:prstDash val="solid"/>
+                      <a:round/>
+                      <a:headEnd type="none" w="sm" len="sm"/>
+                      <a:tailEnd type="none" w="sm" len="sm"/>
+                    </a:lnB>
+                    <a:lnTlToBr w="12700" cmpd="sng">
+                      <a:noFill/>
+                      <a:prstDash val="solid"/>
+                    </a:lnTlToBr>
+                    <a:lnBlToTr w="12700" cmpd="sng">
+                      <a:noFill/>
+                      <a:prstDash val="solid"/>
+                    </a:lnBlToTr>
+                    <a:solidFill>
+                      <a:schemeClr val="tx1"/>
+                    </a:solidFill>
+                  </a:tcPr>
+                </a:tc>
+                <a:tc>
+                  <a:txBody>
+                    <a:bodyPr/>
+                    <a:lstStyle/>
+                    <a:p>
+                      <a:pPr algn="l" fontAlgn="b"/>
+                      <a:r>
+                        <a:rPr lang="es-ES" sz="900" u="none" strike="noStrike">
+                          <a:effectLst/>
+                        </a:rPr>
+                        <a:t>U6</a:t>
+                      </a:r>
+                      <a:endParaRPr lang="es-ES" sz="900" b="0" i="0" u="none" strike="noStrike">
+                        <a:solidFill>
+                          <a:srgbClr val="000000"/>
+                        </a:solidFill>
+                        <a:effectLst/>
+                        <a:latin typeface="Aptos Narrow" panose="020B0004020202020204" pitchFamily="34" charset="0"/>
+                      </a:endParaRPr>
+                    </a:p>
+                  </a:txBody>
+                  <a:tcPr marL="6264" marR="6264" marT="6264" marB="0" anchor="b">
+                    <a:lnL w="9525" cap="flat" cmpd="sng">
+                      <a:noFill/>
+                      <a:prstDash val="solid"/>
+                      <a:round/>
+                      <a:headEnd type="none" w="sm" len="sm"/>
+                      <a:tailEnd type="none" w="sm" len="sm"/>
+                    </a:lnL>
+                  </a:tcPr>
+                </a:tc>
+                <a:tc>
+                  <a:txBody>
+                    <a:bodyPr/>
+                    <a:lstStyle/>
+                    <a:p>
+                      <a:pPr algn="l" fontAlgn="b"/>
+                      <a:r>
+                        <a:rPr lang="es-ES" sz="900" u="none" strike="noStrike">
+                          <a:effectLst/>
+                        </a:rPr>
+                        <a:t>Analog Devices</a:t>
+                      </a:r>
+                      <a:endParaRPr lang="es-ES" sz="900" b="0" i="0" u="none" strike="noStrike">
+                        <a:solidFill>
+                          <a:srgbClr val="000000"/>
+                        </a:solidFill>
+                        <a:effectLst/>
+                        <a:latin typeface="Aptos Narrow" panose="020B0004020202020204" pitchFamily="34" charset="0"/>
+                      </a:endParaRPr>
+                    </a:p>
+                  </a:txBody>
+                  <a:tcPr marL="6264" marR="6264" marT="6264" marB="0" anchor="b"/>
+                </a:tc>
+                <a:tc>
+                  <a:txBody>
+                    <a:bodyPr/>
+                    <a:lstStyle/>
+                    <a:p>
+                      <a:pPr algn="l" fontAlgn="b"/>
+                      <a:r>
+                        <a:rPr lang="es-ES" sz="900" u="none" strike="noStrike">
+                          <a:effectLst/>
+                        </a:rPr>
+                        <a:t>OP07</a:t>
+                      </a:r>
+                      <a:endParaRPr lang="es-ES" sz="900" b="0" i="0" u="none" strike="noStrike">
+                        <a:solidFill>
+                          <a:srgbClr val="000000"/>
+                        </a:solidFill>
+                        <a:effectLst/>
+                        <a:latin typeface="Aptos Narrow" panose="020B0004020202020204" pitchFamily="34" charset="0"/>
+                      </a:endParaRPr>
+                    </a:p>
+                  </a:txBody>
+                  <a:tcPr marL="6264" marR="6264" marT="6264" marB="0" anchor="b"/>
+                </a:tc>
+                <a:tc>
+                  <a:txBody>
+                    <a:bodyPr/>
+                    <a:lstStyle/>
+                    <a:p>
+                      <a:pPr algn="l" fontAlgn="b"/>
+                      <a:r>
+                        <a:rPr lang="es-ES" sz="900" u="none" strike="noStrike">
+                          <a:effectLst/>
+                        </a:rPr>
+                        <a:t>integrated circuit</a:t>
+                      </a:r>
+                      <a:endParaRPr lang="es-ES" sz="900" b="0" i="0" u="none" strike="noStrike">
+                        <a:solidFill>
+                          <a:srgbClr val="000000"/>
+                        </a:solidFill>
+                        <a:effectLst/>
+                        <a:latin typeface="Aptos Narrow" panose="020B0004020202020204" pitchFamily="34" charset="0"/>
+                      </a:endParaRPr>
+                    </a:p>
+                  </a:txBody>
+                  <a:tcPr marL="6264" marR="6264" marT="6264" marB="0" anchor="b"/>
+                </a:tc>
+                <a:extLst>
+                  <a:ext uri="{0D108BD9-81ED-4DB2-BD59-A6C34878D82A}">
+                    <a16:rowId xmlns:a16="http://schemas.microsoft.com/office/drawing/2014/main" val="1096663519"/>
+                  </a:ext>
+                </a:extLst>
+              </a:tr>
+              <a:tr h="281860">
+                <a:tc>
+                  <a:txBody>
+                    <a:bodyPr/>
+                    <a:lstStyle/>
+                    <a:p>
+                      <a:pPr algn="l" fontAlgn="b"/>
+                      <a:r>
+                        <a:rPr lang="es-ES" sz="900" u="none" strike="noStrike">
+                          <a:effectLst/>
+                        </a:rPr>
+                        <a:t>R7</a:t>
+                      </a:r>
+                      <a:endParaRPr lang="es-ES" sz="900" b="0" i="0" u="none" strike="noStrike">
+                        <a:solidFill>
+                          <a:srgbClr val="000000"/>
+                        </a:solidFill>
+                        <a:effectLst/>
+                        <a:latin typeface="Aptos Narrow" panose="020B0004020202020204" pitchFamily="34" charset="0"/>
+                      </a:endParaRPr>
+                    </a:p>
+                  </a:txBody>
+                  <a:tcPr marL="6264" marR="6264" marT="6264" marB="0" anchor="b"/>
+                </a:tc>
+                <a:tc>
+                  <a:txBody>
+                    <a:bodyPr/>
+                    <a:lstStyle/>
+                    <a:p>
+                      <a:pPr algn="l" fontAlgn="b"/>
+                      <a:r>
+                        <a:rPr lang="es-ES" sz="900" u="none" strike="noStrike">
+                          <a:effectLst/>
+                        </a:rPr>
+                        <a:t>--</a:t>
+                      </a:r>
+                      <a:endParaRPr lang="es-ES" sz="900" b="0" i="0" u="none" strike="noStrike">
+                        <a:solidFill>
+                          <a:srgbClr val="000000"/>
+                        </a:solidFill>
+                        <a:effectLst/>
+                        <a:latin typeface="Aptos Narrow" panose="020B0004020202020204" pitchFamily="34" charset="0"/>
+                      </a:endParaRPr>
+                    </a:p>
+                  </a:txBody>
+                  <a:tcPr marL="6264" marR="6264" marT="6264" marB="0" anchor="b"/>
+                </a:tc>
+                <a:tc>
+                  <a:txBody>
+                    <a:bodyPr/>
+                    <a:lstStyle/>
+                    <a:p>
+                      <a:pPr algn="l" fontAlgn="b"/>
+                      <a:r>
+                        <a:rPr lang="es-ES" sz="900" u="none" strike="noStrike">
+                          <a:effectLst/>
+                        </a:rPr>
+                        <a:t>--</a:t>
+                      </a:r>
+                      <a:endParaRPr lang="es-ES" sz="900" b="0" i="0" u="none" strike="noStrike">
+                        <a:solidFill>
+                          <a:srgbClr val="000000"/>
+                        </a:solidFill>
+                        <a:effectLst/>
+                        <a:latin typeface="Aptos Narrow" panose="020B0004020202020204" pitchFamily="34" charset="0"/>
+                      </a:endParaRPr>
+                    </a:p>
+                  </a:txBody>
+                  <a:tcPr marL="6264" marR="6264" marT="6264" marB="0" anchor="b"/>
+                </a:tc>
+                <a:tc>
+                  <a:txBody>
+                    <a:bodyPr/>
+                    <a:lstStyle/>
+                    <a:p>
+                      <a:pPr algn="l" fontAlgn="b"/>
+                      <a:r>
+                        <a:rPr lang="es-ES" sz="900" u="none" strike="noStrike">
+                          <a:effectLst/>
+                        </a:rPr>
+                        <a:t>resistor, 5K</a:t>
+                      </a:r>
+                      <a:endParaRPr lang="es-ES" sz="900" b="0" i="0" u="none" strike="noStrike">
+                        <a:solidFill>
+                          <a:srgbClr val="000000"/>
+                        </a:solidFill>
+                        <a:effectLst/>
+                        <a:latin typeface="Aptos Narrow" panose="020B0004020202020204" pitchFamily="34" charset="0"/>
+                      </a:endParaRPr>
+                    </a:p>
+                  </a:txBody>
+                  <a:tcPr marL="6264" marR="6264" marT="6264" marB="0" anchor="b">
+                    <a:lnR w="9525" cap="flat" cmpd="sng">
+                      <a:noFill/>
+                      <a:prstDash val="solid"/>
+                      <a:round/>
+                      <a:headEnd type="none" w="sm" len="sm"/>
+                      <a:tailEnd type="none" w="sm" len="sm"/>
+                    </a:lnR>
+                  </a:tcPr>
+                </a:tc>
+                <a:tc>
+                  <a:txBody>
+                    <a:bodyPr/>
+                    <a:lstStyle/>
+                    <a:p>
+                      <a:pPr algn="l" fontAlgn="b"/>
+                      <a:endParaRPr lang="es-ES" sz="900" b="0" i="0" u="none" strike="noStrike" dirty="0">
+                        <a:solidFill>
+                          <a:srgbClr val="000000"/>
+                        </a:solidFill>
+                        <a:effectLst/>
+                        <a:latin typeface="Aptos Narrow" panose="020B0004020202020204" pitchFamily="34" charset="0"/>
+                      </a:endParaRPr>
+                    </a:p>
+                  </a:txBody>
+                  <a:tcPr marL="6264" marR="6264" marT="6264" marB="0" anchor="b">
+                    <a:lnL w="9525" cap="flat" cmpd="sng">
+                      <a:noFill/>
+                      <a:prstDash val="solid"/>
+                      <a:round/>
+                      <a:headEnd type="none" w="sm" len="sm"/>
+                      <a:tailEnd type="none" w="sm" len="sm"/>
+                    </a:lnL>
+                    <a:lnR w="9525" cap="flat" cmpd="sng">
+                      <a:noFill/>
+                      <a:prstDash val="solid"/>
+                      <a:round/>
+                      <a:headEnd type="none" w="sm" len="sm"/>
+                      <a:tailEnd type="none" w="sm" len="sm"/>
+                    </a:lnR>
+                    <a:lnT w="9525" cap="flat" cmpd="sng">
+                      <a:noFill/>
+                      <a:prstDash val="solid"/>
+                      <a:round/>
+                      <a:headEnd type="none" w="sm" len="sm"/>
+                      <a:tailEnd type="none" w="sm" len="sm"/>
+                    </a:lnT>
+                    <a:lnB w="9525" cap="flat" cmpd="sng">
+                      <a:noFill/>
+                      <a:prstDash val="solid"/>
+                      <a:round/>
+                      <a:headEnd type="none" w="sm" len="sm"/>
+                      <a:tailEnd type="none" w="sm" len="sm"/>
+                    </a:lnB>
+                    <a:lnTlToBr w="12700" cmpd="sng">
+                      <a:noFill/>
+                      <a:prstDash val="solid"/>
+                    </a:lnTlToBr>
+                    <a:lnBlToTr w="12700" cmpd="sng">
+                      <a:noFill/>
+                      <a:prstDash val="solid"/>
+                    </a:lnBlToTr>
+                    <a:solidFill>
+                      <a:schemeClr val="tx1"/>
+                    </a:solidFill>
+                  </a:tcPr>
+                </a:tc>
+                <a:tc>
+                  <a:txBody>
+                    <a:bodyPr/>
+                    <a:lstStyle/>
+                    <a:p>
+                      <a:pPr algn="l" fontAlgn="b"/>
+                      <a:r>
+                        <a:rPr lang="es-ES" sz="900" u="none" strike="noStrike">
+                          <a:effectLst/>
+                        </a:rPr>
+                        <a:t>U7</a:t>
+                      </a:r>
+                      <a:endParaRPr lang="es-ES" sz="900" b="0" i="0" u="none" strike="noStrike">
+                        <a:solidFill>
+                          <a:srgbClr val="000000"/>
+                        </a:solidFill>
+                        <a:effectLst/>
+                        <a:latin typeface="Aptos Narrow" panose="020B0004020202020204" pitchFamily="34" charset="0"/>
+                      </a:endParaRPr>
+                    </a:p>
+                  </a:txBody>
+                  <a:tcPr marL="6264" marR="6264" marT="6264" marB="0" anchor="b">
+                    <a:lnL w="9525" cap="flat" cmpd="sng">
+                      <a:noFill/>
+                      <a:prstDash val="solid"/>
+                      <a:round/>
+                      <a:headEnd type="none" w="sm" len="sm"/>
+                      <a:tailEnd type="none" w="sm" len="sm"/>
+                    </a:lnL>
+                  </a:tcPr>
+                </a:tc>
+                <a:tc>
+                  <a:txBody>
+                    <a:bodyPr/>
+                    <a:lstStyle/>
+                    <a:p>
+                      <a:pPr algn="l" fontAlgn="b"/>
+                      <a:r>
+                        <a:rPr lang="es-ES" sz="900" u="none" strike="noStrike">
+                          <a:effectLst/>
+                        </a:rPr>
+                        <a:t>Analog Devices</a:t>
+                      </a:r>
+                      <a:endParaRPr lang="es-ES" sz="900" b="0" i="0" u="none" strike="noStrike">
+                        <a:solidFill>
+                          <a:srgbClr val="000000"/>
+                        </a:solidFill>
+                        <a:effectLst/>
+                        <a:latin typeface="Aptos Narrow" panose="020B0004020202020204" pitchFamily="34" charset="0"/>
+                      </a:endParaRPr>
+                    </a:p>
+                  </a:txBody>
+                  <a:tcPr marL="6264" marR="6264" marT="6264" marB="0" anchor="b"/>
+                </a:tc>
+                <a:tc>
+                  <a:txBody>
+                    <a:bodyPr/>
+                    <a:lstStyle/>
+                    <a:p>
+                      <a:pPr algn="l" fontAlgn="b"/>
+                      <a:r>
+                        <a:rPr lang="es-ES" sz="900" u="none" strike="noStrike">
+                          <a:effectLst/>
+                        </a:rPr>
+                        <a:t>OP07</a:t>
+                      </a:r>
+                      <a:endParaRPr lang="es-ES" sz="900" b="0" i="0" u="none" strike="noStrike">
+                        <a:solidFill>
+                          <a:srgbClr val="000000"/>
+                        </a:solidFill>
+                        <a:effectLst/>
+                        <a:latin typeface="Aptos Narrow" panose="020B0004020202020204" pitchFamily="34" charset="0"/>
+                      </a:endParaRPr>
+                    </a:p>
+                  </a:txBody>
+                  <a:tcPr marL="6264" marR="6264" marT="6264" marB="0" anchor="b"/>
+                </a:tc>
+                <a:tc>
+                  <a:txBody>
+                    <a:bodyPr/>
+                    <a:lstStyle/>
+                    <a:p>
+                      <a:pPr algn="l" fontAlgn="b"/>
+                      <a:r>
+                        <a:rPr lang="es-ES" sz="900" u="none" strike="noStrike">
+                          <a:effectLst/>
+                        </a:rPr>
+                        <a:t>integrated circuit</a:t>
+                      </a:r>
+                      <a:endParaRPr lang="es-ES" sz="900" b="0" i="0" u="none" strike="noStrike">
+                        <a:solidFill>
+                          <a:srgbClr val="000000"/>
+                        </a:solidFill>
+                        <a:effectLst/>
+                        <a:latin typeface="Aptos Narrow" panose="020B0004020202020204" pitchFamily="34" charset="0"/>
+                      </a:endParaRPr>
+                    </a:p>
+                  </a:txBody>
+                  <a:tcPr marL="6264" marR="6264" marT="6264" marB="0" anchor="b"/>
+                </a:tc>
+                <a:extLst>
+                  <a:ext uri="{0D108BD9-81ED-4DB2-BD59-A6C34878D82A}">
+                    <a16:rowId xmlns:a16="http://schemas.microsoft.com/office/drawing/2014/main" val="3697655121"/>
+                  </a:ext>
+                </a:extLst>
+              </a:tr>
+              <a:tr h="419659">
+                <a:tc>
+                  <a:txBody>
+                    <a:bodyPr/>
+                    <a:lstStyle/>
+                    <a:p>
+                      <a:pPr algn="l" fontAlgn="b"/>
+                      <a:r>
+                        <a:rPr lang="es-ES" sz="900" u="none" strike="noStrike">
+                          <a:effectLst/>
+                        </a:rPr>
+                        <a:t>R8</a:t>
+                      </a:r>
+                      <a:endParaRPr lang="es-ES" sz="900" b="0" i="0" u="none" strike="noStrike">
+                        <a:solidFill>
+                          <a:srgbClr val="000000"/>
+                        </a:solidFill>
+                        <a:effectLst/>
+                        <a:latin typeface="Aptos Narrow" panose="020B0004020202020204" pitchFamily="34" charset="0"/>
+                      </a:endParaRPr>
+                    </a:p>
+                  </a:txBody>
+                  <a:tcPr marL="6264" marR="6264" marT="6264" marB="0" anchor="b"/>
+                </a:tc>
+                <a:tc>
+                  <a:txBody>
+                    <a:bodyPr/>
+                    <a:lstStyle/>
+                    <a:p>
+                      <a:pPr algn="l" fontAlgn="b"/>
+                      <a:r>
+                        <a:rPr lang="es-ES" sz="900" u="none" strike="noStrike">
+                          <a:effectLst/>
+                        </a:rPr>
+                        <a:t>--</a:t>
+                      </a:r>
+                      <a:endParaRPr lang="es-ES" sz="900" b="0" i="0" u="none" strike="noStrike">
+                        <a:solidFill>
+                          <a:srgbClr val="000000"/>
+                        </a:solidFill>
+                        <a:effectLst/>
+                        <a:latin typeface="Aptos Narrow" panose="020B0004020202020204" pitchFamily="34" charset="0"/>
+                      </a:endParaRPr>
+                    </a:p>
+                  </a:txBody>
+                  <a:tcPr marL="6264" marR="6264" marT="6264" marB="0" anchor="b"/>
+                </a:tc>
+                <a:tc>
+                  <a:txBody>
+                    <a:bodyPr/>
+                    <a:lstStyle/>
+                    <a:p>
+                      <a:pPr algn="l" fontAlgn="b"/>
+                      <a:r>
+                        <a:rPr lang="es-ES" sz="900" u="none" strike="noStrike">
+                          <a:effectLst/>
+                        </a:rPr>
+                        <a:t>--</a:t>
+                      </a:r>
+                      <a:endParaRPr lang="es-ES" sz="900" b="0" i="0" u="none" strike="noStrike">
+                        <a:solidFill>
+                          <a:srgbClr val="000000"/>
+                        </a:solidFill>
+                        <a:effectLst/>
+                        <a:latin typeface="Aptos Narrow" panose="020B0004020202020204" pitchFamily="34" charset="0"/>
+                      </a:endParaRPr>
+                    </a:p>
+                  </a:txBody>
+                  <a:tcPr marL="6264" marR="6264" marT="6264" marB="0" anchor="b"/>
+                </a:tc>
+                <a:tc>
+                  <a:txBody>
+                    <a:bodyPr/>
+                    <a:lstStyle/>
+                    <a:p>
+                      <a:pPr algn="l" fontAlgn="b"/>
+                      <a:r>
+                        <a:rPr lang="es-ES" sz="900" u="none" strike="noStrike">
+                          <a:effectLst/>
+                        </a:rPr>
+                        <a:t>resistor, 5K</a:t>
+                      </a:r>
+                      <a:endParaRPr lang="es-ES" sz="900" b="0" i="0" u="none" strike="noStrike">
+                        <a:solidFill>
+                          <a:srgbClr val="000000"/>
+                        </a:solidFill>
+                        <a:effectLst/>
+                        <a:latin typeface="Aptos Narrow" panose="020B0004020202020204" pitchFamily="34" charset="0"/>
+                      </a:endParaRPr>
+                    </a:p>
+                  </a:txBody>
+                  <a:tcPr marL="6264" marR="6264" marT="6264" marB="0" anchor="b">
+                    <a:lnR w="9525" cap="flat" cmpd="sng">
+                      <a:noFill/>
+                      <a:prstDash val="solid"/>
+                      <a:round/>
+                      <a:headEnd type="none" w="sm" len="sm"/>
+                      <a:tailEnd type="none" w="sm" len="sm"/>
+                    </a:lnR>
+                  </a:tcPr>
+                </a:tc>
+                <a:tc>
+                  <a:txBody>
+                    <a:bodyPr/>
+                    <a:lstStyle/>
+                    <a:p>
+                      <a:pPr algn="l" fontAlgn="b"/>
+                      <a:endParaRPr lang="es-ES" sz="900" b="0" i="0" u="none" strike="noStrike" dirty="0">
+                        <a:solidFill>
+                          <a:srgbClr val="000000"/>
+                        </a:solidFill>
+                        <a:effectLst/>
+                        <a:latin typeface="Aptos Narrow" panose="020B0004020202020204" pitchFamily="34" charset="0"/>
+                      </a:endParaRPr>
+                    </a:p>
+                  </a:txBody>
+                  <a:tcPr marL="6264" marR="6264" marT="6264" marB="0" anchor="b">
+                    <a:lnL w="9525" cap="flat" cmpd="sng">
+                      <a:noFill/>
+                      <a:prstDash val="solid"/>
+                      <a:round/>
+                      <a:headEnd type="none" w="sm" len="sm"/>
+                      <a:tailEnd type="none" w="sm" len="sm"/>
+                    </a:lnL>
+                    <a:lnR w="9525" cap="flat" cmpd="sng">
+                      <a:noFill/>
+                      <a:prstDash val="solid"/>
+                      <a:round/>
+                      <a:headEnd type="none" w="sm" len="sm"/>
+                      <a:tailEnd type="none" w="sm" len="sm"/>
+                    </a:lnR>
+                    <a:lnT w="9525" cap="flat" cmpd="sng">
+                      <a:noFill/>
+                      <a:prstDash val="solid"/>
+                      <a:round/>
+                      <a:headEnd type="none" w="sm" len="sm"/>
+                      <a:tailEnd type="none" w="sm" len="sm"/>
+                    </a:lnT>
+                    <a:lnB w="9525" cap="flat" cmpd="sng">
+                      <a:noFill/>
+                      <a:prstDash val="solid"/>
+                      <a:round/>
+                      <a:headEnd type="none" w="sm" len="sm"/>
+                      <a:tailEnd type="none" w="sm" len="sm"/>
+                    </a:lnB>
+                    <a:lnTlToBr w="12700" cmpd="sng">
+                      <a:noFill/>
+                      <a:prstDash val="solid"/>
+                    </a:lnTlToBr>
+                    <a:lnBlToTr w="12700" cmpd="sng">
+                      <a:noFill/>
+                      <a:prstDash val="solid"/>
+                    </a:lnBlToTr>
+                    <a:solidFill>
+                      <a:schemeClr val="tx1"/>
+                    </a:solidFill>
+                  </a:tcPr>
+                </a:tc>
+                <a:tc>
+                  <a:txBody>
+                    <a:bodyPr/>
+                    <a:lstStyle/>
+                    <a:p>
+                      <a:pPr algn="l" fontAlgn="b"/>
+                      <a:r>
+                        <a:rPr lang="es-ES" sz="900" u="none" strike="noStrike">
+                          <a:effectLst/>
+                        </a:rPr>
+                        <a:t>Uopamp_FPGAOutput</a:t>
+                      </a:r>
+                      <a:endParaRPr lang="es-ES" sz="900" b="0" i="0" u="none" strike="noStrike">
+                        <a:solidFill>
+                          <a:srgbClr val="000000"/>
+                        </a:solidFill>
+                        <a:effectLst/>
+                        <a:latin typeface="Aptos Narrow" panose="020B0004020202020204" pitchFamily="34" charset="0"/>
+                      </a:endParaRPr>
+                    </a:p>
+                  </a:txBody>
+                  <a:tcPr marL="6264" marR="6264" marT="6264" marB="0" anchor="b">
+                    <a:lnL w="9525" cap="flat" cmpd="sng">
+                      <a:noFill/>
+                      <a:prstDash val="solid"/>
+                      <a:round/>
+                      <a:headEnd type="none" w="sm" len="sm"/>
+                      <a:tailEnd type="none" w="sm" len="sm"/>
+                    </a:lnL>
+                  </a:tcPr>
+                </a:tc>
+                <a:tc>
+                  <a:txBody>
+                    <a:bodyPr/>
+                    <a:lstStyle/>
+                    <a:p>
+                      <a:pPr algn="l" fontAlgn="b"/>
+                      <a:r>
+                        <a:rPr lang="es-ES" sz="900" u="none" strike="noStrike">
+                          <a:effectLst/>
+                        </a:rPr>
+                        <a:t>Analog Devices</a:t>
+                      </a:r>
+                      <a:endParaRPr lang="es-ES" sz="900" b="0" i="0" u="none" strike="noStrike">
+                        <a:solidFill>
+                          <a:srgbClr val="000000"/>
+                        </a:solidFill>
+                        <a:effectLst/>
+                        <a:latin typeface="Aptos Narrow" panose="020B0004020202020204" pitchFamily="34" charset="0"/>
+                      </a:endParaRPr>
+                    </a:p>
+                  </a:txBody>
+                  <a:tcPr marL="6264" marR="6264" marT="6264" marB="0" anchor="b"/>
+                </a:tc>
+                <a:tc>
+                  <a:txBody>
+                    <a:bodyPr/>
+                    <a:lstStyle/>
+                    <a:p>
+                      <a:pPr algn="l" fontAlgn="b"/>
+                      <a:r>
+                        <a:rPr lang="es-ES" sz="900" u="none" strike="noStrike">
+                          <a:effectLst/>
+                        </a:rPr>
+                        <a:t>OP07</a:t>
+                      </a:r>
+                      <a:endParaRPr lang="es-ES" sz="900" b="0" i="0" u="none" strike="noStrike">
+                        <a:solidFill>
+                          <a:srgbClr val="000000"/>
+                        </a:solidFill>
+                        <a:effectLst/>
+                        <a:latin typeface="Aptos Narrow" panose="020B0004020202020204" pitchFamily="34" charset="0"/>
+                      </a:endParaRPr>
+                    </a:p>
+                  </a:txBody>
+                  <a:tcPr marL="6264" marR="6264" marT="6264" marB="0" anchor="b"/>
+                </a:tc>
+                <a:tc>
+                  <a:txBody>
+                    <a:bodyPr/>
+                    <a:lstStyle/>
+                    <a:p>
+                      <a:pPr algn="l" fontAlgn="b"/>
+                      <a:r>
+                        <a:rPr lang="es-ES" sz="900" u="none" strike="noStrike">
+                          <a:effectLst/>
+                        </a:rPr>
+                        <a:t>integrated circuit</a:t>
+                      </a:r>
+                      <a:endParaRPr lang="es-ES" sz="900" b="0" i="0" u="none" strike="noStrike">
+                        <a:solidFill>
+                          <a:srgbClr val="000000"/>
+                        </a:solidFill>
+                        <a:effectLst/>
+                        <a:latin typeface="Aptos Narrow" panose="020B0004020202020204" pitchFamily="34" charset="0"/>
+                      </a:endParaRPr>
+                    </a:p>
+                  </a:txBody>
+                  <a:tcPr marL="6264" marR="6264" marT="6264" marB="0" anchor="b"/>
+                </a:tc>
+                <a:extLst>
+                  <a:ext uri="{0D108BD9-81ED-4DB2-BD59-A6C34878D82A}">
+                    <a16:rowId xmlns:a16="http://schemas.microsoft.com/office/drawing/2014/main" val="3455650239"/>
+                  </a:ext>
+                </a:extLst>
+              </a:tr>
+              <a:tr h="419659">
+                <a:tc>
+                  <a:txBody>
+                    <a:bodyPr/>
+                    <a:lstStyle/>
+                    <a:p>
+                      <a:pPr algn="l" fontAlgn="b"/>
+                      <a:endParaRPr lang="es-ES" sz="900" b="0" i="0" u="none" strike="noStrike">
+                        <a:solidFill>
+                          <a:srgbClr val="000000"/>
+                        </a:solidFill>
+                        <a:effectLst/>
+                        <a:latin typeface="Aptos Narrow" panose="020B0004020202020204" pitchFamily="34" charset="0"/>
+                      </a:endParaRPr>
+                    </a:p>
+                  </a:txBody>
+                  <a:tcPr marL="6264" marR="6264" marT="6264" marB="0" anchor="b"/>
+                </a:tc>
+                <a:tc>
+                  <a:txBody>
+                    <a:bodyPr/>
+                    <a:lstStyle/>
+                    <a:p>
+                      <a:pPr algn="l" fontAlgn="b"/>
+                      <a:endParaRPr lang="es-ES" sz="900" b="0" i="0" u="none" strike="noStrike">
+                        <a:solidFill>
+                          <a:srgbClr val="000000"/>
+                        </a:solidFill>
+                        <a:effectLst/>
+                        <a:latin typeface="Aptos Narrow" panose="020B0004020202020204" pitchFamily="34" charset="0"/>
+                      </a:endParaRPr>
+                    </a:p>
+                  </a:txBody>
+                  <a:tcPr marL="6264" marR="6264" marT="6264" marB="0" anchor="b"/>
+                </a:tc>
+                <a:tc>
+                  <a:txBody>
+                    <a:bodyPr/>
+                    <a:lstStyle/>
+                    <a:p>
+                      <a:pPr algn="l" fontAlgn="b"/>
+                      <a:endParaRPr lang="es-ES" sz="900" b="0" i="0" u="none" strike="noStrike">
+                        <a:solidFill>
+                          <a:srgbClr val="000000"/>
+                        </a:solidFill>
+                        <a:effectLst/>
+                        <a:latin typeface="Aptos Narrow" panose="020B0004020202020204" pitchFamily="34" charset="0"/>
+                      </a:endParaRPr>
+                    </a:p>
+                  </a:txBody>
+                  <a:tcPr marL="6264" marR="6264" marT="6264" marB="0" anchor="b"/>
+                </a:tc>
+                <a:tc>
+                  <a:txBody>
+                    <a:bodyPr/>
+                    <a:lstStyle/>
+                    <a:p>
+                      <a:pPr algn="l" fontAlgn="b"/>
+                      <a:endParaRPr lang="es-ES" sz="900" b="0" i="0" u="none" strike="noStrike">
+                        <a:solidFill>
+                          <a:srgbClr val="000000"/>
+                        </a:solidFill>
+                        <a:effectLst/>
+                        <a:latin typeface="Aptos Narrow" panose="020B0004020202020204" pitchFamily="34" charset="0"/>
+                      </a:endParaRPr>
+                    </a:p>
+                  </a:txBody>
+                  <a:tcPr marL="6264" marR="6264" marT="6264" marB="0" anchor="b">
+                    <a:lnR w="9525" cap="flat" cmpd="sng">
+                      <a:noFill/>
+                      <a:prstDash val="solid"/>
+                      <a:round/>
+                      <a:headEnd type="none" w="sm" len="sm"/>
+                      <a:tailEnd type="none" w="sm" len="sm"/>
+                    </a:lnR>
+                  </a:tcPr>
+                </a:tc>
+                <a:tc>
+                  <a:txBody>
+                    <a:bodyPr/>
+                    <a:lstStyle/>
+                    <a:p>
+                      <a:pPr algn="l" fontAlgn="b"/>
+                      <a:endParaRPr lang="es-ES" sz="900" b="0" i="0" u="none" strike="noStrike" dirty="0">
+                        <a:solidFill>
+                          <a:srgbClr val="000000"/>
+                        </a:solidFill>
+                        <a:effectLst/>
+                        <a:latin typeface="Aptos Narrow" panose="020B0004020202020204" pitchFamily="34" charset="0"/>
+                      </a:endParaRPr>
+                    </a:p>
+                  </a:txBody>
+                  <a:tcPr marL="6264" marR="6264" marT="6264" marB="0" anchor="b">
+                    <a:lnL w="9525" cap="flat" cmpd="sng">
+                      <a:noFill/>
+                      <a:prstDash val="solid"/>
+                      <a:round/>
+                      <a:headEnd type="none" w="sm" len="sm"/>
+                      <a:tailEnd type="none" w="sm" len="sm"/>
+                    </a:lnL>
+                    <a:lnR w="9525" cap="flat" cmpd="sng">
+                      <a:noFill/>
+                      <a:prstDash val="solid"/>
+                      <a:round/>
+                      <a:headEnd type="none" w="sm" len="sm"/>
+                      <a:tailEnd type="none" w="sm" len="sm"/>
+                    </a:lnR>
+                    <a:lnT w="9525" cap="flat" cmpd="sng">
+                      <a:noFill/>
+                      <a:prstDash val="solid"/>
+                      <a:round/>
+                      <a:headEnd type="none" w="sm" len="sm"/>
+                      <a:tailEnd type="none" w="sm" len="sm"/>
+                    </a:lnT>
+                    <a:lnB w="9525" cap="flat" cmpd="sng">
+                      <a:noFill/>
+                      <a:prstDash val="solid"/>
+                      <a:round/>
+                      <a:headEnd type="none" w="sm" len="sm"/>
+                      <a:tailEnd type="none" w="sm" len="sm"/>
+                    </a:lnB>
+                    <a:lnTlToBr w="12700" cmpd="sng">
+                      <a:noFill/>
+                      <a:prstDash val="solid"/>
+                    </a:lnTlToBr>
+                    <a:lnBlToTr w="12700" cmpd="sng">
+                      <a:noFill/>
+                      <a:prstDash val="solid"/>
+                    </a:lnBlToTr>
+                    <a:solidFill>
+                      <a:schemeClr val="tx1"/>
+                    </a:solidFill>
+                  </a:tcPr>
+                </a:tc>
+                <a:tc>
+                  <a:txBody>
+                    <a:bodyPr/>
+                    <a:lstStyle/>
+                    <a:p>
+                      <a:pPr algn="l" fontAlgn="b"/>
+                      <a:r>
+                        <a:rPr lang="es-ES" sz="900" u="none" strike="noStrike">
+                          <a:effectLst/>
+                        </a:rPr>
+                        <a:t>Uopamp_linearRegulator</a:t>
+                      </a:r>
+                      <a:endParaRPr lang="es-ES" sz="900" b="0" i="0" u="none" strike="noStrike">
+                        <a:solidFill>
+                          <a:srgbClr val="000000"/>
+                        </a:solidFill>
+                        <a:effectLst/>
+                        <a:latin typeface="Aptos Narrow" panose="020B0004020202020204" pitchFamily="34" charset="0"/>
+                      </a:endParaRPr>
+                    </a:p>
+                  </a:txBody>
+                  <a:tcPr marL="6264" marR="6264" marT="6264" marB="0" anchor="b">
+                    <a:lnL w="9525" cap="flat" cmpd="sng">
+                      <a:noFill/>
+                      <a:prstDash val="solid"/>
+                      <a:round/>
+                      <a:headEnd type="none" w="sm" len="sm"/>
+                      <a:tailEnd type="none" w="sm" len="sm"/>
+                    </a:lnL>
+                  </a:tcPr>
+                </a:tc>
+                <a:tc>
+                  <a:txBody>
+                    <a:bodyPr/>
+                    <a:lstStyle/>
+                    <a:p>
+                      <a:pPr algn="l" fontAlgn="b"/>
+                      <a:r>
+                        <a:rPr lang="es-ES" sz="900" u="none" strike="noStrike">
+                          <a:effectLst/>
+                        </a:rPr>
+                        <a:t>(unknown)</a:t>
+                      </a:r>
+                      <a:endParaRPr lang="es-ES" sz="900" b="0" i="0" u="none" strike="noStrike">
+                        <a:solidFill>
+                          <a:srgbClr val="000000"/>
+                        </a:solidFill>
+                        <a:effectLst/>
+                        <a:latin typeface="Aptos Narrow" panose="020B0004020202020204" pitchFamily="34" charset="0"/>
+                      </a:endParaRPr>
+                    </a:p>
+                  </a:txBody>
+                  <a:tcPr marL="6264" marR="6264" marT="6264" marB="0" anchor="b"/>
+                </a:tc>
+                <a:tc>
+                  <a:txBody>
+                    <a:bodyPr/>
+                    <a:lstStyle/>
+                    <a:p>
+                      <a:pPr algn="l" fontAlgn="b"/>
+                      <a:r>
+                        <a:rPr lang="es-ES" sz="900" u="none" strike="noStrike" dirty="0">
+                          <a:effectLst/>
+                        </a:rPr>
+                        <a:t>LM741</a:t>
+                      </a:r>
+                      <a:endParaRPr lang="es-ES" sz="900" b="0" i="0" u="none" strike="noStrike" dirty="0">
+                        <a:solidFill>
+                          <a:srgbClr val="000000"/>
+                        </a:solidFill>
+                        <a:effectLst/>
+                        <a:latin typeface="Aptos Narrow" panose="020B0004020202020204" pitchFamily="34" charset="0"/>
+                      </a:endParaRPr>
+                    </a:p>
+                  </a:txBody>
+                  <a:tcPr marL="6264" marR="6264" marT="6264" marB="0" anchor="b"/>
+                </a:tc>
+                <a:tc>
+                  <a:txBody>
+                    <a:bodyPr/>
+                    <a:lstStyle/>
+                    <a:p>
+                      <a:pPr algn="l" fontAlgn="b"/>
+                      <a:r>
+                        <a:rPr lang="es-ES" sz="900" u="none" strike="noStrike" dirty="0">
+                          <a:effectLst/>
+                        </a:rPr>
+                        <a:t>(</a:t>
+                      </a:r>
+                      <a:r>
+                        <a:rPr lang="es-ES" sz="900" u="none" strike="noStrike" dirty="0" err="1">
+                          <a:effectLst/>
+                        </a:rPr>
+                        <a:t>unknown</a:t>
+                      </a:r>
+                      <a:r>
+                        <a:rPr lang="es-ES" sz="900" u="none" strike="noStrike" dirty="0">
+                          <a:effectLst/>
+                        </a:rPr>
+                        <a:t> 3rd </a:t>
+                      </a:r>
+                      <a:r>
+                        <a:rPr lang="es-ES" sz="900" u="none" strike="noStrike" dirty="0" err="1">
+                          <a:effectLst/>
+                        </a:rPr>
+                        <a:t>party</a:t>
+                      </a:r>
+                      <a:r>
+                        <a:rPr lang="es-ES" sz="900" u="none" strike="noStrike" dirty="0">
+                          <a:effectLst/>
+                        </a:rPr>
+                        <a:t> </a:t>
+                      </a:r>
+                      <a:r>
+                        <a:rPr lang="es-ES" sz="900" u="none" strike="noStrike" dirty="0" err="1">
+                          <a:effectLst/>
+                        </a:rPr>
+                        <a:t>model</a:t>
+                      </a:r>
+                      <a:r>
+                        <a:rPr lang="es-ES" sz="900" u="none" strike="noStrike" dirty="0">
+                          <a:effectLst/>
+                        </a:rPr>
+                        <a:t>)</a:t>
+                      </a:r>
+                      <a:endParaRPr lang="es-ES" sz="900" b="0" i="0" u="none" strike="noStrike" dirty="0">
+                        <a:solidFill>
+                          <a:srgbClr val="000000"/>
+                        </a:solidFill>
+                        <a:effectLst/>
+                        <a:latin typeface="Aptos Narrow" panose="020B0004020202020204" pitchFamily="34" charset="0"/>
+                      </a:endParaRPr>
+                    </a:p>
+                  </a:txBody>
+                  <a:tcPr marL="6264" marR="6264" marT="6264" marB="0" anchor="b"/>
+                </a:tc>
+                <a:extLst>
+                  <a:ext uri="{0D108BD9-81ED-4DB2-BD59-A6C34878D82A}">
+                    <a16:rowId xmlns:a16="http://schemas.microsoft.com/office/drawing/2014/main" val="3276213219"/>
+                  </a:ext>
+                </a:extLst>
+              </a:tr>
+            </a:tbl>
+          </a:graphicData>
+        </a:graphic>
+      </p:graphicFrame>
+    </p:spTree>
+    <p:extLst>
+      <p:ext uri="{BB962C8B-B14F-4D97-AF65-F5344CB8AC3E}">
+        <p14:creationId xmlns:p14="http://schemas.microsoft.com/office/powerpoint/2010/main" val="706751097"/>
       </p:ext>
     </p:extLst>
   </p:cSld>

</xml_diff>

<commit_message>
Added cart status to ppt
</commit_message>
<xml_diff>
--- a/doc/march-25.pptx
+++ b/doc/march-25.pptx
@@ -5,7 +5,7 @@
     <p:sldMasterId id="2147483684" r:id="rId1"/>
   </p:sldMasterIdLst>
   <p:notesMasterIdLst>
-    <p:notesMasterId r:id="rId25"/>
+    <p:notesMasterId r:id="rId26"/>
   </p:notesMasterIdLst>
   <p:sldIdLst>
     <p:sldId id="256" r:id="rId2"/>
@@ -31,39 +31,40 @@
     <p:sldId id="335" r:id="rId22"/>
     <p:sldId id="334" r:id="rId23"/>
     <p:sldId id="336" r:id="rId24"/>
+    <p:sldId id="337" r:id="rId25"/>
   </p:sldIdLst>
   <p:sldSz cx="9144000" cy="5143500" type="screen16x9"/>
   <p:notesSz cx="6858000" cy="9144000"/>
   <p:embeddedFontLst>
     <p:embeddedFont>
       <p:font typeface="Anton" pitchFamily="2" charset="0"/>
-      <p:regular r:id="rId26"/>
+      <p:regular r:id="rId27"/>
     </p:embeddedFont>
     <p:embeddedFont>
       <p:font typeface="Aptos Narrow" panose="020B0004020202020204" pitchFamily="34" charset="0"/>
-      <p:regular r:id="rId27"/>
-      <p:bold r:id="rId28"/>
-      <p:italic r:id="rId29"/>
-      <p:boldItalic r:id="rId30"/>
+      <p:regular r:id="rId28"/>
+      <p:bold r:id="rId29"/>
+      <p:italic r:id="rId30"/>
+      <p:boldItalic r:id="rId31"/>
     </p:embeddedFont>
     <p:embeddedFont>
       <p:font typeface="Hind" panose="02000000000000000000" pitchFamily="2" charset="0"/>
-      <p:regular r:id="rId31"/>
-      <p:bold r:id="rId32"/>
+      <p:regular r:id="rId32"/>
+      <p:bold r:id="rId33"/>
     </p:embeddedFont>
     <p:embeddedFont>
       <p:font typeface="Poppins" panose="00000500000000000000" pitchFamily="2" charset="0"/>
-      <p:regular r:id="rId33"/>
-      <p:bold r:id="rId34"/>
-      <p:italic r:id="rId35"/>
-      <p:boldItalic r:id="rId36"/>
+      <p:regular r:id="rId34"/>
+      <p:bold r:id="rId35"/>
+      <p:italic r:id="rId36"/>
+      <p:boldItalic r:id="rId37"/>
     </p:embeddedFont>
     <p:embeddedFont>
       <p:font typeface="Roboto" panose="02000000000000000000" pitchFamily="2" charset="0"/>
-      <p:regular r:id="rId37"/>
-      <p:bold r:id="rId38"/>
-      <p:italic r:id="rId39"/>
-      <p:boldItalic r:id="rId40"/>
+      <p:regular r:id="rId38"/>
+      <p:bold r:id="rId39"/>
+      <p:italic r:id="rId40"/>
+      <p:boldItalic r:id="rId41"/>
     </p:embeddedFont>
   </p:embeddedFontLst>
   <p:defaultTextStyle>
@@ -30862,12 +30863,12 @@
                     <a:p>
                       <a:pPr algn="l" fontAlgn="b"/>
                       <a:r>
-                        <a:rPr lang="es-ES" sz="900" u="none" strike="noStrike">
+                        <a:rPr lang="es-ES" sz="900" u="none" strike="noStrike" dirty="0">
                           <a:effectLst/>
                         </a:rPr>
                         <a:t>2N3904</a:t>
                       </a:r>
-                      <a:endParaRPr lang="es-ES" sz="900" b="0" i="0" u="none" strike="noStrike">
+                      <a:endParaRPr lang="es-ES" sz="900" b="0" i="0" u="none" strike="noStrike" dirty="0">
                         <a:solidFill>
                           <a:srgbClr val="000000"/>
                         </a:solidFill>
@@ -31654,12 +31655,12 @@
                     <a:p>
                       <a:pPr algn="l" fontAlgn="b"/>
                       <a:r>
-                        <a:rPr lang="es-ES" sz="900" u="none" strike="noStrike">
+                        <a:rPr lang="es-ES" sz="900" u="none" strike="noStrike" dirty="0">
                           <a:effectLst/>
                         </a:rPr>
                         <a:t>BC547B</a:t>
                       </a:r>
-                      <a:endParaRPr lang="es-ES" sz="900" b="0" i="0" u="none" strike="noStrike">
+                      <a:endParaRPr lang="es-ES" sz="900" b="0" i="0" u="none" strike="noStrike" dirty="0">
                         <a:solidFill>
                           <a:srgbClr val="000000"/>
                         </a:solidFill>
@@ -34269,6 +34270,1737 @@
 </p:sld>
 </file>
 
+<file path=ppt/slides/slide24.xml><?xml version="1.0" encoding="utf-8"?>
+<p:sld xmlns:a="http://schemas.openxmlformats.org/drawingml/2006/main" xmlns:r="http://schemas.openxmlformats.org/officeDocument/2006/relationships" xmlns:p="http://schemas.openxmlformats.org/presentationml/2006/main">
+  <p:cSld>
+    <p:spTree>
+      <p:nvGrpSpPr>
+        <p:cNvPr id="1" name=""/>
+        <p:cNvGrpSpPr/>
+        <p:nvPr/>
+      </p:nvGrpSpPr>
+      <p:grpSpPr>
+        <a:xfrm>
+          <a:off x="0" y="0"/>
+          <a:ext cx="0" cy="0"/>
+          <a:chOff x="0" y="0"/>
+          <a:chExt cx="0" cy="0"/>
+        </a:xfrm>
+      </p:grpSpPr>
+      <p:sp>
+        <p:nvSpPr>
+          <p:cNvPr id="2" name="Title 1">
+            <a:extLst>
+              <a:ext uri="{FF2B5EF4-FFF2-40B4-BE49-F238E27FC236}">
+                <a16:creationId xmlns:a16="http://schemas.microsoft.com/office/drawing/2014/main" id="{C68A618E-AD8D-3CBD-9552-EE0352A466EE}"/>
+              </a:ext>
+            </a:extLst>
+          </p:cNvPr>
+          <p:cNvSpPr>
+            <a:spLocks noGrp="1"/>
+          </p:cNvSpPr>
+          <p:nvPr>
+            <p:ph type="title"/>
+          </p:nvPr>
+        </p:nvSpPr>
+        <p:spPr/>
+        <p:txBody>
+          <a:bodyPr/>
+          <a:lstStyle/>
+          <a:p>
+            <a:r>
+              <a:rPr lang="es-ES" dirty="0"/>
+              <a:t>Estado del pedido</a:t>
+            </a:r>
+          </a:p>
+        </p:txBody>
+      </p:sp>
+      <p:graphicFrame>
+        <p:nvGraphicFramePr>
+          <p:cNvPr id="3" name="Table 2">
+            <a:extLst>
+              <a:ext uri="{FF2B5EF4-FFF2-40B4-BE49-F238E27FC236}">
+                <a16:creationId xmlns:a16="http://schemas.microsoft.com/office/drawing/2014/main" id="{52DF3FB2-96B4-8FA1-2AFD-2E7AF651DB0A}"/>
+              </a:ext>
+            </a:extLst>
+          </p:cNvPr>
+          <p:cNvGraphicFramePr>
+            <a:graphicFrameLocks noGrp="1"/>
+          </p:cNvGraphicFramePr>
+          <p:nvPr>
+            <p:extLst>
+              <p:ext uri="{D42A27DB-BD31-4B8C-83A1-F6EECF244321}">
+                <p14:modId xmlns:p14="http://schemas.microsoft.com/office/powerpoint/2010/main" val="3547977532"/>
+              </p:ext>
+            </p:extLst>
+          </p:nvPr>
+        </p:nvGraphicFramePr>
+        <p:xfrm>
+          <a:off x="1409954" y="1343851"/>
+          <a:ext cx="5941822" cy="2331720"/>
+        </p:xfrm>
+        <a:graphic>
+          <a:graphicData uri="http://schemas.openxmlformats.org/drawingml/2006/table">
+            <a:tbl>
+              <a:tblPr>
+                <a:tableStyleId>{B2CCBE0B-4CB8-4436-A4CF-8A1F351D8455}</a:tableStyleId>
+              </a:tblPr>
+              <a:tblGrid>
+                <a:gridCol w="1230711">
+                  <a:extLst>
+                    <a:ext uri="{9D8B030D-6E8A-4147-A177-3AD203B41FA5}">
+                      <a16:colId xmlns:a16="http://schemas.microsoft.com/office/drawing/2014/main" val="4130147290"/>
+                    </a:ext>
+                  </a:extLst>
+                </a:gridCol>
+                <a:gridCol w="755630">
+                  <a:extLst>
+                    <a:ext uri="{9D8B030D-6E8A-4147-A177-3AD203B41FA5}">
+                      <a16:colId xmlns:a16="http://schemas.microsoft.com/office/drawing/2014/main" val="86521473"/>
+                    </a:ext>
+                  </a:extLst>
+                </a:gridCol>
+                <a:gridCol w="705079">
+                  <a:extLst>
+                    <a:ext uri="{9D8B030D-6E8A-4147-A177-3AD203B41FA5}">
+                      <a16:colId xmlns:a16="http://schemas.microsoft.com/office/drawing/2014/main" val="301871565"/>
+                    </a:ext>
+                  </a:extLst>
+                </a:gridCol>
+                <a:gridCol w="774951">
+                  <a:extLst>
+                    <a:ext uri="{9D8B030D-6E8A-4147-A177-3AD203B41FA5}">
+                      <a16:colId xmlns:a16="http://schemas.microsoft.com/office/drawing/2014/main" val="3340288399"/>
+                    </a:ext>
+                  </a:extLst>
+                </a:gridCol>
+                <a:gridCol w="1346637">
+                  <a:extLst>
+                    <a:ext uri="{9D8B030D-6E8A-4147-A177-3AD203B41FA5}">
+                      <a16:colId xmlns:a16="http://schemas.microsoft.com/office/drawing/2014/main" val="2607239484"/>
+                    </a:ext>
+                  </a:extLst>
+                </a:gridCol>
+                <a:gridCol w="1128814">
+                  <a:extLst>
+                    <a:ext uri="{9D8B030D-6E8A-4147-A177-3AD203B41FA5}">
+                      <a16:colId xmlns:a16="http://schemas.microsoft.com/office/drawing/2014/main" val="2288655845"/>
+                    </a:ext>
+                  </a:extLst>
+                </a:gridCol>
+              </a:tblGrid>
+              <a:tr h="182880">
+                <a:tc>
+                  <a:txBody>
+                    <a:bodyPr/>
+                    <a:lstStyle/>
+                    <a:p>
+                      <a:pPr algn="l" fontAlgn="b"/>
+                      <a:r>
+                        <a:rPr lang="es-ES" sz="1100" b="1" u="none" strike="noStrike">
+                          <a:effectLst/>
+                        </a:rPr>
+                        <a:t>Componente</a:t>
+                      </a:r>
+                      <a:endParaRPr lang="es-ES" sz="1100" b="1" i="0" u="none" strike="noStrike">
+                        <a:solidFill>
+                          <a:srgbClr val="000000"/>
+                        </a:solidFill>
+                        <a:effectLst/>
+                        <a:latin typeface="Aptos Narrow" panose="020B0004020202020204" pitchFamily="34" charset="0"/>
+                      </a:endParaRPr>
+                    </a:p>
+                  </a:txBody>
+                  <a:tcPr marL="7620" marR="7620" marT="7620" marB="0" anchor="b"/>
+                </a:tc>
+                <a:tc>
+                  <a:txBody>
+                    <a:bodyPr/>
+                    <a:lstStyle/>
+                    <a:p>
+                      <a:pPr algn="l" fontAlgn="b"/>
+                      <a:r>
+                        <a:rPr lang="es-ES" sz="1100" b="1" u="none" strike="noStrike" dirty="0">
+                          <a:effectLst/>
+                        </a:rPr>
+                        <a:t>Cantidad</a:t>
+                      </a:r>
+                      <a:endParaRPr lang="es-ES" sz="1100" b="1" i="0" u="none" strike="noStrike" dirty="0">
+                        <a:solidFill>
+                          <a:srgbClr val="000000"/>
+                        </a:solidFill>
+                        <a:effectLst/>
+                        <a:latin typeface="Aptos Narrow" panose="020B0004020202020204" pitchFamily="34" charset="0"/>
+                      </a:endParaRPr>
+                    </a:p>
+                  </a:txBody>
+                  <a:tcPr marL="7620" marR="7620" marT="7620" marB="0" anchor="b"/>
+                </a:tc>
+                <a:tc>
+                  <a:txBody>
+                    <a:bodyPr/>
+                    <a:lstStyle/>
+                    <a:p>
+                      <a:pPr algn="l" fontAlgn="b"/>
+                      <a:r>
+                        <a:rPr lang="es-ES" sz="1100" b="1" u="none" strike="noStrike">
+                          <a:effectLst/>
+                        </a:rPr>
+                        <a:t>Precio unidad</a:t>
+                      </a:r>
+                      <a:endParaRPr lang="es-ES" sz="1100" b="1" i="0" u="none" strike="noStrike">
+                        <a:solidFill>
+                          <a:srgbClr val="000000"/>
+                        </a:solidFill>
+                        <a:effectLst/>
+                        <a:latin typeface="Aptos Narrow" panose="020B0004020202020204" pitchFamily="34" charset="0"/>
+                      </a:endParaRPr>
+                    </a:p>
+                  </a:txBody>
+                  <a:tcPr marL="7620" marR="7620" marT="7620" marB="0" anchor="b"/>
+                </a:tc>
+                <a:tc>
+                  <a:txBody>
+                    <a:bodyPr/>
+                    <a:lstStyle/>
+                    <a:p>
+                      <a:pPr algn="l" fontAlgn="b"/>
+                      <a:r>
+                        <a:rPr lang="es-ES" sz="1100" b="1" u="none" strike="noStrike">
+                          <a:effectLst/>
+                        </a:rPr>
+                        <a:t>Precio total</a:t>
+                      </a:r>
+                      <a:endParaRPr lang="es-ES" sz="1100" b="1" i="0" u="none" strike="noStrike">
+                        <a:solidFill>
+                          <a:srgbClr val="000000"/>
+                        </a:solidFill>
+                        <a:effectLst/>
+                        <a:latin typeface="Aptos Narrow" panose="020B0004020202020204" pitchFamily="34" charset="0"/>
+                      </a:endParaRPr>
+                    </a:p>
+                  </a:txBody>
+                  <a:tcPr marL="7620" marR="7620" marT="7620" marB="0" anchor="b"/>
+                </a:tc>
+                <a:tc>
+                  <a:txBody>
+                    <a:bodyPr/>
+                    <a:lstStyle/>
+                    <a:p>
+                      <a:pPr algn="l" fontAlgn="b"/>
+                      <a:r>
+                        <a:rPr lang="es-ES" sz="1100" b="1" u="none" strike="noStrike">
+                          <a:effectLst/>
+                        </a:rPr>
+                        <a:t>Estado</a:t>
+                      </a:r>
+                      <a:endParaRPr lang="es-ES" sz="1100" b="1" i="0" u="none" strike="noStrike">
+                        <a:solidFill>
+                          <a:srgbClr val="000000"/>
+                        </a:solidFill>
+                        <a:effectLst/>
+                        <a:latin typeface="Aptos Narrow" panose="020B0004020202020204" pitchFamily="34" charset="0"/>
+                      </a:endParaRPr>
+                    </a:p>
+                  </a:txBody>
+                  <a:tcPr marL="7620" marR="7620" marT="7620" marB="0" anchor="b"/>
+                </a:tc>
+                <a:tc>
+                  <a:txBody>
+                    <a:bodyPr/>
+                    <a:lstStyle/>
+                    <a:p>
+                      <a:pPr algn="l" fontAlgn="b"/>
+                      <a:r>
+                        <a:rPr lang="es-ES" sz="1100" b="1" u="none" strike="noStrike" dirty="0">
+                          <a:effectLst/>
+                        </a:rPr>
+                        <a:t>Notas</a:t>
+                      </a:r>
+                      <a:endParaRPr lang="es-ES" sz="1100" b="1" i="0" u="none" strike="noStrike" dirty="0">
+                        <a:solidFill>
+                          <a:srgbClr val="000000"/>
+                        </a:solidFill>
+                        <a:effectLst/>
+                        <a:latin typeface="Aptos Narrow" panose="020B0004020202020204" pitchFamily="34" charset="0"/>
+                      </a:endParaRPr>
+                    </a:p>
+                  </a:txBody>
+                  <a:tcPr marL="7620" marR="7620" marT="7620" marB="0" anchor="b"/>
+                </a:tc>
+                <a:extLst>
+                  <a:ext uri="{0D108BD9-81ED-4DB2-BD59-A6C34878D82A}">
+                    <a16:rowId xmlns:a16="http://schemas.microsoft.com/office/drawing/2014/main" val="2475071852"/>
+                  </a:ext>
+                </a:extLst>
+              </a:tr>
+              <a:tr h="182880">
+                <a:tc>
+                  <a:txBody>
+                    <a:bodyPr/>
+                    <a:lstStyle/>
+                    <a:p>
+                      <a:pPr algn="l" fontAlgn="b"/>
+                      <a:r>
+                        <a:rPr lang="es-ES" sz="1100" u="none" strike="noStrike">
+                          <a:effectLst/>
+                        </a:rPr>
+                        <a:t>Resistencias</a:t>
+                      </a:r>
+                      <a:endParaRPr lang="es-ES" sz="1100" b="0" i="0" u="none" strike="noStrike">
+                        <a:solidFill>
+                          <a:srgbClr val="000000"/>
+                        </a:solidFill>
+                        <a:effectLst/>
+                        <a:latin typeface="Aptos Narrow" panose="020B0004020202020204" pitchFamily="34" charset="0"/>
+                      </a:endParaRPr>
+                    </a:p>
+                  </a:txBody>
+                  <a:tcPr marL="7620" marR="7620" marT="7620" marB="0" anchor="b"/>
+                </a:tc>
+                <a:tc>
+                  <a:txBody>
+                    <a:bodyPr/>
+                    <a:lstStyle/>
+                    <a:p>
+                      <a:pPr algn="l" fontAlgn="b"/>
+                      <a:r>
+                        <a:rPr lang="es-ES" sz="1100" u="none" strike="noStrike">
+                          <a:effectLst/>
+                        </a:rPr>
+                        <a:t> </a:t>
+                      </a:r>
+                      <a:endParaRPr lang="es-ES" sz="1100" b="0" i="0" u="none" strike="noStrike">
+                        <a:solidFill>
+                          <a:srgbClr val="000000"/>
+                        </a:solidFill>
+                        <a:effectLst/>
+                        <a:latin typeface="Aptos Narrow" panose="020B0004020202020204" pitchFamily="34" charset="0"/>
+                      </a:endParaRPr>
+                    </a:p>
+                  </a:txBody>
+                  <a:tcPr marL="7620" marR="7620" marT="7620" marB="0" anchor="b"/>
+                </a:tc>
+                <a:tc>
+                  <a:txBody>
+                    <a:bodyPr/>
+                    <a:lstStyle/>
+                    <a:p>
+                      <a:pPr algn="l" fontAlgn="b"/>
+                      <a:r>
+                        <a:rPr lang="es-ES" sz="1100" u="none" strike="noStrike">
+                          <a:effectLst/>
+                        </a:rPr>
+                        <a:t> </a:t>
+                      </a:r>
+                      <a:endParaRPr lang="es-ES" sz="1100" b="0" i="0" u="none" strike="noStrike">
+                        <a:solidFill>
+                          <a:srgbClr val="000000"/>
+                        </a:solidFill>
+                        <a:effectLst/>
+                        <a:latin typeface="Aptos Narrow" panose="020B0004020202020204" pitchFamily="34" charset="0"/>
+                      </a:endParaRPr>
+                    </a:p>
+                  </a:txBody>
+                  <a:tcPr marL="7620" marR="7620" marT="7620" marB="0" anchor="b"/>
+                </a:tc>
+                <a:tc>
+                  <a:txBody>
+                    <a:bodyPr/>
+                    <a:lstStyle/>
+                    <a:p>
+                      <a:pPr algn="r" fontAlgn="b"/>
+                      <a:r>
+                        <a:rPr lang="es-ES" sz="1100" u="none" strike="noStrike">
+                          <a:effectLst/>
+                        </a:rPr>
+                        <a:t>0</a:t>
+                      </a:r>
+                      <a:endParaRPr lang="es-ES" sz="1100" b="0" i="0" u="none" strike="noStrike">
+                        <a:solidFill>
+                          <a:srgbClr val="000000"/>
+                        </a:solidFill>
+                        <a:effectLst/>
+                        <a:latin typeface="Aptos Narrow" panose="020B0004020202020204" pitchFamily="34" charset="0"/>
+                      </a:endParaRPr>
+                    </a:p>
+                  </a:txBody>
+                  <a:tcPr marL="7620" marR="7620" marT="7620" marB="0" anchor="b"/>
+                </a:tc>
+                <a:tc>
+                  <a:txBody>
+                    <a:bodyPr/>
+                    <a:lstStyle/>
+                    <a:p>
+                      <a:pPr algn="l" fontAlgn="b"/>
+                      <a:r>
+                        <a:rPr lang="es-ES" sz="1100" u="none" strike="noStrike">
+                          <a:effectLst/>
+                        </a:rPr>
+                        <a:t>OK</a:t>
+                      </a:r>
+                      <a:endParaRPr lang="es-ES" sz="1100" b="0" i="0" u="none" strike="noStrike">
+                        <a:solidFill>
+                          <a:srgbClr val="000000"/>
+                        </a:solidFill>
+                        <a:effectLst/>
+                        <a:latin typeface="Aptos Narrow" panose="020B0004020202020204" pitchFamily="34" charset="0"/>
+                      </a:endParaRPr>
+                    </a:p>
+                  </a:txBody>
+                  <a:tcPr marL="7620" marR="7620" marT="7620" marB="0" anchor="b"/>
+                </a:tc>
+                <a:tc>
+                  <a:txBody>
+                    <a:bodyPr/>
+                    <a:lstStyle/>
+                    <a:p>
+                      <a:pPr algn="l" fontAlgn="b"/>
+                      <a:r>
+                        <a:rPr lang="es-ES" sz="1100" u="none" strike="noStrike">
+                          <a:effectLst/>
+                        </a:rPr>
+                        <a:t> </a:t>
+                      </a:r>
+                      <a:endParaRPr lang="es-ES" sz="1100" b="0" i="0" u="none" strike="noStrike">
+                        <a:solidFill>
+                          <a:srgbClr val="000000"/>
+                        </a:solidFill>
+                        <a:effectLst/>
+                        <a:latin typeface="Aptos Narrow" panose="020B0004020202020204" pitchFamily="34" charset="0"/>
+                      </a:endParaRPr>
+                    </a:p>
+                  </a:txBody>
+                  <a:tcPr marL="7620" marR="7620" marT="7620" marB="0" anchor="b"/>
+                </a:tc>
+                <a:extLst>
+                  <a:ext uri="{0D108BD9-81ED-4DB2-BD59-A6C34878D82A}">
+                    <a16:rowId xmlns:a16="http://schemas.microsoft.com/office/drawing/2014/main" val="1254566024"/>
+                  </a:ext>
+                </a:extLst>
+              </a:tr>
+              <a:tr h="182880">
+                <a:tc>
+                  <a:txBody>
+                    <a:bodyPr/>
+                    <a:lstStyle/>
+                    <a:p>
+                      <a:pPr algn="l" fontAlgn="b"/>
+                      <a:r>
+                        <a:rPr lang="es-ES" sz="1100" u="none" strike="noStrike">
+                          <a:effectLst/>
+                        </a:rPr>
+                        <a:t>Condensadores</a:t>
+                      </a:r>
+                      <a:endParaRPr lang="es-ES" sz="1100" b="0" i="0" u="none" strike="noStrike">
+                        <a:solidFill>
+                          <a:srgbClr val="000000"/>
+                        </a:solidFill>
+                        <a:effectLst/>
+                        <a:latin typeface="Aptos Narrow" panose="020B0004020202020204" pitchFamily="34" charset="0"/>
+                      </a:endParaRPr>
+                    </a:p>
+                  </a:txBody>
+                  <a:tcPr marL="7620" marR="7620" marT="7620" marB="0" anchor="b"/>
+                </a:tc>
+                <a:tc>
+                  <a:txBody>
+                    <a:bodyPr/>
+                    <a:lstStyle/>
+                    <a:p>
+                      <a:pPr algn="l" fontAlgn="b"/>
+                      <a:r>
+                        <a:rPr lang="es-ES" sz="1100" u="none" strike="noStrike">
+                          <a:effectLst/>
+                        </a:rPr>
+                        <a:t> </a:t>
+                      </a:r>
+                      <a:endParaRPr lang="es-ES" sz="1100" b="0" i="0" u="none" strike="noStrike">
+                        <a:solidFill>
+                          <a:srgbClr val="000000"/>
+                        </a:solidFill>
+                        <a:effectLst/>
+                        <a:latin typeface="Aptos Narrow" panose="020B0004020202020204" pitchFamily="34" charset="0"/>
+                      </a:endParaRPr>
+                    </a:p>
+                  </a:txBody>
+                  <a:tcPr marL="7620" marR="7620" marT="7620" marB="0" anchor="b"/>
+                </a:tc>
+                <a:tc>
+                  <a:txBody>
+                    <a:bodyPr/>
+                    <a:lstStyle/>
+                    <a:p>
+                      <a:pPr algn="l" fontAlgn="b"/>
+                      <a:r>
+                        <a:rPr lang="es-ES" sz="1100" u="none" strike="noStrike">
+                          <a:effectLst/>
+                        </a:rPr>
+                        <a:t> </a:t>
+                      </a:r>
+                      <a:endParaRPr lang="es-ES" sz="1100" b="0" i="0" u="none" strike="noStrike">
+                        <a:solidFill>
+                          <a:srgbClr val="000000"/>
+                        </a:solidFill>
+                        <a:effectLst/>
+                        <a:latin typeface="Aptos Narrow" panose="020B0004020202020204" pitchFamily="34" charset="0"/>
+                      </a:endParaRPr>
+                    </a:p>
+                  </a:txBody>
+                  <a:tcPr marL="7620" marR="7620" marT="7620" marB="0" anchor="b"/>
+                </a:tc>
+                <a:tc>
+                  <a:txBody>
+                    <a:bodyPr/>
+                    <a:lstStyle/>
+                    <a:p>
+                      <a:pPr algn="r" fontAlgn="b"/>
+                      <a:r>
+                        <a:rPr lang="es-ES" sz="1100" u="none" strike="noStrike">
+                          <a:effectLst/>
+                        </a:rPr>
+                        <a:t>0</a:t>
+                      </a:r>
+                      <a:endParaRPr lang="es-ES" sz="1100" b="0" i="0" u="none" strike="noStrike">
+                        <a:solidFill>
+                          <a:srgbClr val="000000"/>
+                        </a:solidFill>
+                        <a:effectLst/>
+                        <a:latin typeface="Aptos Narrow" panose="020B0004020202020204" pitchFamily="34" charset="0"/>
+                      </a:endParaRPr>
+                    </a:p>
+                  </a:txBody>
+                  <a:tcPr marL="7620" marR="7620" marT="7620" marB="0" anchor="b"/>
+                </a:tc>
+                <a:tc>
+                  <a:txBody>
+                    <a:bodyPr/>
+                    <a:lstStyle/>
+                    <a:p>
+                      <a:pPr algn="l" fontAlgn="b"/>
+                      <a:r>
+                        <a:rPr lang="es-ES" sz="1100" u="none" strike="noStrike">
+                          <a:effectLst/>
+                        </a:rPr>
+                        <a:t>OK</a:t>
+                      </a:r>
+                      <a:endParaRPr lang="es-ES" sz="1100" b="0" i="0" u="none" strike="noStrike">
+                        <a:solidFill>
+                          <a:srgbClr val="000000"/>
+                        </a:solidFill>
+                        <a:effectLst/>
+                        <a:latin typeface="Aptos Narrow" panose="020B0004020202020204" pitchFamily="34" charset="0"/>
+                      </a:endParaRPr>
+                    </a:p>
+                  </a:txBody>
+                  <a:tcPr marL="7620" marR="7620" marT="7620" marB="0" anchor="b"/>
+                </a:tc>
+                <a:tc>
+                  <a:txBody>
+                    <a:bodyPr/>
+                    <a:lstStyle/>
+                    <a:p>
+                      <a:pPr algn="l" fontAlgn="b"/>
+                      <a:r>
+                        <a:rPr lang="es-ES" sz="1100" u="none" strike="noStrike">
+                          <a:effectLst/>
+                        </a:rPr>
+                        <a:t> </a:t>
+                      </a:r>
+                      <a:endParaRPr lang="es-ES" sz="1100" b="0" i="0" u="none" strike="noStrike">
+                        <a:solidFill>
+                          <a:srgbClr val="000000"/>
+                        </a:solidFill>
+                        <a:effectLst/>
+                        <a:latin typeface="Aptos Narrow" panose="020B0004020202020204" pitchFamily="34" charset="0"/>
+                      </a:endParaRPr>
+                    </a:p>
+                  </a:txBody>
+                  <a:tcPr marL="7620" marR="7620" marT="7620" marB="0" anchor="b"/>
+                </a:tc>
+                <a:extLst>
+                  <a:ext uri="{0D108BD9-81ED-4DB2-BD59-A6C34878D82A}">
+                    <a16:rowId xmlns:a16="http://schemas.microsoft.com/office/drawing/2014/main" val="3508672852"/>
+                  </a:ext>
+                </a:extLst>
+              </a:tr>
+              <a:tr h="182880">
+                <a:tc>
+                  <a:txBody>
+                    <a:bodyPr/>
+                    <a:lstStyle/>
+                    <a:p>
+                      <a:pPr algn="l" fontAlgn="b"/>
+                      <a:r>
+                        <a:rPr lang="es-ES" sz="1100" u="none" strike="noStrike">
+                          <a:effectLst/>
+                        </a:rPr>
+                        <a:t>Protoboard</a:t>
+                      </a:r>
+                      <a:endParaRPr lang="es-ES" sz="1100" b="0" i="0" u="none" strike="noStrike">
+                        <a:solidFill>
+                          <a:srgbClr val="000000"/>
+                        </a:solidFill>
+                        <a:effectLst/>
+                        <a:latin typeface="Aptos Narrow" panose="020B0004020202020204" pitchFamily="34" charset="0"/>
+                      </a:endParaRPr>
+                    </a:p>
+                  </a:txBody>
+                  <a:tcPr marL="7620" marR="7620" marT="7620" marB="0" anchor="b"/>
+                </a:tc>
+                <a:tc>
+                  <a:txBody>
+                    <a:bodyPr/>
+                    <a:lstStyle/>
+                    <a:p>
+                      <a:pPr algn="l" fontAlgn="b"/>
+                      <a:r>
+                        <a:rPr lang="es-ES" sz="1100" u="none" strike="noStrike">
+                          <a:effectLst/>
+                        </a:rPr>
+                        <a:t> </a:t>
+                      </a:r>
+                      <a:endParaRPr lang="es-ES" sz="1100" b="0" i="0" u="none" strike="noStrike">
+                        <a:solidFill>
+                          <a:srgbClr val="000000"/>
+                        </a:solidFill>
+                        <a:effectLst/>
+                        <a:latin typeface="Aptos Narrow" panose="020B0004020202020204" pitchFamily="34" charset="0"/>
+                      </a:endParaRPr>
+                    </a:p>
+                  </a:txBody>
+                  <a:tcPr marL="7620" marR="7620" marT="7620" marB="0" anchor="b"/>
+                </a:tc>
+                <a:tc>
+                  <a:txBody>
+                    <a:bodyPr/>
+                    <a:lstStyle/>
+                    <a:p>
+                      <a:pPr algn="l" fontAlgn="b"/>
+                      <a:r>
+                        <a:rPr lang="es-ES" sz="1100" u="none" strike="noStrike">
+                          <a:effectLst/>
+                        </a:rPr>
+                        <a:t> </a:t>
+                      </a:r>
+                      <a:endParaRPr lang="es-ES" sz="1100" b="0" i="0" u="none" strike="noStrike">
+                        <a:solidFill>
+                          <a:srgbClr val="000000"/>
+                        </a:solidFill>
+                        <a:effectLst/>
+                        <a:latin typeface="Aptos Narrow" panose="020B0004020202020204" pitchFamily="34" charset="0"/>
+                      </a:endParaRPr>
+                    </a:p>
+                  </a:txBody>
+                  <a:tcPr marL="7620" marR="7620" marT="7620" marB="0" anchor="b"/>
+                </a:tc>
+                <a:tc>
+                  <a:txBody>
+                    <a:bodyPr/>
+                    <a:lstStyle/>
+                    <a:p>
+                      <a:pPr algn="r" fontAlgn="b"/>
+                      <a:r>
+                        <a:rPr lang="es-ES" sz="1100" u="none" strike="noStrike">
+                          <a:effectLst/>
+                        </a:rPr>
+                        <a:t>0</a:t>
+                      </a:r>
+                      <a:endParaRPr lang="es-ES" sz="1100" b="0" i="0" u="none" strike="noStrike">
+                        <a:solidFill>
+                          <a:srgbClr val="000000"/>
+                        </a:solidFill>
+                        <a:effectLst/>
+                        <a:latin typeface="Aptos Narrow" panose="020B0004020202020204" pitchFamily="34" charset="0"/>
+                      </a:endParaRPr>
+                    </a:p>
+                  </a:txBody>
+                  <a:tcPr marL="7620" marR="7620" marT="7620" marB="0" anchor="b"/>
+                </a:tc>
+                <a:tc>
+                  <a:txBody>
+                    <a:bodyPr/>
+                    <a:lstStyle/>
+                    <a:p>
+                      <a:pPr algn="l" fontAlgn="b"/>
+                      <a:r>
+                        <a:rPr lang="es-ES" sz="1100" u="none" strike="noStrike">
+                          <a:effectLst/>
+                        </a:rPr>
+                        <a:t>OK</a:t>
+                      </a:r>
+                      <a:endParaRPr lang="es-ES" sz="1100" b="0" i="0" u="none" strike="noStrike">
+                        <a:solidFill>
+                          <a:srgbClr val="000000"/>
+                        </a:solidFill>
+                        <a:effectLst/>
+                        <a:latin typeface="Aptos Narrow" panose="020B0004020202020204" pitchFamily="34" charset="0"/>
+                      </a:endParaRPr>
+                    </a:p>
+                  </a:txBody>
+                  <a:tcPr marL="7620" marR="7620" marT="7620" marB="0" anchor="b"/>
+                </a:tc>
+                <a:tc>
+                  <a:txBody>
+                    <a:bodyPr/>
+                    <a:lstStyle/>
+                    <a:p>
+                      <a:pPr algn="l" fontAlgn="b"/>
+                      <a:r>
+                        <a:rPr lang="es-ES" sz="1100" u="none" strike="noStrike">
+                          <a:effectLst/>
+                        </a:rPr>
+                        <a:t> </a:t>
+                      </a:r>
+                      <a:endParaRPr lang="es-ES" sz="1100" b="0" i="0" u="none" strike="noStrike">
+                        <a:solidFill>
+                          <a:srgbClr val="000000"/>
+                        </a:solidFill>
+                        <a:effectLst/>
+                        <a:latin typeface="Aptos Narrow" panose="020B0004020202020204" pitchFamily="34" charset="0"/>
+                      </a:endParaRPr>
+                    </a:p>
+                  </a:txBody>
+                  <a:tcPr marL="7620" marR="7620" marT="7620" marB="0" anchor="b"/>
+                </a:tc>
+                <a:extLst>
+                  <a:ext uri="{0D108BD9-81ED-4DB2-BD59-A6C34878D82A}">
+                    <a16:rowId xmlns:a16="http://schemas.microsoft.com/office/drawing/2014/main" val="48780593"/>
+                  </a:ext>
+                </a:extLst>
+              </a:tr>
+              <a:tr h="182880">
+                <a:tc>
+                  <a:txBody>
+                    <a:bodyPr/>
+                    <a:lstStyle/>
+                    <a:p>
+                      <a:pPr algn="l" fontAlgn="b"/>
+                      <a:r>
+                        <a:rPr lang="es-ES" sz="1100" u="none" strike="noStrike">
+                          <a:effectLst/>
+                        </a:rPr>
+                        <a:t>Conectores Dupont</a:t>
+                      </a:r>
+                      <a:endParaRPr lang="es-ES" sz="1100" b="0" i="0" u="none" strike="noStrike">
+                        <a:solidFill>
+                          <a:srgbClr val="000000"/>
+                        </a:solidFill>
+                        <a:effectLst/>
+                        <a:latin typeface="Aptos Narrow" panose="020B0004020202020204" pitchFamily="34" charset="0"/>
+                      </a:endParaRPr>
+                    </a:p>
+                  </a:txBody>
+                  <a:tcPr marL="7620" marR="7620" marT="7620" marB="0" anchor="b"/>
+                </a:tc>
+                <a:tc>
+                  <a:txBody>
+                    <a:bodyPr/>
+                    <a:lstStyle/>
+                    <a:p>
+                      <a:pPr algn="l" fontAlgn="b"/>
+                      <a:r>
+                        <a:rPr lang="es-ES" sz="1100" u="none" strike="noStrike">
+                          <a:effectLst/>
+                        </a:rPr>
+                        <a:t> </a:t>
+                      </a:r>
+                      <a:endParaRPr lang="es-ES" sz="1100" b="0" i="0" u="none" strike="noStrike">
+                        <a:solidFill>
+                          <a:srgbClr val="000000"/>
+                        </a:solidFill>
+                        <a:effectLst/>
+                        <a:latin typeface="Aptos Narrow" panose="020B0004020202020204" pitchFamily="34" charset="0"/>
+                      </a:endParaRPr>
+                    </a:p>
+                  </a:txBody>
+                  <a:tcPr marL="7620" marR="7620" marT="7620" marB="0" anchor="b"/>
+                </a:tc>
+                <a:tc>
+                  <a:txBody>
+                    <a:bodyPr/>
+                    <a:lstStyle/>
+                    <a:p>
+                      <a:pPr algn="l" fontAlgn="b"/>
+                      <a:r>
+                        <a:rPr lang="es-ES" sz="1100" u="none" strike="noStrike">
+                          <a:effectLst/>
+                        </a:rPr>
+                        <a:t> </a:t>
+                      </a:r>
+                      <a:endParaRPr lang="es-ES" sz="1100" b="0" i="0" u="none" strike="noStrike">
+                        <a:solidFill>
+                          <a:srgbClr val="000000"/>
+                        </a:solidFill>
+                        <a:effectLst/>
+                        <a:latin typeface="Aptos Narrow" panose="020B0004020202020204" pitchFamily="34" charset="0"/>
+                      </a:endParaRPr>
+                    </a:p>
+                  </a:txBody>
+                  <a:tcPr marL="7620" marR="7620" marT="7620" marB="0" anchor="b"/>
+                </a:tc>
+                <a:tc>
+                  <a:txBody>
+                    <a:bodyPr/>
+                    <a:lstStyle/>
+                    <a:p>
+                      <a:pPr algn="r" fontAlgn="b"/>
+                      <a:r>
+                        <a:rPr lang="es-ES" sz="1100" u="none" strike="noStrike">
+                          <a:effectLst/>
+                        </a:rPr>
+                        <a:t>0</a:t>
+                      </a:r>
+                      <a:endParaRPr lang="es-ES" sz="1100" b="0" i="0" u="none" strike="noStrike">
+                        <a:solidFill>
+                          <a:srgbClr val="000000"/>
+                        </a:solidFill>
+                        <a:effectLst/>
+                        <a:latin typeface="Aptos Narrow" panose="020B0004020202020204" pitchFamily="34" charset="0"/>
+                      </a:endParaRPr>
+                    </a:p>
+                  </a:txBody>
+                  <a:tcPr marL="7620" marR="7620" marT="7620" marB="0" anchor="b"/>
+                </a:tc>
+                <a:tc>
+                  <a:txBody>
+                    <a:bodyPr/>
+                    <a:lstStyle/>
+                    <a:p>
+                      <a:pPr algn="l" fontAlgn="b"/>
+                      <a:r>
+                        <a:rPr lang="es-ES" sz="1100" u="none" strike="noStrike">
+                          <a:effectLst/>
+                        </a:rPr>
+                        <a:t>OK</a:t>
+                      </a:r>
+                      <a:endParaRPr lang="es-ES" sz="1100" b="0" i="0" u="none" strike="noStrike">
+                        <a:solidFill>
+                          <a:srgbClr val="000000"/>
+                        </a:solidFill>
+                        <a:effectLst/>
+                        <a:latin typeface="Aptos Narrow" panose="020B0004020202020204" pitchFamily="34" charset="0"/>
+                      </a:endParaRPr>
+                    </a:p>
+                  </a:txBody>
+                  <a:tcPr marL="7620" marR="7620" marT="7620" marB="0" anchor="b"/>
+                </a:tc>
+                <a:tc>
+                  <a:txBody>
+                    <a:bodyPr/>
+                    <a:lstStyle/>
+                    <a:p>
+                      <a:pPr algn="l" fontAlgn="b"/>
+                      <a:r>
+                        <a:rPr lang="es-ES" sz="1100" u="none" strike="noStrike">
+                          <a:effectLst/>
+                        </a:rPr>
+                        <a:t> </a:t>
+                      </a:r>
+                      <a:endParaRPr lang="es-ES" sz="1100" b="0" i="0" u="none" strike="noStrike">
+                        <a:solidFill>
+                          <a:srgbClr val="000000"/>
+                        </a:solidFill>
+                        <a:effectLst/>
+                        <a:latin typeface="Aptos Narrow" panose="020B0004020202020204" pitchFamily="34" charset="0"/>
+                      </a:endParaRPr>
+                    </a:p>
+                  </a:txBody>
+                  <a:tcPr marL="7620" marR="7620" marT="7620" marB="0" anchor="b"/>
+                </a:tc>
+                <a:extLst>
+                  <a:ext uri="{0D108BD9-81ED-4DB2-BD59-A6C34878D82A}">
+                    <a16:rowId xmlns:a16="http://schemas.microsoft.com/office/drawing/2014/main" val="2644568320"/>
+                  </a:ext>
+                </a:extLst>
+              </a:tr>
+              <a:tr h="182880">
+                <a:tc>
+                  <a:txBody>
+                    <a:bodyPr/>
+                    <a:lstStyle/>
+                    <a:p>
+                      <a:pPr algn="l" fontAlgn="b"/>
+                      <a:r>
+                        <a:rPr lang="es-ES" sz="1100" u="none" strike="noStrike">
+                          <a:effectLst/>
+                        </a:rPr>
+                        <a:t>BD135</a:t>
+                      </a:r>
+                      <a:endParaRPr lang="es-ES" sz="1100" b="0" i="0" u="none" strike="noStrike">
+                        <a:solidFill>
+                          <a:srgbClr val="000000"/>
+                        </a:solidFill>
+                        <a:effectLst/>
+                        <a:latin typeface="Aptos Narrow" panose="020B0004020202020204" pitchFamily="34" charset="0"/>
+                      </a:endParaRPr>
+                    </a:p>
+                  </a:txBody>
+                  <a:tcPr marL="7620" marR="7620" marT="7620" marB="0" anchor="b"/>
+                </a:tc>
+                <a:tc>
+                  <a:txBody>
+                    <a:bodyPr/>
+                    <a:lstStyle/>
+                    <a:p>
+                      <a:pPr algn="r" fontAlgn="b"/>
+                      <a:r>
+                        <a:rPr lang="es-ES" sz="1100" u="none" strike="noStrike">
+                          <a:effectLst/>
+                        </a:rPr>
+                        <a:t>2</a:t>
+                      </a:r>
+                      <a:endParaRPr lang="es-ES" sz="1100" b="0" i="0" u="none" strike="noStrike">
+                        <a:solidFill>
+                          <a:srgbClr val="000000"/>
+                        </a:solidFill>
+                        <a:effectLst/>
+                        <a:latin typeface="Aptos Narrow" panose="020B0004020202020204" pitchFamily="34" charset="0"/>
+                      </a:endParaRPr>
+                    </a:p>
+                  </a:txBody>
+                  <a:tcPr marL="7620" marR="7620" marT="7620" marB="0" anchor="b"/>
+                </a:tc>
+                <a:tc>
+                  <a:txBody>
+                    <a:bodyPr/>
+                    <a:lstStyle/>
+                    <a:p>
+                      <a:pPr algn="r" fontAlgn="b"/>
+                      <a:r>
+                        <a:rPr lang="es-ES" sz="1100" u="none" strike="noStrike">
+                          <a:effectLst/>
+                        </a:rPr>
+                        <a:t>0.665</a:t>
+                      </a:r>
+                      <a:endParaRPr lang="es-ES" sz="1100" b="0" i="0" u="none" strike="noStrike">
+                        <a:solidFill>
+                          <a:srgbClr val="000000"/>
+                        </a:solidFill>
+                        <a:effectLst/>
+                        <a:latin typeface="Aptos Narrow" panose="020B0004020202020204" pitchFamily="34" charset="0"/>
+                      </a:endParaRPr>
+                    </a:p>
+                  </a:txBody>
+                  <a:tcPr marL="7620" marR="7620" marT="7620" marB="0" anchor="b"/>
+                </a:tc>
+                <a:tc>
+                  <a:txBody>
+                    <a:bodyPr/>
+                    <a:lstStyle/>
+                    <a:p>
+                      <a:pPr algn="r" fontAlgn="b"/>
+                      <a:r>
+                        <a:rPr lang="es-ES" sz="1100" u="none" strike="noStrike">
+                          <a:effectLst/>
+                        </a:rPr>
+                        <a:t>1.33</a:t>
+                      </a:r>
+                      <a:endParaRPr lang="es-ES" sz="1100" b="0" i="0" u="none" strike="noStrike">
+                        <a:solidFill>
+                          <a:srgbClr val="000000"/>
+                        </a:solidFill>
+                        <a:effectLst/>
+                        <a:latin typeface="Aptos Narrow" panose="020B0004020202020204" pitchFamily="34" charset="0"/>
+                      </a:endParaRPr>
+                    </a:p>
+                  </a:txBody>
+                  <a:tcPr marL="7620" marR="7620" marT="7620" marB="0" anchor="b"/>
+                </a:tc>
+                <a:tc>
+                  <a:txBody>
+                    <a:bodyPr/>
+                    <a:lstStyle/>
+                    <a:p>
+                      <a:pPr algn="l" fontAlgn="b"/>
+                      <a:r>
+                        <a:rPr lang="es-ES" sz="1100" u="none" strike="noStrike">
+                          <a:effectLst/>
+                        </a:rPr>
+                        <a:t>En carrito</a:t>
+                      </a:r>
+                      <a:endParaRPr lang="es-ES" sz="1100" b="0" i="0" u="none" strike="noStrike">
+                        <a:solidFill>
+                          <a:srgbClr val="000000"/>
+                        </a:solidFill>
+                        <a:effectLst/>
+                        <a:latin typeface="Aptos Narrow" panose="020B0004020202020204" pitchFamily="34" charset="0"/>
+                      </a:endParaRPr>
+                    </a:p>
+                  </a:txBody>
+                  <a:tcPr marL="7620" marR="7620" marT="7620" marB="0" anchor="b"/>
+                </a:tc>
+                <a:tc>
+                  <a:txBody>
+                    <a:bodyPr/>
+                    <a:lstStyle/>
+                    <a:p>
+                      <a:pPr algn="l" fontAlgn="b"/>
+                      <a:r>
+                        <a:rPr lang="es-ES" sz="1100" u="none" strike="noStrike">
+                          <a:effectLst/>
+                        </a:rPr>
+                        <a:t> </a:t>
+                      </a:r>
+                      <a:endParaRPr lang="es-ES" sz="1100" b="0" i="0" u="none" strike="noStrike">
+                        <a:solidFill>
+                          <a:srgbClr val="000000"/>
+                        </a:solidFill>
+                        <a:effectLst/>
+                        <a:latin typeface="Aptos Narrow" panose="020B0004020202020204" pitchFamily="34" charset="0"/>
+                      </a:endParaRPr>
+                    </a:p>
+                  </a:txBody>
+                  <a:tcPr marL="7620" marR="7620" marT="7620" marB="0" anchor="b"/>
+                </a:tc>
+                <a:extLst>
+                  <a:ext uri="{0D108BD9-81ED-4DB2-BD59-A6C34878D82A}">
+                    <a16:rowId xmlns:a16="http://schemas.microsoft.com/office/drawing/2014/main" val="3456318622"/>
+                  </a:ext>
+                </a:extLst>
+              </a:tr>
+              <a:tr h="182880">
+                <a:tc>
+                  <a:txBody>
+                    <a:bodyPr/>
+                    <a:lstStyle/>
+                    <a:p>
+                      <a:pPr algn="l" fontAlgn="b"/>
+                      <a:r>
+                        <a:rPr lang="es-ES" sz="900" u="none" strike="noStrike">
+                          <a:effectLst/>
+                        </a:rPr>
+                        <a:t>BC547B</a:t>
+                      </a:r>
+                      <a:endParaRPr lang="es-ES" sz="900" b="0" i="0" u="none" strike="noStrike">
+                        <a:solidFill>
+                          <a:srgbClr val="000000"/>
+                        </a:solidFill>
+                        <a:effectLst/>
+                        <a:latin typeface="Arial" panose="020B0604020202020204" pitchFamily="34" charset="0"/>
+                      </a:endParaRPr>
+                    </a:p>
+                  </a:txBody>
+                  <a:tcPr marL="7620" marR="7620" marT="7620" marB="0" anchor="b"/>
+                </a:tc>
+                <a:tc>
+                  <a:txBody>
+                    <a:bodyPr/>
+                    <a:lstStyle/>
+                    <a:p>
+                      <a:pPr algn="r" fontAlgn="b"/>
+                      <a:r>
+                        <a:rPr lang="es-ES" sz="1100" u="none" strike="noStrike">
+                          <a:effectLst/>
+                        </a:rPr>
+                        <a:t>2</a:t>
+                      </a:r>
+                      <a:endParaRPr lang="es-ES" sz="1100" b="0" i="0" u="none" strike="noStrike">
+                        <a:solidFill>
+                          <a:srgbClr val="000000"/>
+                        </a:solidFill>
+                        <a:effectLst/>
+                        <a:latin typeface="Aptos Narrow" panose="020B0004020202020204" pitchFamily="34" charset="0"/>
+                      </a:endParaRPr>
+                    </a:p>
+                  </a:txBody>
+                  <a:tcPr marL="7620" marR="7620" marT="7620" marB="0" anchor="b"/>
+                </a:tc>
+                <a:tc>
+                  <a:txBody>
+                    <a:bodyPr/>
+                    <a:lstStyle/>
+                    <a:p>
+                      <a:pPr algn="r" fontAlgn="b"/>
+                      <a:r>
+                        <a:rPr lang="es-ES" sz="1100" u="none" strike="noStrike">
+                          <a:effectLst/>
+                        </a:rPr>
+                        <a:t>0.361</a:t>
+                      </a:r>
+                      <a:endParaRPr lang="es-ES" sz="1100" b="0" i="0" u="none" strike="noStrike">
+                        <a:solidFill>
+                          <a:srgbClr val="000000"/>
+                        </a:solidFill>
+                        <a:effectLst/>
+                        <a:latin typeface="Aptos Narrow" panose="020B0004020202020204" pitchFamily="34" charset="0"/>
+                      </a:endParaRPr>
+                    </a:p>
+                  </a:txBody>
+                  <a:tcPr marL="7620" marR="7620" marT="7620" marB="0" anchor="b"/>
+                </a:tc>
+                <a:tc>
+                  <a:txBody>
+                    <a:bodyPr/>
+                    <a:lstStyle/>
+                    <a:p>
+                      <a:pPr algn="r" fontAlgn="b"/>
+                      <a:r>
+                        <a:rPr lang="es-ES" sz="1100" u="none" strike="noStrike">
+                          <a:effectLst/>
+                        </a:rPr>
+                        <a:t>0.722</a:t>
+                      </a:r>
+                      <a:endParaRPr lang="es-ES" sz="1100" b="0" i="0" u="none" strike="noStrike">
+                        <a:solidFill>
+                          <a:srgbClr val="000000"/>
+                        </a:solidFill>
+                        <a:effectLst/>
+                        <a:latin typeface="Aptos Narrow" panose="020B0004020202020204" pitchFamily="34" charset="0"/>
+                      </a:endParaRPr>
+                    </a:p>
+                  </a:txBody>
+                  <a:tcPr marL="7620" marR="7620" marT="7620" marB="0" anchor="b"/>
+                </a:tc>
+                <a:tc>
+                  <a:txBody>
+                    <a:bodyPr/>
+                    <a:lstStyle/>
+                    <a:p>
+                      <a:pPr algn="l" fontAlgn="b"/>
+                      <a:r>
+                        <a:rPr lang="es-ES" sz="1100" u="none" strike="noStrike">
+                          <a:effectLst/>
+                        </a:rPr>
+                        <a:t>En carrito</a:t>
+                      </a:r>
+                      <a:endParaRPr lang="es-ES" sz="1100" b="0" i="0" u="none" strike="noStrike">
+                        <a:solidFill>
+                          <a:srgbClr val="000000"/>
+                        </a:solidFill>
+                        <a:effectLst/>
+                        <a:latin typeface="Aptos Narrow" panose="020B0004020202020204" pitchFamily="34" charset="0"/>
+                      </a:endParaRPr>
+                    </a:p>
+                  </a:txBody>
+                  <a:tcPr marL="7620" marR="7620" marT="7620" marB="0" anchor="b"/>
+                </a:tc>
+                <a:tc>
+                  <a:txBody>
+                    <a:bodyPr/>
+                    <a:lstStyle/>
+                    <a:p>
+                      <a:pPr algn="l" fontAlgn="b"/>
+                      <a:r>
+                        <a:rPr lang="es-ES" sz="1100" u="none" strike="noStrike">
+                          <a:effectLst/>
+                        </a:rPr>
+                        <a:t> </a:t>
+                      </a:r>
+                      <a:endParaRPr lang="es-ES" sz="1100" b="0" i="0" u="none" strike="noStrike">
+                        <a:solidFill>
+                          <a:srgbClr val="000000"/>
+                        </a:solidFill>
+                        <a:effectLst/>
+                        <a:latin typeface="Aptos Narrow" panose="020B0004020202020204" pitchFamily="34" charset="0"/>
+                      </a:endParaRPr>
+                    </a:p>
+                  </a:txBody>
+                  <a:tcPr marL="7620" marR="7620" marT="7620" marB="0" anchor="b"/>
+                </a:tc>
+                <a:extLst>
+                  <a:ext uri="{0D108BD9-81ED-4DB2-BD59-A6C34878D82A}">
+                    <a16:rowId xmlns:a16="http://schemas.microsoft.com/office/drawing/2014/main" val="3824632087"/>
+                  </a:ext>
+                </a:extLst>
+              </a:tr>
+              <a:tr h="182880">
+                <a:tc>
+                  <a:txBody>
+                    <a:bodyPr/>
+                    <a:lstStyle/>
+                    <a:p>
+                      <a:pPr algn="l" fontAlgn="b"/>
+                      <a:r>
+                        <a:rPr lang="es-ES" sz="1100" u="none" strike="noStrike">
+                          <a:effectLst/>
+                        </a:rPr>
+                        <a:t>LM741</a:t>
+                      </a:r>
+                      <a:endParaRPr lang="es-ES" sz="1100" b="0" i="0" u="none" strike="noStrike">
+                        <a:solidFill>
+                          <a:srgbClr val="000000"/>
+                        </a:solidFill>
+                        <a:effectLst/>
+                        <a:latin typeface="Aptos Narrow" panose="020B0004020202020204" pitchFamily="34" charset="0"/>
+                      </a:endParaRPr>
+                    </a:p>
+                  </a:txBody>
+                  <a:tcPr marL="7620" marR="7620" marT="7620" marB="0" anchor="b"/>
+                </a:tc>
+                <a:tc>
+                  <a:txBody>
+                    <a:bodyPr/>
+                    <a:lstStyle/>
+                    <a:p>
+                      <a:pPr algn="r" fontAlgn="b"/>
+                      <a:r>
+                        <a:rPr lang="es-ES" sz="1100" u="none" strike="noStrike">
+                          <a:effectLst/>
+                        </a:rPr>
+                        <a:t>10</a:t>
+                      </a:r>
+                      <a:endParaRPr lang="es-ES" sz="1100" b="0" i="0" u="none" strike="noStrike">
+                        <a:solidFill>
+                          <a:srgbClr val="000000"/>
+                        </a:solidFill>
+                        <a:effectLst/>
+                        <a:latin typeface="Aptos Narrow" panose="020B0004020202020204" pitchFamily="34" charset="0"/>
+                      </a:endParaRPr>
+                    </a:p>
+                  </a:txBody>
+                  <a:tcPr marL="7620" marR="7620" marT="7620" marB="0" anchor="b"/>
+                </a:tc>
+                <a:tc>
+                  <a:txBody>
+                    <a:bodyPr/>
+                    <a:lstStyle/>
+                    <a:p>
+                      <a:pPr algn="r" fontAlgn="b"/>
+                      <a:r>
+                        <a:rPr lang="es-ES" sz="1100" u="none" strike="noStrike">
+                          <a:effectLst/>
+                        </a:rPr>
+                        <a:t>0.76</a:t>
+                      </a:r>
+                      <a:endParaRPr lang="es-ES" sz="1100" b="0" i="0" u="none" strike="noStrike">
+                        <a:solidFill>
+                          <a:srgbClr val="000000"/>
+                        </a:solidFill>
+                        <a:effectLst/>
+                        <a:latin typeface="Aptos Narrow" panose="020B0004020202020204" pitchFamily="34" charset="0"/>
+                      </a:endParaRPr>
+                    </a:p>
+                  </a:txBody>
+                  <a:tcPr marL="7620" marR="7620" marT="7620" marB="0" anchor="b"/>
+                </a:tc>
+                <a:tc>
+                  <a:txBody>
+                    <a:bodyPr/>
+                    <a:lstStyle/>
+                    <a:p>
+                      <a:pPr algn="r" fontAlgn="b"/>
+                      <a:r>
+                        <a:rPr lang="es-ES" sz="1100" u="none" strike="noStrike">
+                          <a:effectLst/>
+                        </a:rPr>
+                        <a:t>7.6</a:t>
+                      </a:r>
+                      <a:endParaRPr lang="es-ES" sz="1100" b="0" i="0" u="none" strike="noStrike">
+                        <a:solidFill>
+                          <a:srgbClr val="000000"/>
+                        </a:solidFill>
+                        <a:effectLst/>
+                        <a:latin typeface="Aptos Narrow" panose="020B0004020202020204" pitchFamily="34" charset="0"/>
+                      </a:endParaRPr>
+                    </a:p>
+                  </a:txBody>
+                  <a:tcPr marL="7620" marR="7620" marT="7620" marB="0" anchor="b"/>
+                </a:tc>
+                <a:tc>
+                  <a:txBody>
+                    <a:bodyPr/>
+                    <a:lstStyle/>
+                    <a:p>
+                      <a:pPr algn="l" fontAlgn="b"/>
+                      <a:r>
+                        <a:rPr lang="es-ES" sz="1100" u="none" strike="noStrike">
+                          <a:effectLst/>
+                        </a:rPr>
+                        <a:t>En carrito</a:t>
+                      </a:r>
+                      <a:endParaRPr lang="es-ES" sz="1100" b="0" i="0" u="none" strike="noStrike">
+                        <a:solidFill>
+                          <a:srgbClr val="000000"/>
+                        </a:solidFill>
+                        <a:effectLst/>
+                        <a:latin typeface="Aptos Narrow" panose="020B0004020202020204" pitchFamily="34" charset="0"/>
+                      </a:endParaRPr>
+                    </a:p>
+                  </a:txBody>
+                  <a:tcPr marL="7620" marR="7620" marT="7620" marB="0" anchor="b"/>
+                </a:tc>
+                <a:tc>
+                  <a:txBody>
+                    <a:bodyPr/>
+                    <a:lstStyle/>
+                    <a:p>
+                      <a:pPr algn="l" fontAlgn="b"/>
+                      <a:r>
+                        <a:rPr lang="es-ES" sz="1100" u="none" strike="noStrike">
+                          <a:effectLst/>
+                        </a:rPr>
+                        <a:t> </a:t>
+                      </a:r>
+                      <a:endParaRPr lang="es-ES" sz="1100" b="0" i="0" u="none" strike="noStrike">
+                        <a:solidFill>
+                          <a:srgbClr val="000000"/>
+                        </a:solidFill>
+                        <a:effectLst/>
+                        <a:latin typeface="Aptos Narrow" panose="020B0004020202020204" pitchFamily="34" charset="0"/>
+                      </a:endParaRPr>
+                    </a:p>
+                  </a:txBody>
+                  <a:tcPr marL="7620" marR="7620" marT="7620" marB="0" anchor="b"/>
+                </a:tc>
+                <a:extLst>
+                  <a:ext uri="{0D108BD9-81ED-4DB2-BD59-A6C34878D82A}">
+                    <a16:rowId xmlns:a16="http://schemas.microsoft.com/office/drawing/2014/main" val="1820868894"/>
+                  </a:ext>
+                </a:extLst>
+              </a:tr>
+              <a:tr h="182880">
+                <a:tc>
+                  <a:txBody>
+                    <a:bodyPr/>
+                    <a:lstStyle/>
+                    <a:p>
+                      <a:pPr algn="l" fontAlgn="b"/>
+                      <a:r>
+                        <a:rPr lang="es-ES" sz="1100" u="none" strike="noStrike">
+                          <a:effectLst/>
+                        </a:rPr>
+                        <a:t>OP07</a:t>
+                      </a:r>
+                      <a:endParaRPr lang="es-ES" sz="1100" b="0" i="0" u="none" strike="noStrike">
+                        <a:solidFill>
+                          <a:srgbClr val="000000"/>
+                        </a:solidFill>
+                        <a:effectLst/>
+                        <a:latin typeface="Aptos Narrow" panose="020B0004020202020204" pitchFamily="34" charset="0"/>
+                      </a:endParaRPr>
+                    </a:p>
+                  </a:txBody>
+                  <a:tcPr marL="7620" marR="7620" marT="7620" marB="0" anchor="b"/>
+                </a:tc>
+                <a:tc>
+                  <a:txBody>
+                    <a:bodyPr/>
+                    <a:lstStyle/>
+                    <a:p>
+                      <a:pPr algn="r" fontAlgn="b"/>
+                      <a:r>
+                        <a:rPr lang="es-ES" sz="1100" u="none" strike="noStrike">
+                          <a:effectLst/>
+                        </a:rPr>
+                        <a:t>6</a:t>
+                      </a:r>
+                      <a:endParaRPr lang="es-ES" sz="1100" b="0" i="0" u="none" strike="noStrike">
+                        <a:solidFill>
+                          <a:srgbClr val="000000"/>
+                        </a:solidFill>
+                        <a:effectLst/>
+                        <a:latin typeface="Aptos Narrow" panose="020B0004020202020204" pitchFamily="34" charset="0"/>
+                      </a:endParaRPr>
+                    </a:p>
+                  </a:txBody>
+                  <a:tcPr marL="7620" marR="7620" marT="7620" marB="0" anchor="b"/>
+                </a:tc>
+                <a:tc>
+                  <a:txBody>
+                    <a:bodyPr/>
+                    <a:lstStyle/>
+                    <a:p>
+                      <a:pPr algn="l" fontAlgn="b"/>
+                      <a:r>
+                        <a:rPr lang="es-ES" sz="1100" u="none" strike="noStrike">
+                          <a:effectLst/>
+                        </a:rPr>
+                        <a:t>-----</a:t>
+                      </a:r>
+                      <a:endParaRPr lang="es-ES" sz="1100" b="0" i="0" u="none" strike="noStrike">
+                        <a:solidFill>
+                          <a:srgbClr val="000000"/>
+                        </a:solidFill>
+                        <a:effectLst/>
+                        <a:latin typeface="Aptos Narrow" panose="020B0004020202020204" pitchFamily="34" charset="0"/>
+                      </a:endParaRPr>
+                    </a:p>
+                  </a:txBody>
+                  <a:tcPr marL="7620" marR="7620" marT="7620" marB="0" anchor="b"/>
+                </a:tc>
+                <a:tc>
+                  <a:txBody>
+                    <a:bodyPr/>
+                    <a:lstStyle/>
+                    <a:p>
+                      <a:pPr algn="l" fontAlgn="b"/>
+                      <a:r>
+                        <a:rPr lang="es-ES" sz="1100" u="none" strike="noStrike">
+                          <a:effectLst/>
+                        </a:rPr>
+                        <a:t>-----</a:t>
+                      </a:r>
+                      <a:endParaRPr lang="es-ES" sz="1100" b="0" i="0" u="none" strike="noStrike">
+                        <a:solidFill>
+                          <a:srgbClr val="000000"/>
+                        </a:solidFill>
+                        <a:effectLst/>
+                        <a:latin typeface="Aptos Narrow" panose="020B0004020202020204" pitchFamily="34" charset="0"/>
+                      </a:endParaRPr>
+                    </a:p>
+                  </a:txBody>
+                  <a:tcPr marL="7620" marR="7620" marT="7620" marB="0" anchor="b"/>
+                </a:tc>
+                <a:tc>
+                  <a:txBody>
+                    <a:bodyPr/>
+                    <a:lstStyle/>
+                    <a:p>
+                      <a:pPr algn="l" fontAlgn="b"/>
+                      <a:r>
+                        <a:rPr lang="es-ES" sz="1100" u="none" strike="noStrike">
+                          <a:effectLst/>
+                        </a:rPr>
+                        <a:t>SIN EXISTENCIAS*</a:t>
+                      </a:r>
+                      <a:endParaRPr lang="es-ES" sz="1100" b="0" i="0" u="none" strike="noStrike">
+                        <a:solidFill>
+                          <a:srgbClr val="000000"/>
+                        </a:solidFill>
+                        <a:effectLst/>
+                        <a:latin typeface="Aptos Narrow" panose="020B0004020202020204" pitchFamily="34" charset="0"/>
+                      </a:endParaRPr>
+                    </a:p>
+                  </a:txBody>
+                  <a:tcPr marL="7620" marR="7620" marT="7620" marB="0" anchor="b"/>
+                </a:tc>
+                <a:tc>
+                  <a:txBody>
+                    <a:bodyPr/>
+                    <a:lstStyle/>
+                    <a:p>
+                      <a:pPr algn="l" fontAlgn="b"/>
+                      <a:r>
+                        <a:rPr lang="es-ES" sz="1100" u="none" strike="noStrike">
+                          <a:effectLst/>
+                        </a:rPr>
+                        <a:t>*Se sustituye por 6 LM741</a:t>
+                      </a:r>
+                      <a:endParaRPr lang="es-ES" sz="1100" b="0" i="0" u="none" strike="noStrike">
+                        <a:solidFill>
+                          <a:srgbClr val="000000"/>
+                        </a:solidFill>
+                        <a:effectLst/>
+                        <a:latin typeface="Aptos Narrow" panose="020B0004020202020204" pitchFamily="34" charset="0"/>
+                      </a:endParaRPr>
+                    </a:p>
+                  </a:txBody>
+                  <a:tcPr marL="7620" marR="7620" marT="7620" marB="0" anchor="b"/>
+                </a:tc>
+                <a:extLst>
+                  <a:ext uri="{0D108BD9-81ED-4DB2-BD59-A6C34878D82A}">
+                    <a16:rowId xmlns:a16="http://schemas.microsoft.com/office/drawing/2014/main" val="2309630843"/>
+                  </a:ext>
+                </a:extLst>
+              </a:tr>
+              <a:tr h="182880">
+                <a:tc>
+                  <a:txBody>
+                    <a:bodyPr/>
+                    <a:lstStyle/>
+                    <a:p>
+                      <a:pPr algn="l" fontAlgn="b"/>
+                      <a:r>
+                        <a:rPr lang="es-ES" sz="1100" u="none" strike="noStrike">
+                          <a:effectLst/>
+                        </a:rPr>
+                        <a:t>Disipador TO126</a:t>
+                      </a:r>
+                      <a:endParaRPr lang="es-ES" sz="1100" b="0" i="0" u="none" strike="noStrike">
+                        <a:solidFill>
+                          <a:srgbClr val="000000"/>
+                        </a:solidFill>
+                        <a:effectLst/>
+                        <a:latin typeface="Aptos Narrow" panose="020B0004020202020204" pitchFamily="34" charset="0"/>
+                      </a:endParaRPr>
+                    </a:p>
+                  </a:txBody>
+                  <a:tcPr marL="7620" marR="7620" marT="7620" marB="0" anchor="b"/>
+                </a:tc>
+                <a:tc>
+                  <a:txBody>
+                    <a:bodyPr/>
+                    <a:lstStyle/>
+                    <a:p>
+                      <a:pPr algn="r" fontAlgn="b"/>
+                      <a:r>
+                        <a:rPr lang="es-ES" sz="1100" u="none" strike="noStrike">
+                          <a:effectLst/>
+                        </a:rPr>
+                        <a:t>1</a:t>
+                      </a:r>
+                      <a:endParaRPr lang="es-ES" sz="1100" b="0" i="0" u="none" strike="noStrike">
+                        <a:solidFill>
+                          <a:srgbClr val="000000"/>
+                        </a:solidFill>
+                        <a:effectLst/>
+                        <a:latin typeface="Aptos Narrow" panose="020B0004020202020204" pitchFamily="34" charset="0"/>
+                      </a:endParaRPr>
+                    </a:p>
+                  </a:txBody>
+                  <a:tcPr marL="7620" marR="7620" marT="7620" marB="0" anchor="b"/>
+                </a:tc>
+                <a:tc>
+                  <a:txBody>
+                    <a:bodyPr/>
+                    <a:lstStyle/>
+                    <a:p>
+                      <a:pPr algn="r" fontAlgn="b"/>
+                      <a:r>
+                        <a:rPr lang="es-ES" sz="1100" u="none" strike="noStrike">
+                          <a:effectLst/>
+                        </a:rPr>
+                        <a:t>5.64</a:t>
+                      </a:r>
+                      <a:endParaRPr lang="es-ES" sz="1100" b="0" i="0" u="none" strike="noStrike">
+                        <a:solidFill>
+                          <a:srgbClr val="000000"/>
+                        </a:solidFill>
+                        <a:effectLst/>
+                        <a:latin typeface="Aptos Narrow" panose="020B0004020202020204" pitchFamily="34" charset="0"/>
+                      </a:endParaRPr>
+                    </a:p>
+                  </a:txBody>
+                  <a:tcPr marL="7620" marR="7620" marT="7620" marB="0" anchor="b"/>
+                </a:tc>
+                <a:tc>
+                  <a:txBody>
+                    <a:bodyPr/>
+                    <a:lstStyle/>
+                    <a:p>
+                      <a:pPr algn="r" fontAlgn="b"/>
+                      <a:r>
+                        <a:rPr lang="es-ES" sz="1100" u="none" strike="noStrike">
+                          <a:effectLst/>
+                        </a:rPr>
+                        <a:t>5.64</a:t>
+                      </a:r>
+                      <a:endParaRPr lang="es-ES" sz="1100" b="0" i="0" u="none" strike="noStrike">
+                        <a:solidFill>
+                          <a:srgbClr val="000000"/>
+                        </a:solidFill>
+                        <a:effectLst/>
+                        <a:latin typeface="Aptos Narrow" panose="020B0004020202020204" pitchFamily="34" charset="0"/>
+                      </a:endParaRPr>
+                    </a:p>
+                  </a:txBody>
+                  <a:tcPr marL="7620" marR="7620" marT="7620" marB="0" anchor="b"/>
+                </a:tc>
+                <a:tc>
+                  <a:txBody>
+                    <a:bodyPr/>
+                    <a:lstStyle/>
+                    <a:p>
+                      <a:pPr algn="l" fontAlgn="b"/>
+                      <a:r>
+                        <a:rPr lang="es-ES" sz="1100" u="none" strike="noStrike">
+                          <a:effectLst/>
+                        </a:rPr>
+                        <a:t>En carrito</a:t>
+                      </a:r>
+                      <a:endParaRPr lang="es-ES" sz="1100" b="0" i="0" u="none" strike="noStrike">
+                        <a:solidFill>
+                          <a:srgbClr val="000000"/>
+                        </a:solidFill>
+                        <a:effectLst/>
+                        <a:latin typeface="Aptos Narrow" panose="020B0004020202020204" pitchFamily="34" charset="0"/>
+                      </a:endParaRPr>
+                    </a:p>
+                  </a:txBody>
+                  <a:tcPr marL="7620" marR="7620" marT="7620" marB="0" anchor="b"/>
+                </a:tc>
+                <a:tc>
+                  <a:txBody>
+                    <a:bodyPr/>
+                    <a:lstStyle/>
+                    <a:p>
+                      <a:pPr algn="l" fontAlgn="b"/>
+                      <a:r>
+                        <a:rPr lang="es-ES" sz="1100" u="none" strike="noStrike">
+                          <a:effectLst/>
+                        </a:rPr>
+                        <a:t> </a:t>
+                      </a:r>
+                      <a:endParaRPr lang="es-ES" sz="1100" b="0" i="0" u="none" strike="noStrike">
+                        <a:solidFill>
+                          <a:srgbClr val="000000"/>
+                        </a:solidFill>
+                        <a:effectLst/>
+                        <a:latin typeface="Aptos Narrow" panose="020B0004020202020204" pitchFamily="34" charset="0"/>
+                      </a:endParaRPr>
+                    </a:p>
+                  </a:txBody>
+                  <a:tcPr marL="7620" marR="7620" marT="7620" marB="0" anchor="b"/>
+                </a:tc>
+                <a:extLst>
+                  <a:ext uri="{0D108BD9-81ED-4DB2-BD59-A6C34878D82A}">
+                    <a16:rowId xmlns:a16="http://schemas.microsoft.com/office/drawing/2014/main" val="2852452592"/>
+                  </a:ext>
+                </a:extLst>
+              </a:tr>
+              <a:tr h="182880">
+                <a:tc>
+                  <a:txBody>
+                    <a:bodyPr/>
+                    <a:lstStyle/>
+                    <a:p>
+                      <a:pPr algn="l" fontAlgn="b"/>
+                      <a:r>
+                        <a:rPr lang="es-ES" sz="1100" u="none" strike="noStrike">
+                          <a:effectLst/>
+                        </a:rPr>
+                        <a:t>TOTAL</a:t>
+                      </a:r>
+                      <a:endParaRPr lang="es-ES" sz="1100" b="0" i="0" u="none" strike="noStrike">
+                        <a:solidFill>
+                          <a:srgbClr val="000000"/>
+                        </a:solidFill>
+                        <a:effectLst/>
+                        <a:latin typeface="Aptos Narrow" panose="020B0004020202020204" pitchFamily="34" charset="0"/>
+                      </a:endParaRPr>
+                    </a:p>
+                  </a:txBody>
+                  <a:tcPr marL="7620" marR="7620" marT="7620" marB="0" anchor="b"/>
+                </a:tc>
+                <a:tc>
+                  <a:txBody>
+                    <a:bodyPr/>
+                    <a:lstStyle/>
+                    <a:p>
+                      <a:pPr algn="l" fontAlgn="b"/>
+                      <a:r>
+                        <a:rPr lang="es-ES" sz="1100" u="none" strike="noStrike">
+                          <a:effectLst/>
+                        </a:rPr>
+                        <a:t> </a:t>
+                      </a:r>
+                      <a:endParaRPr lang="es-ES" sz="1100" b="0" i="0" u="none" strike="noStrike">
+                        <a:solidFill>
+                          <a:srgbClr val="000000"/>
+                        </a:solidFill>
+                        <a:effectLst/>
+                        <a:latin typeface="Aptos Narrow" panose="020B0004020202020204" pitchFamily="34" charset="0"/>
+                      </a:endParaRPr>
+                    </a:p>
+                  </a:txBody>
+                  <a:tcPr marL="7620" marR="7620" marT="7620" marB="0" anchor="b"/>
+                </a:tc>
+                <a:tc>
+                  <a:txBody>
+                    <a:bodyPr/>
+                    <a:lstStyle/>
+                    <a:p>
+                      <a:pPr algn="l" fontAlgn="b"/>
+                      <a:r>
+                        <a:rPr lang="es-ES" sz="1100" u="none" strike="noStrike">
+                          <a:effectLst/>
+                        </a:rPr>
+                        <a:t> </a:t>
+                      </a:r>
+                      <a:endParaRPr lang="es-ES" sz="1100" b="0" i="0" u="none" strike="noStrike">
+                        <a:solidFill>
+                          <a:srgbClr val="000000"/>
+                        </a:solidFill>
+                        <a:effectLst/>
+                        <a:latin typeface="Aptos Narrow" panose="020B0004020202020204" pitchFamily="34" charset="0"/>
+                      </a:endParaRPr>
+                    </a:p>
+                  </a:txBody>
+                  <a:tcPr marL="7620" marR="7620" marT="7620" marB="0" anchor="b"/>
+                </a:tc>
+                <a:tc>
+                  <a:txBody>
+                    <a:bodyPr/>
+                    <a:lstStyle/>
+                    <a:p>
+                      <a:pPr algn="r" fontAlgn="b"/>
+                      <a:r>
+                        <a:rPr lang="es-ES" sz="1100" u="none" strike="noStrike">
+                          <a:effectLst/>
+                        </a:rPr>
+                        <a:t>15.292</a:t>
+                      </a:r>
+                      <a:endParaRPr lang="es-ES" sz="1100" b="0" i="0" u="none" strike="noStrike">
+                        <a:solidFill>
+                          <a:srgbClr val="000000"/>
+                        </a:solidFill>
+                        <a:effectLst/>
+                        <a:latin typeface="Aptos Narrow" panose="020B0004020202020204" pitchFamily="34" charset="0"/>
+                      </a:endParaRPr>
+                    </a:p>
+                  </a:txBody>
+                  <a:tcPr marL="7620" marR="7620" marT="7620" marB="0" anchor="b"/>
+                </a:tc>
+                <a:tc>
+                  <a:txBody>
+                    <a:bodyPr/>
+                    <a:lstStyle/>
+                    <a:p>
+                      <a:pPr algn="l" fontAlgn="b"/>
+                      <a:r>
+                        <a:rPr lang="es-ES" sz="1100" u="none" strike="noStrike">
+                          <a:effectLst/>
+                        </a:rPr>
+                        <a:t> </a:t>
+                      </a:r>
+                      <a:endParaRPr lang="es-ES" sz="1100" b="0" i="0" u="none" strike="noStrike">
+                        <a:solidFill>
+                          <a:srgbClr val="000000"/>
+                        </a:solidFill>
+                        <a:effectLst/>
+                        <a:latin typeface="Aptos Narrow" panose="020B0004020202020204" pitchFamily="34" charset="0"/>
+                      </a:endParaRPr>
+                    </a:p>
+                  </a:txBody>
+                  <a:tcPr marL="7620" marR="7620" marT="7620" marB="0" anchor="b"/>
+                </a:tc>
+                <a:tc>
+                  <a:txBody>
+                    <a:bodyPr/>
+                    <a:lstStyle/>
+                    <a:p>
+                      <a:pPr algn="l" fontAlgn="b"/>
+                      <a:r>
+                        <a:rPr lang="es-ES" sz="1100" u="none" strike="noStrike" dirty="0">
+                          <a:effectLst/>
+                        </a:rPr>
+                        <a:t> </a:t>
+                      </a:r>
+                      <a:endParaRPr lang="es-ES" sz="1100" b="0" i="0" u="none" strike="noStrike" dirty="0">
+                        <a:solidFill>
+                          <a:srgbClr val="000000"/>
+                        </a:solidFill>
+                        <a:effectLst/>
+                        <a:latin typeface="Aptos Narrow" panose="020B0004020202020204" pitchFamily="34" charset="0"/>
+                      </a:endParaRPr>
+                    </a:p>
+                  </a:txBody>
+                  <a:tcPr marL="7620" marR="7620" marT="7620" marB="0" anchor="b"/>
+                </a:tc>
+                <a:extLst>
+                  <a:ext uri="{0D108BD9-81ED-4DB2-BD59-A6C34878D82A}">
+                    <a16:rowId xmlns:a16="http://schemas.microsoft.com/office/drawing/2014/main" val="3856947993"/>
+                  </a:ext>
+                </a:extLst>
+              </a:tr>
+            </a:tbl>
+          </a:graphicData>
+        </a:graphic>
+      </p:graphicFrame>
+    </p:spTree>
+    <p:extLst>
+      <p:ext uri="{BB962C8B-B14F-4D97-AF65-F5344CB8AC3E}">
+        <p14:creationId xmlns:p14="http://schemas.microsoft.com/office/powerpoint/2010/main" val="950796142"/>
+      </p:ext>
+    </p:extLst>
+  </p:cSld>
+  <p:clrMapOvr>
+    <a:masterClrMapping/>
+  </p:clrMapOvr>
+</p:sld>
+</file>
+
 <file path=ppt/slides/slide3.xml><?xml version="1.0" encoding="utf-8"?>
 <p:sld xmlns:a="http://schemas.openxmlformats.org/drawingml/2006/main" xmlns:r="http://schemas.openxmlformats.org/officeDocument/2006/relationships" xmlns:p="http://schemas.openxmlformats.org/presentationml/2006/main">
   <p:cSld>

</xml_diff>